<commit_message>
Edited AddDeleteEventSequenceDiagram to be seen in DeveloperGuide.adoc
</commit_message>
<xml_diff>
--- a/docs/diagrams/AddDeleteEventSequenceDiagram.pptx
+++ b/docs/diagrams/AddDeleteEventSequenceDiagram.pptx
@@ -208,7 +208,7 @@
           <a:p>
             <a:fld id="{F5CC4B3F-88C1-4FFA-B1B6-F41C21DC6924}" type="datetimeFigureOut">
               <a:rPr lang="en-US" smtClean="0"/>
-              <a:t>10/17/2018</a:t>
+              <a:t>10/18/2018</a:t>
             </a:fld>
             <a:endParaRPr lang="en-US"/>
           </a:p>
@@ -654,7 +654,7 @@
           <a:p>
             <a:fld id="{78C97017-6FC3-485B-9764-EAC9E56C1D49}" type="datetimeFigureOut">
               <a:rPr lang="en-US" smtClean="0"/>
-              <a:t>10/17/2018</a:t>
+              <a:t>10/18/2018</a:t>
             </a:fld>
             <a:endParaRPr lang="en-US"/>
           </a:p>
@@ -822,7 +822,7 @@
           <a:p>
             <a:fld id="{78C97017-6FC3-485B-9764-EAC9E56C1D49}" type="datetimeFigureOut">
               <a:rPr lang="en-US" smtClean="0"/>
-              <a:t>10/17/2018</a:t>
+              <a:t>10/18/2018</a:t>
             </a:fld>
             <a:endParaRPr lang="en-US"/>
           </a:p>
@@ -1000,7 +1000,7 @@
           <a:p>
             <a:fld id="{78C97017-6FC3-485B-9764-EAC9E56C1D49}" type="datetimeFigureOut">
               <a:rPr lang="en-US" smtClean="0"/>
-              <a:t>10/17/2018</a:t>
+              <a:t>10/18/2018</a:t>
             </a:fld>
             <a:endParaRPr lang="en-US"/>
           </a:p>
@@ -1168,7 +1168,7 @@
           <a:p>
             <a:fld id="{78C97017-6FC3-485B-9764-EAC9E56C1D49}" type="datetimeFigureOut">
               <a:rPr lang="en-US" smtClean="0"/>
-              <a:t>10/17/2018</a:t>
+              <a:t>10/18/2018</a:t>
             </a:fld>
             <a:endParaRPr lang="en-US"/>
           </a:p>
@@ -1413,7 +1413,7 @@
           <a:p>
             <a:fld id="{78C97017-6FC3-485B-9764-EAC9E56C1D49}" type="datetimeFigureOut">
               <a:rPr lang="en-US" smtClean="0"/>
-              <a:t>10/17/2018</a:t>
+              <a:t>10/18/2018</a:t>
             </a:fld>
             <a:endParaRPr lang="en-US"/>
           </a:p>
@@ -1698,7 +1698,7 @@
           <a:p>
             <a:fld id="{78C97017-6FC3-485B-9764-EAC9E56C1D49}" type="datetimeFigureOut">
               <a:rPr lang="en-US" smtClean="0"/>
-              <a:t>10/17/2018</a:t>
+              <a:t>10/18/2018</a:t>
             </a:fld>
             <a:endParaRPr lang="en-US"/>
           </a:p>
@@ -2117,7 +2117,7 @@
           <a:p>
             <a:fld id="{78C97017-6FC3-485B-9764-EAC9E56C1D49}" type="datetimeFigureOut">
               <a:rPr lang="en-US" smtClean="0"/>
-              <a:t>10/17/2018</a:t>
+              <a:t>10/18/2018</a:t>
             </a:fld>
             <a:endParaRPr lang="en-US"/>
           </a:p>
@@ -2234,7 +2234,7 @@
           <a:p>
             <a:fld id="{78C97017-6FC3-485B-9764-EAC9E56C1D49}" type="datetimeFigureOut">
               <a:rPr lang="en-US" smtClean="0"/>
-              <a:t>10/17/2018</a:t>
+              <a:t>10/18/2018</a:t>
             </a:fld>
             <a:endParaRPr lang="en-US"/>
           </a:p>
@@ -2329,7 +2329,7 @@
           <a:p>
             <a:fld id="{78C97017-6FC3-485B-9764-EAC9E56C1D49}" type="datetimeFigureOut">
               <a:rPr lang="en-US" smtClean="0"/>
-              <a:t>10/17/2018</a:t>
+              <a:t>10/18/2018</a:t>
             </a:fld>
             <a:endParaRPr lang="en-US"/>
           </a:p>
@@ -2604,7 +2604,7 @@
           <a:p>
             <a:fld id="{78C97017-6FC3-485B-9764-EAC9E56C1D49}" type="datetimeFigureOut">
               <a:rPr lang="en-US" smtClean="0"/>
-              <a:t>10/17/2018</a:t>
+              <a:t>10/18/2018</a:t>
             </a:fld>
             <a:endParaRPr lang="en-US"/>
           </a:p>
@@ -2856,7 +2856,7 @@
           <a:p>
             <a:fld id="{78C97017-6FC3-485B-9764-EAC9E56C1D49}" type="datetimeFigureOut">
               <a:rPr lang="en-US" smtClean="0"/>
-              <a:t>10/17/2018</a:t>
+              <a:t>10/18/2018</a:t>
             </a:fld>
             <a:endParaRPr lang="en-US"/>
           </a:p>
@@ -3067,7 +3067,7 @@
           <a:p>
             <a:fld id="{78C97017-6FC3-485B-9764-EAC9E56C1D49}" type="datetimeFigureOut">
               <a:rPr lang="en-US" smtClean="0"/>
-              <a:t>10/17/2018</a:t>
+              <a:t>10/18/2018</a:t>
             </a:fld>
             <a:endParaRPr lang="en-US"/>
           </a:p>
@@ -3442,1852 +3442,1873 @@
           <a:chExt cx="0" cy="0"/>
         </a:xfrm>
       </p:grpSpPr>
-      <p:sp>
-        <p:nvSpPr>
-          <p:cNvPr id="56" name="Rectangle 65"/>
-          <p:cNvSpPr/>
+      <p:grpSp>
+        <p:nvGrpSpPr>
+          <p:cNvPr id="3" name="Group 2">
+            <a:extLst>
+              <a:ext uri="{FF2B5EF4-FFF2-40B4-BE49-F238E27FC236}">
+                <a16:creationId xmlns:a16="http://schemas.microsoft.com/office/drawing/2014/main" id="{C5298A1E-7265-434E-AEB2-1C1C09DB478B}"/>
+              </a:ext>
+            </a:extLst>
+          </p:cNvPr>
+          <p:cNvGrpSpPr/>
           <p:nvPr/>
-        </p:nvSpPr>
-        <p:spPr>
+        </p:nvGrpSpPr>
+        <p:grpSpPr>
           <a:xfrm>
-            <a:off x="6459374" y="75352"/>
-            <a:ext cx="3903825" cy="4400926"/>
+            <a:off x="-457192" y="75352"/>
+            <a:ext cx="10820391" cy="4444469"/>
+            <a:chOff x="-457192" y="75352"/>
+            <a:chExt cx="10820391" cy="4444469"/>
           </a:xfrm>
-          <a:prstGeom prst="roundRect">
-            <a:avLst>
-              <a:gd name="adj" fmla="val 3484"/>
-            </a:avLst>
-          </a:prstGeom>
-          <a:solidFill>
-            <a:schemeClr val="accent4">
-              <a:lumMod val="20000"/>
-              <a:lumOff val="80000"/>
-            </a:schemeClr>
-          </a:solidFill>
-          <a:ln w="19050">
-            <a:noFill/>
-          </a:ln>
-          <a:effectLst/>
-        </p:spPr>
-        <p:style>
-          <a:lnRef idx="1">
-            <a:schemeClr val="accent2"/>
-          </a:lnRef>
-          <a:fillRef idx="2">
-            <a:schemeClr val="accent2"/>
-          </a:fillRef>
-          <a:effectRef idx="1">
-            <a:schemeClr val="accent2"/>
-          </a:effectRef>
-          <a:fontRef idx="minor">
-            <a:schemeClr val="dk1"/>
-          </a:fontRef>
-        </p:style>
-        <p:txBody>
-          <a:bodyPr rtlCol="0" anchor="t"/>
-          <a:lstStyle/>
-          <a:p>
-            <a:r>
-              <a:rPr lang="en-US" sz="1200" b="1" dirty="0">
+        </p:grpSpPr>
+        <p:sp>
+          <p:nvSpPr>
+            <p:cNvPr id="56" name="Rectangle 65"/>
+            <p:cNvSpPr/>
+            <p:nvPr/>
+          </p:nvSpPr>
+          <p:spPr>
+            <a:xfrm>
+              <a:off x="6459374" y="75352"/>
+              <a:ext cx="3903825" cy="4400926"/>
+            </a:xfrm>
+            <a:prstGeom prst="roundRect">
+              <a:avLst>
+                <a:gd name="adj" fmla="val 3484"/>
+              </a:avLst>
+            </a:prstGeom>
+            <a:solidFill>
+              <a:schemeClr val="accent4">
+                <a:lumMod val="20000"/>
+                <a:lumOff val="80000"/>
+              </a:schemeClr>
+            </a:solidFill>
+            <a:ln w="19050">
+              <a:noFill/>
+            </a:ln>
+            <a:effectLst/>
+          </p:spPr>
+          <p:style>
+            <a:lnRef idx="1">
+              <a:schemeClr val="accent2"/>
+            </a:lnRef>
+            <a:fillRef idx="2">
+              <a:schemeClr val="accent2"/>
+            </a:fillRef>
+            <a:effectRef idx="1">
+              <a:schemeClr val="accent2"/>
+            </a:effectRef>
+            <a:fontRef idx="minor">
+              <a:schemeClr val="dk1"/>
+            </a:fontRef>
+          </p:style>
+          <p:txBody>
+            <a:bodyPr rtlCol="0" anchor="t"/>
+            <a:lstStyle/>
+            <a:p>
+              <a:r>
+                <a:rPr lang="en-US" sz="1200" b="1" dirty="0">
+                  <a:solidFill>
+                    <a:srgbClr val="7030A0"/>
+                  </a:solidFill>
+                </a:rPr>
+                <a:t>Model</a:t>
+              </a:r>
+              <a:endParaRPr lang="en-SG" sz="1200" b="1" dirty="0">
                 <a:solidFill>
                   <a:srgbClr val="7030A0"/>
                 </a:solidFill>
-              </a:rPr>
-              <a:t>Model</a:t>
-            </a:r>
-            <a:endParaRPr lang="en-SG" sz="1200" b="1" dirty="0">
+              </a:endParaRPr>
+            </a:p>
+          </p:txBody>
+        </p:sp>
+        <p:sp>
+          <p:nvSpPr>
+            <p:cNvPr id="81" name="Rectangle 65"/>
+            <p:cNvSpPr/>
+            <p:nvPr/>
+          </p:nvSpPr>
+          <p:spPr>
+            <a:xfrm>
+              <a:off x="467813" y="119475"/>
+              <a:ext cx="5863964" cy="4343400"/>
+            </a:xfrm>
+            <a:prstGeom prst="roundRect">
+              <a:avLst>
+                <a:gd name="adj" fmla="val 3484"/>
+              </a:avLst>
+            </a:prstGeom>
+            <a:solidFill>
+              <a:schemeClr val="accent1">
+                <a:lumMod val="20000"/>
+                <a:lumOff val="80000"/>
+              </a:schemeClr>
+            </a:solidFill>
+            <a:ln w="19050">
+              <a:noFill/>
+            </a:ln>
+            <a:effectLst/>
+          </p:spPr>
+          <p:style>
+            <a:lnRef idx="1">
+              <a:schemeClr val="accent2"/>
+            </a:lnRef>
+            <a:fillRef idx="2">
+              <a:schemeClr val="accent2"/>
+            </a:fillRef>
+            <a:effectRef idx="1">
+              <a:schemeClr val="accent2"/>
+            </a:effectRef>
+            <a:fontRef idx="minor">
+              <a:schemeClr val="dk1"/>
+            </a:fontRef>
+          </p:style>
+          <p:txBody>
+            <a:bodyPr rtlCol="0" anchor="t"/>
+            <a:lstStyle/>
+            <a:p>
+              <a:r>
+                <a:rPr lang="en-US" sz="1200" b="1" dirty="0">
+                  <a:solidFill>
+                    <a:srgbClr val="0070C0"/>
+                  </a:solidFill>
+                </a:rPr>
+                <a:t>Logic</a:t>
+              </a:r>
+              <a:endParaRPr lang="en-SG" sz="1200" b="1" dirty="0">
+                <a:solidFill>
+                  <a:srgbClr val="0070C0"/>
+                </a:solidFill>
+              </a:endParaRPr>
+            </a:p>
+          </p:txBody>
+        </p:sp>
+        <p:sp>
+          <p:nvSpPr>
+            <p:cNvPr id="2" name="Rectangle 62"/>
+            <p:cNvSpPr/>
+            <p:nvPr/>
+          </p:nvSpPr>
+          <p:spPr>
+            <a:xfrm>
+              <a:off x="883145" y="543946"/>
+              <a:ext cx="1455629" cy="346760"/>
+            </a:xfrm>
+            <a:prstGeom prst="rect">
+              <a:avLst/>
+            </a:prstGeom>
+            <a:solidFill>
+              <a:srgbClr val="0070C0"/>
+            </a:solidFill>
+            <a:ln w="19050">
+              <a:solidFill>
+                <a:srgbClr val="0070C0"/>
+              </a:solidFill>
+            </a:ln>
+            <a:effectLst/>
+          </p:spPr>
+          <p:style>
+            <a:lnRef idx="1">
+              <a:schemeClr val="accent2"/>
+            </a:lnRef>
+            <a:fillRef idx="2">
+              <a:schemeClr val="accent2"/>
+            </a:fillRef>
+            <a:effectRef idx="1">
+              <a:schemeClr val="accent2"/>
+            </a:effectRef>
+            <a:fontRef idx="minor">
+              <a:schemeClr val="dk1"/>
+            </a:fontRef>
+          </p:style>
+          <p:txBody>
+            <a:bodyPr rtlCol="0" anchor="ctr"/>
+            <a:lstStyle/>
+            <a:p>
+              <a:pPr algn="ctr"/>
+              <a:r>
+                <a:rPr lang="en-US" sz="1600" dirty="0">
+                  <a:solidFill>
+                    <a:schemeClr val="bg1"/>
+                  </a:solidFill>
+                </a:rPr>
+                <a:t>:</a:t>
+              </a:r>
+              <a:r>
+                <a:rPr lang="en-US" sz="1600" dirty="0" err="1">
+                  <a:solidFill>
+                    <a:schemeClr val="bg1"/>
+                  </a:solidFill>
+                </a:rPr>
+                <a:t>LogicManager</a:t>
+              </a:r>
+              <a:endParaRPr lang="en-SG" sz="1600" dirty="0">
+                <a:solidFill>
+                  <a:schemeClr val="bg1"/>
+                </a:solidFill>
+              </a:endParaRPr>
+            </a:p>
+          </p:txBody>
+        </p:sp>
+        <p:cxnSp>
+          <p:nvCxnSpPr>
+            <p:cNvPr id="5" name="Straight Connector 4"/>
+            <p:cNvCxnSpPr>
+              <a:cxnSpLocks/>
+            </p:cNvCxnSpPr>
+            <p:nvPr/>
+          </p:nvCxnSpPr>
+          <p:spPr>
+            <a:xfrm>
+              <a:off x="1610959" y="907617"/>
+              <a:ext cx="0" cy="3481399"/>
+            </a:xfrm>
+            <a:prstGeom prst="line">
+              <a:avLst/>
+            </a:prstGeom>
+            <a:ln w="19050">
+              <a:solidFill>
+                <a:srgbClr val="0070C0"/>
+              </a:solidFill>
+              <a:prstDash val="sysDash"/>
+            </a:ln>
+            <a:effectLst/>
+          </p:spPr>
+          <p:style>
+            <a:lnRef idx="1">
+              <a:schemeClr val="accent1"/>
+            </a:lnRef>
+            <a:fillRef idx="2">
+              <a:schemeClr val="accent1"/>
+            </a:fillRef>
+            <a:effectRef idx="1">
+              <a:schemeClr val="accent1"/>
+            </a:effectRef>
+            <a:fontRef idx="minor">
+              <a:schemeClr val="dk1"/>
+            </a:fontRef>
+          </p:style>
+        </p:cxnSp>
+        <p:sp>
+          <p:nvSpPr>
+            <p:cNvPr id="6" name="Rectangle 5"/>
+            <p:cNvSpPr/>
+            <p:nvPr/>
+          </p:nvSpPr>
+          <p:spPr>
+            <a:xfrm>
+              <a:off x="1538951" y="1258311"/>
+              <a:ext cx="152400" cy="2932689"/>
+            </a:xfrm>
+            <a:prstGeom prst="rect">
+              <a:avLst/>
+            </a:prstGeom>
+            <a:solidFill>
+              <a:srgbClr val="0070C0"/>
+            </a:solidFill>
+            <a:ln>
+              <a:solidFill>
+                <a:srgbClr val="0070C0"/>
+              </a:solidFill>
+            </a:ln>
+            <a:effectLst/>
+          </p:spPr>
+          <p:style>
+            <a:lnRef idx="1">
+              <a:schemeClr val="accent3"/>
+            </a:lnRef>
+            <a:fillRef idx="2">
+              <a:schemeClr val="accent3"/>
+            </a:fillRef>
+            <a:effectRef idx="1">
+              <a:schemeClr val="accent3"/>
+            </a:effectRef>
+            <a:fontRef idx="minor">
+              <a:schemeClr val="dk1"/>
+            </a:fontRef>
+          </p:style>
+          <p:txBody>
+            <a:bodyPr rtlCol="0" anchor="ctr"/>
+            <a:lstStyle/>
+            <a:p>
+              <a:pPr algn="ctr"/>
+              <a:endParaRPr lang="en-SG" sz="1400"/>
+            </a:p>
+          </p:txBody>
+        </p:sp>
+        <p:sp>
+          <p:nvSpPr>
+            <p:cNvPr id="16" name="Rectangle 62"/>
+            <p:cNvSpPr/>
+            <p:nvPr/>
+          </p:nvSpPr>
+          <p:spPr>
+            <a:xfrm>
+              <a:off x="3437188" y="423022"/>
+              <a:ext cx="1219200" cy="467684"/>
+            </a:xfrm>
+            <a:prstGeom prst="rect">
+              <a:avLst/>
+            </a:prstGeom>
+            <a:solidFill>
+              <a:srgbClr val="0070C0"/>
+            </a:solidFill>
+            <a:ln w="19050">
+              <a:solidFill>
+                <a:srgbClr val="0070C0"/>
+              </a:solidFill>
+            </a:ln>
+            <a:effectLst/>
+          </p:spPr>
+          <p:style>
+            <a:lnRef idx="1">
+              <a:schemeClr val="accent2"/>
+            </a:lnRef>
+            <a:fillRef idx="2">
+              <a:schemeClr val="accent2"/>
+            </a:fillRef>
+            <a:effectRef idx="1">
+              <a:schemeClr val="accent2"/>
+            </a:effectRef>
+            <a:fontRef idx="minor">
+              <a:schemeClr val="dk1"/>
+            </a:fontRef>
+          </p:style>
+          <p:txBody>
+            <a:bodyPr rtlCol="0" anchor="ctr"/>
+            <a:lstStyle/>
+            <a:p>
+              <a:pPr algn="ctr"/>
+              <a:r>
+                <a:rPr lang="en-US" sz="1600" dirty="0">
+                  <a:solidFill>
+                    <a:schemeClr val="bg1"/>
+                  </a:solidFill>
+                </a:rPr>
+                <a:t>:Address</a:t>
+              </a:r>
+            </a:p>
+            <a:p>
+              <a:pPr algn="ctr"/>
+              <a:r>
+                <a:rPr lang="en-US" sz="1600" dirty="0" err="1">
+                  <a:solidFill>
+                    <a:schemeClr val="bg1"/>
+                  </a:solidFill>
+                </a:rPr>
+                <a:t>BookParser</a:t>
+              </a:r>
+              <a:endParaRPr lang="en-SG" sz="1600" dirty="0">
+                <a:solidFill>
+                  <a:schemeClr val="bg1"/>
+                </a:solidFill>
+              </a:endParaRPr>
+            </a:p>
+          </p:txBody>
+        </p:sp>
+        <p:cxnSp>
+          <p:nvCxnSpPr>
+            <p:cNvPr id="17" name="Straight Connector 16"/>
+            <p:cNvCxnSpPr>
+              <a:cxnSpLocks/>
+            </p:cNvCxnSpPr>
+            <p:nvPr/>
+          </p:nvCxnSpPr>
+          <p:spPr>
+            <a:xfrm>
+              <a:off x="4050587" y="907617"/>
+              <a:ext cx="0" cy="1482984"/>
+            </a:xfrm>
+            <a:prstGeom prst="line">
+              <a:avLst/>
+            </a:prstGeom>
+            <a:ln w="19050">
+              <a:solidFill>
+                <a:srgbClr val="0070C0"/>
+              </a:solidFill>
+              <a:prstDash val="sysDash"/>
+            </a:ln>
+            <a:effectLst/>
+          </p:spPr>
+          <p:style>
+            <a:lnRef idx="1">
+              <a:schemeClr val="accent1"/>
+            </a:lnRef>
+            <a:fillRef idx="2">
+              <a:schemeClr val="accent1"/>
+            </a:fillRef>
+            <a:effectRef idx="1">
+              <a:schemeClr val="accent1"/>
+            </a:effectRef>
+            <a:fontRef idx="minor">
+              <a:schemeClr val="dk1"/>
+            </a:fontRef>
+          </p:style>
+        </p:cxnSp>
+        <p:sp>
+          <p:nvSpPr>
+            <p:cNvPr id="18" name="Rectangle 17"/>
+            <p:cNvSpPr/>
+            <p:nvPr/>
+          </p:nvSpPr>
+          <p:spPr>
+            <a:xfrm>
+              <a:off x="3978580" y="1365810"/>
+              <a:ext cx="154408" cy="767790"/>
+            </a:xfrm>
+            <a:prstGeom prst="rect">
+              <a:avLst/>
+            </a:prstGeom>
+            <a:solidFill>
+              <a:srgbClr val="0070C0"/>
+            </a:solidFill>
+            <a:ln>
+              <a:solidFill>
+                <a:srgbClr val="0070C0"/>
+              </a:solidFill>
+            </a:ln>
+            <a:effectLst/>
+          </p:spPr>
+          <p:style>
+            <a:lnRef idx="1">
+              <a:schemeClr val="accent3"/>
+            </a:lnRef>
+            <a:fillRef idx="2">
+              <a:schemeClr val="accent3"/>
+            </a:fillRef>
+            <a:effectRef idx="1">
+              <a:schemeClr val="accent3"/>
+            </a:effectRef>
+            <a:fontRef idx="minor">
+              <a:schemeClr val="dk1"/>
+            </a:fontRef>
+          </p:style>
+          <p:txBody>
+            <a:bodyPr rtlCol="0" anchor="ctr"/>
+            <a:lstStyle/>
+            <a:p>
+              <a:pPr algn="ctr"/>
+              <a:endParaRPr lang="en-SG" sz="1400">
+                <a:solidFill>
+                  <a:schemeClr val="dk1"/>
+                </a:solidFill>
+              </a:endParaRPr>
+            </a:p>
+          </p:txBody>
+        </p:sp>
+        <p:cxnSp>
+          <p:nvCxnSpPr>
+            <p:cNvPr id="20" name="Straight Connector 19"/>
+            <p:cNvCxnSpPr>
+              <a:cxnSpLocks/>
+              <a:stCxn id="21" idx="0"/>
+              <a:endCxn id="4" idx="0"/>
+            </p:cNvCxnSpPr>
+            <p:nvPr/>
+          </p:nvCxnSpPr>
+          <p:spPr>
+            <a:xfrm>
+              <a:off x="5602082" y="1613633"/>
+              <a:ext cx="0" cy="2644578"/>
+            </a:xfrm>
+            <a:prstGeom prst="line">
+              <a:avLst/>
+            </a:prstGeom>
+            <a:ln w="19050">
+              <a:solidFill>
+                <a:srgbClr val="0070C0"/>
+              </a:solidFill>
+              <a:prstDash val="sysDash"/>
+            </a:ln>
+            <a:effectLst/>
+          </p:spPr>
+          <p:style>
+            <a:lnRef idx="1">
+              <a:schemeClr val="accent1"/>
+            </a:lnRef>
+            <a:fillRef idx="2">
+              <a:schemeClr val="accent1"/>
+            </a:fillRef>
+            <a:effectRef idx="1">
+              <a:schemeClr val="accent1"/>
+            </a:effectRef>
+            <a:fontRef idx="minor">
+              <a:schemeClr val="dk1"/>
+            </a:fontRef>
+          </p:style>
+        </p:cxnSp>
+        <p:sp>
+          <p:nvSpPr>
+            <p:cNvPr id="21" name="Rectangle 20"/>
+            <p:cNvSpPr/>
+            <p:nvPr/>
+          </p:nvSpPr>
+          <p:spPr>
+            <a:xfrm>
+              <a:off x="5525882" y="1613633"/>
+              <a:ext cx="152400" cy="276003"/>
+            </a:xfrm>
+            <a:prstGeom prst="rect">
+              <a:avLst/>
+            </a:prstGeom>
+            <a:solidFill>
+              <a:srgbClr val="0070C0"/>
+            </a:solidFill>
+            <a:ln>
+              <a:solidFill>
+                <a:srgbClr val="0070C0"/>
+              </a:solidFill>
+            </a:ln>
+            <a:effectLst/>
+          </p:spPr>
+          <p:style>
+            <a:lnRef idx="1">
+              <a:schemeClr val="accent3"/>
+            </a:lnRef>
+            <a:fillRef idx="2">
+              <a:schemeClr val="accent3"/>
+            </a:fillRef>
+            <a:effectRef idx="1">
+              <a:schemeClr val="accent3"/>
+            </a:effectRef>
+            <a:fontRef idx="minor">
+              <a:schemeClr val="dk1"/>
+            </a:fontRef>
+          </p:style>
+          <p:txBody>
+            <a:bodyPr rtlCol="0" anchor="ctr"/>
+            <a:lstStyle/>
+            <a:p>
+              <a:pPr algn="ctr"/>
+              <a:endParaRPr lang="en-SG" sz="1400"/>
+            </a:p>
+          </p:txBody>
+        </p:sp>
+        <p:cxnSp>
+          <p:nvCxnSpPr>
+            <p:cNvPr id="23" name="Straight Arrow Connector 22"/>
+            <p:cNvCxnSpPr/>
+            <p:nvPr/>
+          </p:nvCxnSpPr>
+          <p:spPr>
+            <a:xfrm>
+              <a:off x="419100" y="1261999"/>
+              <a:ext cx="1119851" cy="0"/>
+            </a:xfrm>
+            <a:prstGeom prst="straightConnector1">
+              <a:avLst/>
+            </a:prstGeom>
+            <a:ln w="19050">
+              <a:solidFill>
+                <a:srgbClr val="00B050"/>
+              </a:solidFill>
+              <a:tailEnd type="arrow"/>
+            </a:ln>
+          </p:spPr>
+          <p:style>
+            <a:lnRef idx="1">
+              <a:schemeClr val="accent1"/>
+            </a:lnRef>
+            <a:fillRef idx="0">
+              <a:schemeClr val="accent1"/>
+            </a:fillRef>
+            <a:effectRef idx="0">
+              <a:schemeClr val="accent1"/>
+            </a:effectRef>
+            <a:fontRef idx="minor">
+              <a:schemeClr val="tx1"/>
+            </a:fontRef>
+          </p:style>
+        </p:cxnSp>
+        <p:sp>
+          <p:nvSpPr>
+            <p:cNvPr id="26" name="TextBox 25"/>
+            <p:cNvSpPr txBox="1"/>
+            <p:nvPr/>
+          </p:nvSpPr>
+          <p:spPr>
+            <a:xfrm>
+              <a:off x="-457192" y="990600"/>
+              <a:ext cx="1920138" cy="214449"/>
+            </a:xfrm>
+            <a:prstGeom prst="rect">
+              <a:avLst/>
+            </a:prstGeom>
+            <a:noFill/>
+          </p:spPr>
+          <p:txBody>
+            <a:bodyPr wrap="square" lIns="0" tIns="0" rIns="0" bIns="0" rtlCol="0">
+              <a:spAutoFit/>
+            </a:bodyPr>
+            <a:lstStyle/>
+            <a:p>
+              <a:pPr algn="r"/>
+              <a:r>
+                <a:rPr lang="en-US" sz="1400" dirty="0">
+                  <a:solidFill>
+                    <a:srgbClr val="0070C0"/>
+                  </a:solidFill>
+                </a:rPr>
+                <a:t>execute(“</a:t>
+              </a:r>
+              <a:r>
+                <a:rPr lang="en-US" sz="1400" dirty="0" err="1">
+                  <a:solidFill>
+                    <a:srgbClr val="0070C0"/>
+                  </a:solidFill>
+                </a:rPr>
+                <a:t>add_event</a:t>
+              </a:r>
+              <a:r>
+                <a:rPr lang="en-US" sz="1400" dirty="0">
+                  <a:solidFill>
+                    <a:srgbClr val="0070C0"/>
+                  </a:solidFill>
+                </a:rPr>
+                <a:t>”)</a:t>
+              </a:r>
+            </a:p>
+          </p:txBody>
+        </p:sp>
+        <p:cxnSp>
+          <p:nvCxnSpPr>
+            <p:cNvPr id="28" name="Straight Arrow Connector 27"/>
+            <p:cNvCxnSpPr/>
+            <p:nvPr/>
+          </p:nvCxnSpPr>
+          <p:spPr>
+            <a:xfrm flipV="1">
+              <a:off x="4135972" y="1512340"/>
+              <a:ext cx="922392" cy="1"/>
+            </a:xfrm>
+            <a:prstGeom prst="straightConnector1">
+              <a:avLst/>
+            </a:prstGeom>
+            <a:ln w="19050">
+              <a:solidFill>
+                <a:srgbClr val="0070C0"/>
+              </a:solidFill>
+              <a:tailEnd type="arrow"/>
+            </a:ln>
+          </p:spPr>
+          <p:style>
+            <a:lnRef idx="1">
+              <a:schemeClr val="accent1"/>
+            </a:lnRef>
+            <a:fillRef idx="0">
+              <a:schemeClr val="accent1"/>
+            </a:fillRef>
+            <a:effectRef idx="0">
+              <a:schemeClr val="accent1"/>
+            </a:effectRef>
+            <a:fontRef idx="minor">
+              <a:schemeClr val="tx1"/>
+            </a:fontRef>
+          </p:style>
+        </p:cxnSp>
+        <p:sp>
+          <p:nvSpPr>
+            <p:cNvPr id="29" name="TextBox 28"/>
+            <p:cNvSpPr txBox="1"/>
+            <p:nvPr/>
+          </p:nvSpPr>
+          <p:spPr>
+            <a:xfrm>
+              <a:off x="3243421" y="2484071"/>
+              <a:ext cx="855809" cy="215444"/>
+            </a:xfrm>
+            <a:prstGeom prst="rect">
+              <a:avLst/>
+            </a:prstGeom>
+            <a:noFill/>
+          </p:spPr>
+          <p:txBody>
+            <a:bodyPr wrap="square" lIns="0" tIns="0" rIns="0" bIns="0" rtlCol="0">
+              <a:spAutoFit/>
+            </a:bodyPr>
+            <a:lstStyle>
+              <a:defPPr>
+                <a:defRPr lang="en-US"/>
+              </a:defPPr>
+              <a:lvl1pPr algn="r">
+                <a:defRPr sz="1400">
+                  <a:solidFill>
+                    <a:srgbClr val="0070C0"/>
+                  </a:solidFill>
+                </a:defRPr>
+              </a:lvl1pPr>
+            </a:lstStyle>
+            <a:p>
+              <a:r>
+                <a:rPr lang="en-US" dirty="0"/>
+                <a:t>execute()</a:t>
+              </a:r>
+            </a:p>
+          </p:txBody>
+        </p:sp>
+        <p:cxnSp>
+          <p:nvCxnSpPr>
+            <p:cNvPr id="34" name="Straight Arrow Connector 33"/>
+            <p:cNvCxnSpPr/>
+            <p:nvPr/>
+          </p:nvCxnSpPr>
+          <p:spPr>
+            <a:xfrm>
+              <a:off x="4109108" y="1878232"/>
+              <a:ext cx="1492974" cy="0"/>
+            </a:xfrm>
+            <a:prstGeom prst="straightConnector1">
+              <a:avLst/>
+            </a:prstGeom>
+            <a:ln w="19050">
+              <a:solidFill>
+                <a:srgbClr val="0070C0"/>
+              </a:solidFill>
+              <a:prstDash val="sysDash"/>
+              <a:headEnd type="arrow" w="med" len="med"/>
+              <a:tailEnd type="none" w="med" len="med"/>
+            </a:ln>
+          </p:spPr>
+          <p:style>
+            <a:lnRef idx="1">
+              <a:schemeClr val="accent1"/>
+            </a:lnRef>
+            <a:fillRef idx="0">
+              <a:schemeClr val="accent1"/>
+            </a:fillRef>
+            <a:effectRef idx="0">
+              <a:schemeClr val="accent1"/>
+            </a:effectRef>
+            <a:fontRef idx="minor">
+              <a:schemeClr val="tx1"/>
+            </a:fontRef>
+          </p:style>
+        </p:cxnSp>
+        <p:cxnSp>
+          <p:nvCxnSpPr>
+            <p:cNvPr id="35" name="Straight Arrow Connector 34"/>
+            <p:cNvCxnSpPr>
+              <a:cxnSpLocks/>
+            </p:cNvCxnSpPr>
+            <p:nvPr/>
+          </p:nvCxnSpPr>
+          <p:spPr>
+            <a:xfrm>
+              <a:off x="1691351" y="2133600"/>
+              <a:ext cx="2348067" cy="0"/>
+            </a:xfrm>
+            <a:prstGeom prst="straightConnector1">
+              <a:avLst/>
+            </a:prstGeom>
+            <a:ln w="19050">
+              <a:solidFill>
+                <a:srgbClr val="0070C0"/>
+              </a:solidFill>
+              <a:prstDash val="sysDash"/>
+              <a:headEnd type="arrow" w="med" len="med"/>
+              <a:tailEnd type="none" w="med" len="med"/>
+            </a:ln>
+          </p:spPr>
+          <p:style>
+            <a:lnRef idx="1">
+              <a:schemeClr val="accent1"/>
+            </a:lnRef>
+            <a:fillRef idx="0">
+              <a:schemeClr val="accent1"/>
+            </a:fillRef>
+            <a:effectRef idx="0">
+              <a:schemeClr val="accent1"/>
+            </a:effectRef>
+            <a:fontRef idx="minor">
+              <a:schemeClr val="tx1"/>
+            </a:fontRef>
+          </p:style>
+        </p:cxnSp>
+        <p:cxnSp>
+          <p:nvCxnSpPr>
+            <p:cNvPr id="37" name="Straight Arrow Connector 36"/>
+            <p:cNvCxnSpPr/>
+            <p:nvPr/>
+          </p:nvCxnSpPr>
+          <p:spPr>
+            <a:xfrm>
+              <a:off x="380999" y="4191000"/>
+              <a:ext cx="1196051" cy="0"/>
+            </a:xfrm>
+            <a:prstGeom prst="straightConnector1">
+              <a:avLst/>
+            </a:prstGeom>
+            <a:ln w="19050">
+              <a:solidFill>
+                <a:schemeClr val="accent1"/>
+              </a:solidFill>
+              <a:prstDash val="sysDash"/>
+              <a:headEnd type="arrow" w="med" len="med"/>
+              <a:tailEnd type="none" w="med" len="med"/>
+            </a:ln>
+          </p:spPr>
+          <p:style>
+            <a:lnRef idx="1">
+              <a:schemeClr val="accent1"/>
+            </a:lnRef>
+            <a:fillRef idx="0">
+              <a:schemeClr val="accent1"/>
+            </a:fillRef>
+            <a:effectRef idx="0">
+              <a:schemeClr val="accent1"/>
+            </a:effectRef>
+            <a:fontRef idx="minor">
+              <a:schemeClr val="tx1"/>
+            </a:fontRef>
+          </p:style>
+        </p:cxnSp>
+        <p:sp>
+          <p:nvSpPr>
+            <p:cNvPr id="65" name="Rectangle 64"/>
+            <p:cNvSpPr/>
+            <p:nvPr/>
+          </p:nvSpPr>
+          <p:spPr>
+            <a:xfrm>
+              <a:off x="5526488" y="2731313"/>
+              <a:ext cx="161322" cy="1307285"/>
+            </a:xfrm>
+            <a:prstGeom prst="rect">
+              <a:avLst/>
+            </a:prstGeom>
+            <a:solidFill>
+              <a:srgbClr val="0070C0"/>
+            </a:solidFill>
+            <a:ln>
+              <a:solidFill>
+                <a:srgbClr val="0070C0"/>
+              </a:solidFill>
+            </a:ln>
+            <a:effectLst/>
+          </p:spPr>
+          <p:style>
+            <a:lnRef idx="1">
+              <a:schemeClr val="accent3"/>
+            </a:lnRef>
+            <a:fillRef idx="2">
+              <a:schemeClr val="accent3"/>
+            </a:fillRef>
+            <a:effectRef idx="1">
+              <a:schemeClr val="accent3"/>
+            </a:effectRef>
+            <a:fontRef idx="minor">
+              <a:schemeClr val="dk1"/>
+            </a:fontRef>
+          </p:style>
+          <p:txBody>
+            <a:bodyPr rtlCol="0" anchor="ctr"/>
+            <a:lstStyle/>
+            <a:p>
+              <a:pPr algn="ctr"/>
+              <a:endParaRPr lang="en-SG" sz="1400"/>
+            </a:p>
+          </p:txBody>
+        </p:sp>
+        <p:sp>
+          <p:nvSpPr>
+            <p:cNvPr id="79" name="TextBox 78"/>
+            <p:cNvSpPr txBox="1"/>
+            <p:nvPr/>
+          </p:nvSpPr>
+          <p:spPr>
+            <a:xfrm>
+              <a:off x="6194514" y="2748246"/>
+              <a:ext cx="755111" cy="184666"/>
+            </a:xfrm>
+            <a:prstGeom prst="rect">
+              <a:avLst/>
+            </a:prstGeom>
+            <a:noFill/>
+          </p:spPr>
+          <p:txBody>
+            <a:bodyPr wrap="square" lIns="0" tIns="0" rIns="0" bIns="0" rtlCol="0">
+              <a:spAutoFit/>
+            </a:bodyPr>
+            <a:lstStyle>
+              <a:defPPr>
+                <a:defRPr lang="en-US"/>
+              </a:defPPr>
+              <a:lvl1pPr algn="r">
+                <a:defRPr sz="1400">
+                  <a:solidFill>
+                    <a:srgbClr val="0070C0"/>
+                  </a:solidFill>
+                </a:defRPr>
+              </a:lvl1pPr>
+            </a:lstStyle>
+            <a:p>
+              <a:r>
+                <a:rPr lang="en-US" sz="1200" dirty="0" err="1">
+                  <a:solidFill>
+                    <a:schemeClr val="accent4">
+                      <a:lumMod val="75000"/>
+                    </a:schemeClr>
+                  </a:solidFill>
+                </a:rPr>
+                <a:t>addEvent</a:t>
+              </a:r>
+              <a:r>
+                <a:rPr lang="en-US" sz="1200" dirty="0">
+                  <a:solidFill>
+                    <a:srgbClr val="7030A0"/>
+                  </a:solidFill>
+                </a:rPr>
+                <a:t>()</a:t>
+              </a:r>
+              <a:endParaRPr lang="en-US" sz="1200" dirty="0"/>
+            </a:p>
+          </p:txBody>
+        </p:sp>
+        <p:sp>
+          <p:nvSpPr>
+            <p:cNvPr id="80" name="TextBox 79"/>
+            <p:cNvSpPr txBox="1"/>
+            <p:nvPr/>
+          </p:nvSpPr>
+          <p:spPr>
+            <a:xfrm>
+              <a:off x="1622129" y="1106152"/>
+              <a:ext cx="2271840" cy="215444"/>
+            </a:xfrm>
+            <a:prstGeom prst="rect">
+              <a:avLst/>
+            </a:prstGeom>
+            <a:noFill/>
+          </p:spPr>
+          <p:txBody>
+            <a:bodyPr wrap="square" lIns="0" tIns="0" rIns="0" bIns="0" rtlCol="0">
+              <a:spAutoFit/>
+            </a:bodyPr>
+            <a:lstStyle>
+              <a:defPPr>
+                <a:defRPr lang="en-US"/>
+              </a:defPPr>
+              <a:lvl1pPr algn="r">
+                <a:defRPr sz="1400">
+                  <a:solidFill>
+                    <a:srgbClr val="0070C0"/>
+                  </a:solidFill>
+                </a:defRPr>
+              </a:lvl1pPr>
+            </a:lstStyle>
+            <a:p>
+              <a:r>
+                <a:rPr lang="en-US" dirty="0" err="1"/>
+                <a:t>parseCommand</a:t>
+              </a:r>
+              <a:r>
+                <a:rPr lang="en-US" dirty="0"/>
+                <a:t>(“</a:t>
+              </a:r>
+              <a:r>
+                <a:rPr lang="en-US" dirty="0" err="1"/>
+                <a:t>add_event</a:t>
+              </a:r>
+              <a:r>
+                <a:rPr lang="en-US" dirty="0"/>
+                <a:t>”)</a:t>
+              </a:r>
+            </a:p>
+          </p:txBody>
+        </p:sp>
+        <p:sp>
+          <p:nvSpPr>
+            <p:cNvPr id="82" name="TextBox 81"/>
+            <p:cNvSpPr txBox="1"/>
+            <p:nvPr/>
+          </p:nvSpPr>
+          <p:spPr>
+            <a:xfrm>
+              <a:off x="3272755" y="3791076"/>
+              <a:ext cx="621216" cy="215444"/>
+            </a:xfrm>
+            <a:prstGeom prst="rect">
+              <a:avLst/>
+            </a:prstGeom>
+            <a:noFill/>
+          </p:spPr>
+          <p:txBody>
+            <a:bodyPr wrap="square" lIns="0" tIns="0" rIns="0" bIns="0" rtlCol="0">
+              <a:spAutoFit/>
+            </a:bodyPr>
+            <a:lstStyle>
+              <a:defPPr>
+                <a:defRPr lang="en-US"/>
+              </a:defPPr>
+              <a:lvl1pPr algn="r">
+                <a:defRPr sz="1400">
+                  <a:solidFill>
+                    <a:srgbClr val="0070C0"/>
+                  </a:solidFill>
+                </a:defRPr>
+              </a:lvl1pPr>
+            </a:lstStyle>
+            <a:p>
+              <a:r>
+                <a:rPr lang="en-US" dirty="0"/>
+                <a:t>result</a:t>
+              </a:r>
+            </a:p>
+          </p:txBody>
+        </p:sp>
+        <p:sp>
+          <p:nvSpPr>
+            <p:cNvPr id="83" name="TextBox 82"/>
+            <p:cNvSpPr txBox="1"/>
+            <p:nvPr/>
+          </p:nvSpPr>
+          <p:spPr>
+            <a:xfrm>
+              <a:off x="645270" y="3945901"/>
+              <a:ext cx="762000" cy="215444"/>
+            </a:xfrm>
+            <a:prstGeom prst="rect">
+              <a:avLst/>
+            </a:prstGeom>
+            <a:noFill/>
+          </p:spPr>
+          <p:txBody>
+            <a:bodyPr wrap="square" lIns="0" tIns="0" rIns="0" bIns="0" rtlCol="0">
+              <a:spAutoFit/>
+            </a:bodyPr>
+            <a:lstStyle>
+              <a:defPPr>
+                <a:defRPr lang="en-US"/>
+              </a:defPPr>
+              <a:lvl1pPr algn="r">
+                <a:defRPr sz="1400">
+                  <a:solidFill>
+                    <a:srgbClr val="0070C0"/>
+                  </a:solidFill>
+                </a:defRPr>
+              </a:lvl1pPr>
+            </a:lstStyle>
+            <a:p>
+              <a:r>
+                <a:rPr lang="en-US" dirty="0"/>
+                <a:t>result</a:t>
+              </a:r>
+            </a:p>
+          </p:txBody>
+        </p:sp>
+        <p:sp>
+          <p:nvSpPr>
+            <p:cNvPr id="84" name="Rectangle 62"/>
+            <p:cNvSpPr/>
+            <p:nvPr/>
+          </p:nvSpPr>
+          <p:spPr>
+            <a:xfrm>
+              <a:off x="7497155" y="2568606"/>
+              <a:ext cx="2181777" cy="335427"/>
+            </a:xfrm>
+            <a:prstGeom prst="rect">
+              <a:avLst/>
+            </a:prstGeom>
+            <a:solidFill>
+              <a:srgbClr val="7030A0"/>
+            </a:solidFill>
+            <a:ln w="19050">
               <a:solidFill>
                 <a:srgbClr val="7030A0"/>
               </a:solidFill>
-            </a:endParaRPr>
-          </a:p>
-        </p:txBody>
-      </p:sp>
-      <p:sp>
-        <p:nvSpPr>
-          <p:cNvPr id="81" name="Rectangle 65"/>
-          <p:cNvSpPr/>
-          <p:nvPr/>
-        </p:nvSpPr>
-        <p:spPr>
-          <a:xfrm>
-            <a:off x="467813" y="119475"/>
-            <a:ext cx="5863964" cy="4343400"/>
-          </a:xfrm>
-          <a:prstGeom prst="roundRect">
-            <a:avLst>
-              <a:gd name="adj" fmla="val 3484"/>
-            </a:avLst>
-          </a:prstGeom>
-          <a:solidFill>
-            <a:schemeClr val="accent1">
-              <a:lumMod val="20000"/>
-              <a:lumOff val="80000"/>
-            </a:schemeClr>
-          </a:solidFill>
-          <a:ln w="19050">
+            </a:ln>
+            <a:effectLst/>
+          </p:spPr>
+          <p:style>
+            <a:lnRef idx="1">
+              <a:schemeClr val="accent2"/>
+            </a:lnRef>
+            <a:fillRef idx="2">
+              <a:schemeClr val="accent2"/>
+            </a:fillRef>
+            <a:effectRef idx="1">
+              <a:schemeClr val="accent2"/>
+            </a:effectRef>
+            <a:fontRef idx="minor">
+              <a:schemeClr val="dk1"/>
+            </a:fontRef>
+          </p:style>
+          <p:txBody>
+            <a:bodyPr rtlCol="0" anchor="ctr"/>
+            <a:lstStyle/>
+            <a:p>
+              <a:pPr algn="ctr"/>
+              <a:r>
+                <a:rPr lang="en-US" sz="1600" dirty="0">
+                  <a:solidFill>
+                    <a:schemeClr val="bg1"/>
+                  </a:solidFill>
+                </a:rPr>
+                <a:t>:</a:t>
+              </a:r>
+              <a:r>
+                <a:rPr lang="en-US" sz="1600" dirty="0" err="1">
+                  <a:solidFill>
+                    <a:schemeClr val="bg1"/>
+                  </a:solidFill>
+                </a:rPr>
+                <a:t>VersionedAddressBook</a:t>
+              </a:r>
+              <a:endParaRPr lang="en-SG" sz="1600" dirty="0">
+                <a:solidFill>
+                  <a:schemeClr val="bg1"/>
+                </a:solidFill>
+              </a:endParaRPr>
+            </a:p>
+          </p:txBody>
+        </p:sp>
+        <p:sp>
+          <p:nvSpPr>
+            <p:cNvPr id="86" name="Rectangle 85"/>
+            <p:cNvSpPr/>
+            <p:nvPr/>
+          </p:nvSpPr>
+          <p:spPr>
+            <a:xfrm>
+              <a:off x="8514207" y="3182840"/>
+              <a:ext cx="129933" cy="398562"/>
+            </a:xfrm>
+            <a:prstGeom prst="rect">
+              <a:avLst/>
+            </a:prstGeom>
+            <a:solidFill>
+              <a:srgbClr val="7030A0"/>
+            </a:solidFill>
+            <a:ln>
+              <a:solidFill>
+                <a:srgbClr val="7030A0"/>
+              </a:solidFill>
+            </a:ln>
+            <a:effectLst/>
+          </p:spPr>
+          <p:style>
+            <a:lnRef idx="1">
+              <a:schemeClr val="accent3"/>
+            </a:lnRef>
+            <a:fillRef idx="2">
+              <a:schemeClr val="accent3"/>
+            </a:fillRef>
+            <a:effectRef idx="1">
+              <a:schemeClr val="accent3"/>
+            </a:effectRef>
+            <a:fontRef idx="minor">
+              <a:schemeClr val="dk1"/>
+            </a:fontRef>
+          </p:style>
+          <p:txBody>
+            <a:bodyPr rtlCol="0" anchor="ctr"/>
+            <a:lstStyle/>
+            <a:p>
+              <a:pPr algn="ctr"/>
+              <a:endParaRPr lang="en-SG" sz="1400"/>
+            </a:p>
+          </p:txBody>
+        </p:sp>
+        <p:sp>
+          <p:nvSpPr>
+            <p:cNvPr id="93" name="TextBox 92"/>
+            <p:cNvSpPr txBox="1"/>
+            <p:nvPr/>
+          </p:nvSpPr>
+          <p:spPr>
+            <a:xfrm>
+              <a:off x="2724792" y="1905793"/>
+              <a:ext cx="220343" cy="215444"/>
+            </a:xfrm>
+            <a:prstGeom prst="rect">
+              <a:avLst/>
+            </a:prstGeom>
             <a:noFill/>
-          </a:ln>
-          <a:effectLst/>
-        </p:spPr>
-        <p:style>
-          <a:lnRef idx="1">
-            <a:schemeClr val="accent2"/>
-          </a:lnRef>
-          <a:fillRef idx="2">
-            <a:schemeClr val="accent2"/>
-          </a:fillRef>
-          <a:effectRef idx="1">
-            <a:schemeClr val="accent2"/>
-          </a:effectRef>
-          <a:fontRef idx="minor">
-            <a:schemeClr val="dk1"/>
-          </a:fontRef>
-        </p:style>
-        <p:txBody>
-          <a:bodyPr rtlCol="0" anchor="t"/>
-          <a:lstStyle/>
-          <a:p>
-            <a:r>
-              <a:rPr lang="en-US" sz="1200" b="1" dirty="0">
+          </p:spPr>
+          <p:txBody>
+            <a:bodyPr wrap="square" lIns="0" tIns="0" rIns="0" bIns="0" rtlCol="0">
+              <a:spAutoFit/>
+            </a:bodyPr>
+            <a:lstStyle>
+              <a:defPPr>
+                <a:defRPr lang="en-US"/>
+              </a:defPPr>
+              <a:lvl1pPr algn="r">
+                <a:defRPr sz="1400">
+                  <a:solidFill>
+                    <a:srgbClr val="0070C0"/>
+                  </a:solidFill>
+                </a:defRPr>
+              </a:lvl1pPr>
+            </a:lstStyle>
+            <a:p>
+              <a:r>
+                <a:rPr lang="en-US" dirty="0"/>
+                <a:t>a</a:t>
+              </a:r>
+            </a:p>
+          </p:txBody>
+        </p:sp>
+        <p:sp>
+          <p:nvSpPr>
+            <p:cNvPr id="40" name="Rectangle 62"/>
+            <p:cNvSpPr/>
+            <p:nvPr/>
+          </p:nvSpPr>
+          <p:spPr>
+            <a:xfrm>
+              <a:off x="6549765" y="2362200"/>
+              <a:ext cx="841636" cy="300180"/>
+            </a:xfrm>
+            <a:prstGeom prst="rect">
+              <a:avLst/>
+            </a:prstGeom>
+            <a:solidFill>
+              <a:srgbClr val="7030A0"/>
+            </a:solidFill>
+            <a:ln w="19050">
+              <a:solidFill>
+                <a:srgbClr val="7030A0"/>
+              </a:solidFill>
+            </a:ln>
+            <a:effectLst/>
+          </p:spPr>
+          <p:style>
+            <a:lnRef idx="1">
+              <a:schemeClr val="accent2"/>
+            </a:lnRef>
+            <a:fillRef idx="2">
+              <a:schemeClr val="accent2"/>
+            </a:fillRef>
+            <a:effectRef idx="1">
+              <a:schemeClr val="accent2"/>
+            </a:effectRef>
+            <a:fontRef idx="minor">
+              <a:schemeClr val="dk1"/>
+            </a:fontRef>
+          </p:style>
+          <p:txBody>
+            <a:bodyPr rtlCol="0" anchor="ctr"/>
+            <a:lstStyle/>
+            <a:p>
+              <a:pPr algn="ctr"/>
+              <a:r>
+                <a:rPr lang="en-US" sz="1600" dirty="0">
+                  <a:solidFill>
+                    <a:schemeClr val="bg1"/>
+                  </a:solidFill>
+                </a:rPr>
+                <a:t>: Model</a:t>
+              </a:r>
+              <a:endParaRPr lang="en-SG" sz="1600" dirty="0">
                 <a:solidFill>
-                  <a:srgbClr val="0070C0"/>
+                  <a:schemeClr val="bg1"/>
                 </a:solidFill>
-              </a:rPr>
-              <a:t>Logic</a:t>
-            </a:r>
-            <a:endParaRPr lang="en-SG" sz="1200" b="1" dirty="0">
+              </a:endParaRPr>
+            </a:p>
+          </p:txBody>
+        </p:sp>
+        <p:cxnSp>
+          <p:nvCxnSpPr>
+            <p:cNvPr id="46" name="Straight Connector 45"/>
+            <p:cNvCxnSpPr>
+              <a:cxnSpLocks/>
+            </p:cNvCxnSpPr>
+            <p:nvPr/>
+          </p:nvCxnSpPr>
+          <p:spPr>
+            <a:xfrm flipH="1">
+              <a:off x="6986491" y="2653306"/>
+              <a:ext cx="3959" cy="1735710"/>
+            </a:xfrm>
+            <a:prstGeom prst="line">
+              <a:avLst/>
+            </a:prstGeom>
+            <a:ln w="19050">
+              <a:solidFill>
+                <a:srgbClr val="7030A0"/>
+              </a:solidFill>
+              <a:prstDash val="sysDash"/>
+            </a:ln>
+            <a:effectLst/>
+          </p:spPr>
+          <p:style>
+            <a:lnRef idx="1">
+              <a:schemeClr val="accent1"/>
+            </a:lnRef>
+            <a:fillRef idx="2">
+              <a:schemeClr val="accent1"/>
+            </a:fillRef>
+            <a:effectRef idx="1">
+              <a:schemeClr val="accent1"/>
+            </a:effectRef>
+            <a:fontRef idx="minor">
+              <a:schemeClr val="dk1"/>
+            </a:fontRef>
+          </p:style>
+        </p:cxnSp>
+        <p:sp>
+          <p:nvSpPr>
+            <p:cNvPr id="49" name="Rectangle 48"/>
+            <p:cNvSpPr/>
+            <p:nvPr/>
+          </p:nvSpPr>
+          <p:spPr>
+            <a:xfrm>
+              <a:off x="6887527" y="2958106"/>
+              <a:ext cx="168896" cy="775693"/>
+            </a:xfrm>
+            <a:prstGeom prst="rect">
+              <a:avLst/>
+            </a:prstGeom>
+            <a:solidFill>
+              <a:srgbClr val="7030A0"/>
+            </a:solidFill>
+            <a:ln>
+              <a:solidFill>
+                <a:srgbClr val="7030A0"/>
+              </a:solidFill>
+            </a:ln>
+            <a:effectLst/>
+          </p:spPr>
+          <p:style>
+            <a:lnRef idx="1">
+              <a:schemeClr val="accent3"/>
+            </a:lnRef>
+            <a:fillRef idx="2">
+              <a:schemeClr val="accent3"/>
+            </a:fillRef>
+            <a:effectRef idx="1">
+              <a:schemeClr val="accent3"/>
+            </a:effectRef>
+            <a:fontRef idx="minor">
+              <a:schemeClr val="dk1"/>
+            </a:fontRef>
+          </p:style>
+          <p:txBody>
+            <a:bodyPr rtlCol="0" anchor="ctr"/>
+            <a:lstStyle/>
+            <a:p>
+              <a:pPr algn="ctr"/>
+              <a:endParaRPr lang="en-SG" sz="1400"/>
+            </a:p>
+          </p:txBody>
+        </p:sp>
+        <p:cxnSp>
+          <p:nvCxnSpPr>
+            <p:cNvPr id="50" name="Straight Arrow Connector 49"/>
+            <p:cNvCxnSpPr>
+              <a:cxnSpLocks/>
+            </p:cNvCxnSpPr>
+            <p:nvPr/>
+          </p:nvCxnSpPr>
+          <p:spPr>
+            <a:xfrm>
+              <a:off x="5685755" y="2975344"/>
+              <a:ext cx="1210345" cy="0"/>
+            </a:xfrm>
+            <a:prstGeom prst="straightConnector1">
+              <a:avLst/>
+            </a:prstGeom>
+            <a:ln w="19050">
               <a:solidFill>
                 <a:srgbClr val="0070C0"/>
               </a:solidFill>
-            </a:endParaRPr>
-          </a:p>
-        </p:txBody>
-      </p:sp>
-      <p:sp>
-        <p:nvSpPr>
-          <p:cNvPr id="2" name="Rectangle 62"/>
-          <p:cNvSpPr/>
-          <p:nvPr/>
-        </p:nvSpPr>
-        <p:spPr>
-          <a:xfrm>
-            <a:off x="883145" y="543946"/>
-            <a:ext cx="1455629" cy="346760"/>
-          </a:xfrm>
-          <a:prstGeom prst="rect">
-            <a:avLst/>
-          </a:prstGeom>
-          <a:solidFill>
-            <a:srgbClr val="0070C0"/>
-          </a:solidFill>
-          <a:ln w="19050">
+              <a:tailEnd type="arrow"/>
+            </a:ln>
+          </p:spPr>
+          <p:style>
+            <a:lnRef idx="1">
+              <a:schemeClr val="accent1"/>
+            </a:lnRef>
+            <a:fillRef idx="0">
+              <a:schemeClr val="accent1"/>
+            </a:fillRef>
+            <a:effectRef idx="0">
+              <a:schemeClr val="accent1"/>
+            </a:effectRef>
+            <a:fontRef idx="minor">
+              <a:schemeClr val="tx1"/>
+            </a:fontRef>
+          </p:style>
+        </p:cxnSp>
+        <p:sp>
+          <p:nvSpPr>
+            <p:cNvPr id="4" name="TextBox 3"/>
+            <p:cNvSpPr txBox="1"/>
+            <p:nvPr/>
+          </p:nvSpPr>
+          <p:spPr>
+            <a:xfrm>
+              <a:off x="5472880" y="4258211"/>
+              <a:ext cx="258404" cy="261610"/>
+            </a:xfrm>
+            <a:prstGeom prst="rect">
+              <a:avLst/>
+            </a:prstGeom>
+            <a:noFill/>
+          </p:spPr>
+          <p:txBody>
+            <a:bodyPr wrap="none" rtlCol="0">
+              <a:spAutoFit/>
+            </a:bodyPr>
+            <a:lstStyle/>
+            <a:p>
+              <a:r>
+                <a:rPr lang="en-SG" sz="1100" dirty="0">
+                  <a:solidFill>
+                    <a:srgbClr val="002060"/>
+                  </a:solidFill>
+                </a:rPr>
+                <a:t>X</a:t>
+              </a:r>
+            </a:p>
+          </p:txBody>
+        </p:sp>
+        <p:sp>
+          <p:nvSpPr>
+            <p:cNvPr id="19" name="Rectangle 62"/>
+            <p:cNvSpPr/>
+            <p:nvPr/>
+          </p:nvSpPr>
+          <p:spPr>
+            <a:xfrm>
+              <a:off x="5035976" y="1260268"/>
+              <a:ext cx="1216200" cy="459665"/>
+            </a:xfrm>
+            <a:prstGeom prst="rect">
+              <a:avLst/>
+            </a:prstGeom>
             <a:solidFill>
               <a:srgbClr val="0070C0"/>
             </a:solidFill>
-          </a:ln>
-          <a:effectLst/>
-        </p:spPr>
-        <p:style>
-          <a:lnRef idx="1">
-            <a:schemeClr val="accent2"/>
-          </a:lnRef>
-          <a:fillRef idx="2">
-            <a:schemeClr val="accent2"/>
-          </a:fillRef>
-          <a:effectRef idx="1">
-            <a:schemeClr val="accent2"/>
-          </a:effectRef>
-          <a:fontRef idx="minor">
-            <a:schemeClr val="dk1"/>
-          </a:fontRef>
-        </p:style>
-        <p:txBody>
-          <a:bodyPr rtlCol="0" anchor="ctr"/>
-          <a:lstStyle/>
-          <a:p>
-            <a:pPr algn="ctr"/>
-            <a:r>
-              <a:rPr lang="en-US" sz="1600" dirty="0">
+            <a:ln w="19050">
+              <a:solidFill>
+                <a:srgbClr val="0070C0"/>
+              </a:solidFill>
+            </a:ln>
+            <a:effectLst/>
+          </p:spPr>
+          <p:style>
+            <a:lnRef idx="1">
+              <a:schemeClr val="accent2"/>
+            </a:lnRef>
+            <a:fillRef idx="2">
+              <a:schemeClr val="accent2"/>
+            </a:fillRef>
+            <a:effectRef idx="1">
+              <a:schemeClr val="accent2"/>
+            </a:effectRef>
+            <a:fontRef idx="minor">
+              <a:schemeClr val="dk1"/>
+            </a:fontRef>
+          </p:style>
+          <p:txBody>
+            <a:bodyPr rtlCol="0" anchor="ctr"/>
+            <a:lstStyle/>
+            <a:p>
+              <a:pPr algn="ctr"/>
+              <a:r>
+                <a:rPr lang="en-US" sz="1600" dirty="0">
+                  <a:solidFill>
+                    <a:schemeClr val="bg1"/>
+                  </a:solidFill>
+                </a:rPr>
+                <a:t>a:AddEvent</a:t>
+              </a:r>
+              <a:br>
+                <a:rPr lang="en-US" sz="1600" dirty="0">
+                  <a:solidFill>
+                    <a:schemeClr val="bg1"/>
+                  </a:solidFill>
+                </a:rPr>
+              </a:br>
+              <a:r>
+                <a:rPr lang="en-US" sz="1600" dirty="0">
+                  <a:solidFill>
+                    <a:schemeClr val="bg1"/>
+                  </a:solidFill>
+                </a:rPr>
+                <a:t>Command</a:t>
+              </a:r>
+              <a:endParaRPr lang="en-SG" sz="1600" dirty="0">
                 <a:solidFill>
                   <a:schemeClr val="bg1"/>
                 </a:solidFill>
-              </a:rPr>
-              <a:t>:</a:t>
-            </a:r>
-            <a:r>
-              <a:rPr lang="en-US" sz="1600" dirty="0" err="1">
-                <a:solidFill>
-                  <a:schemeClr val="bg1"/>
-                </a:solidFill>
-              </a:rPr>
-              <a:t>LogicManager</a:t>
-            </a:r>
-            <a:endParaRPr lang="en-SG" sz="1600" dirty="0">
+              </a:endParaRPr>
+            </a:p>
+          </p:txBody>
+        </p:sp>
+        <p:cxnSp>
+          <p:nvCxnSpPr>
+            <p:cNvPr id="66" name="Straight Arrow Connector 65">
+              <a:extLst>
+                <a:ext uri="{FF2B5EF4-FFF2-40B4-BE49-F238E27FC236}">
+                  <a16:creationId xmlns:a16="http://schemas.microsoft.com/office/drawing/2014/main" id="{39916E2E-195A-4DC8-B025-B05FA87E6796}"/>
+                </a:ext>
+              </a:extLst>
+            </p:cNvPr>
+            <p:cNvCxnSpPr>
+              <a:cxnSpLocks/>
+            </p:cNvCxnSpPr>
+            <p:nvPr/>
+          </p:nvCxnSpPr>
+          <p:spPr>
+            <a:xfrm>
+              <a:off x="1691351" y="2731314"/>
+              <a:ext cx="3832164" cy="1"/>
+            </a:xfrm>
+            <a:prstGeom prst="straightConnector1">
+              <a:avLst/>
+            </a:prstGeom>
+            <a:ln w="19050">
               <a:solidFill>
-                <a:schemeClr val="bg1"/>
+                <a:srgbClr val="0070C0"/>
               </a:solidFill>
-            </a:endParaRPr>
-          </a:p>
-        </p:txBody>
-      </p:sp>
-      <p:cxnSp>
-        <p:nvCxnSpPr>
-          <p:cNvPr id="5" name="Straight Connector 4"/>
-          <p:cNvCxnSpPr>
-            <a:cxnSpLocks/>
-          </p:cNvCxnSpPr>
-          <p:nvPr/>
-        </p:nvCxnSpPr>
-        <p:spPr>
-          <a:xfrm>
-            <a:off x="1610959" y="907617"/>
-            <a:ext cx="0" cy="3481399"/>
-          </a:xfrm>
-          <a:prstGeom prst="line">
-            <a:avLst/>
-          </a:prstGeom>
-          <a:ln w="19050">
-            <a:solidFill>
-              <a:srgbClr val="0070C0"/>
-            </a:solidFill>
-            <a:prstDash val="sysDash"/>
-          </a:ln>
-          <a:effectLst/>
-        </p:spPr>
-        <p:style>
-          <a:lnRef idx="1">
-            <a:schemeClr val="accent1"/>
-          </a:lnRef>
-          <a:fillRef idx="2">
-            <a:schemeClr val="accent1"/>
-          </a:fillRef>
-          <a:effectRef idx="1">
-            <a:schemeClr val="accent1"/>
-          </a:effectRef>
-          <a:fontRef idx="minor">
-            <a:schemeClr val="dk1"/>
-          </a:fontRef>
-        </p:style>
-      </p:cxnSp>
-      <p:sp>
-        <p:nvSpPr>
-          <p:cNvPr id="6" name="Rectangle 5"/>
-          <p:cNvSpPr/>
-          <p:nvPr/>
-        </p:nvSpPr>
-        <p:spPr>
-          <a:xfrm>
-            <a:off x="1538951" y="1258311"/>
-            <a:ext cx="152400" cy="2932689"/>
-          </a:xfrm>
-          <a:prstGeom prst="rect">
-            <a:avLst/>
-          </a:prstGeom>
-          <a:solidFill>
-            <a:srgbClr val="0070C0"/>
-          </a:solidFill>
-          <a:ln>
-            <a:solidFill>
-              <a:srgbClr val="0070C0"/>
-            </a:solidFill>
-          </a:ln>
-          <a:effectLst/>
-        </p:spPr>
-        <p:style>
-          <a:lnRef idx="1">
-            <a:schemeClr val="accent3"/>
-          </a:lnRef>
-          <a:fillRef idx="2">
-            <a:schemeClr val="accent3"/>
-          </a:fillRef>
-          <a:effectRef idx="1">
-            <a:schemeClr val="accent3"/>
-          </a:effectRef>
-          <a:fontRef idx="minor">
-            <a:schemeClr val="dk1"/>
-          </a:fontRef>
-        </p:style>
-        <p:txBody>
-          <a:bodyPr rtlCol="0" anchor="ctr"/>
-          <a:lstStyle/>
-          <a:p>
-            <a:pPr algn="ctr"/>
-            <a:endParaRPr lang="en-SG" sz="1400"/>
-          </a:p>
-        </p:txBody>
-      </p:sp>
-      <p:sp>
-        <p:nvSpPr>
-          <p:cNvPr id="16" name="Rectangle 62"/>
-          <p:cNvSpPr/>
-          <p:nvPr/>
-        </p:nvSpPr>
-        <p:spPr>
-          <a:xfrm>
-            <a:off x="3437188" y="423022"/>
-            <a:ext cx="1219200" cy="467684"/>
-          </a:xfrm>
-          <a:prstGeom prst="rect">
-            <a:avLst/>
-          </a:prstGeom>
-          <a:solidFill>
-            <a:srgbClr val="0070C0"/>
-          </a:solidFill>
-          <a:ln w="19050">
-            <a:solidFill>
-              <a:srgbClr val="0070C0"/>
-            </a:solidFill>
-          </a:ln>
-          <a:effectLst/>
-        </p:spPr>
-        <p:style>
-          <a:lnRef idx="1">
-            <a:schemeClr val="accent2"/>
-          </a:lnRef>
-          <a:fillRef idx="2">
-            <a:schemeClr val="accent2"/>
-          </a:fillRef>
-          <a:effectRef idx="1">
-            <a:schemeClr val="accent2"/>
-          </a:effectRef>
-          <a:fontRef idx="minor">
-            <a:schemeClr val="dk1"/>
-          </a:fontRef>
-        </p:style>
-        <p:txBody>
-          <a:bodyPr rtlCol="0" anchor="ctr"/>
-          <a:lstStyle/>
-          <a:p>
-            <a:pPr algn="ctr"/>
-            <a:r>
-              <a:rPr lang="en-US" sz="1600" dirty="0">
-                <a:solidFill>
-                  <a:schemeClr val="bg1"/>
-                </a:solidFill>
-              </a:rPr>
-              <a:t>:Address</a:t>
-            </a:r>
-          </a:p>
-          <a:p>
-            <a:pPr algn="ctr"/>
-            <a:r>
-              <a:rPr lang="en-US" sz="1600" dirty="0" err="1">
-                <a:solidFill>
-                  <a:schemeClr val="bg1"/>
-                </a:solidFill>
-              </a:rPr>
-              <a:t>BookParser</a:t>
-            </a:r>
-            <a:endParaRPr lang="en-SG" sz="1600" dirty="0">
+              <a:tailEnd type="arrow"/>
+            </a:ln>
+          </p:spPr>
+          <p:style>
+            <a:lnRef idx="1">
+              <a:schemeClr val="accent1"/>
+            </a:lnRef>
+            <a:fillRef idx="0">
+              <a:schemeClr val="accent1"/>
+            </a:fillRef>
+            <a:effectRef idx="0">
+              <a:schemeClr val="accent1"/>
+            </a:effectRef>
+            <a:fontRef idx="minor">
+              <a:schemeClr val="tx1"/>
+            </a:fontRef>
+          </p:style>
+        </p:cxnSp>
+        <p:cxnSp>
+          <p:nvCxnSpPr>
+            <p:cNvPr id="67" name="Straight Arrow Connector 66">
+              <a:extLst>
+                <a:ext uri="{FF2B5EF4-FFF2-40B4-BE49-F238E27FC236}">
+                  <a16:creationId xmlns:a16="http://schemas.microsoft.com/office/drawing/2014/main" id="{D881596E-177C-4FDC-8E60-CAB90B3D5FAB}"/>
+                </a:ext>
+              </a:extLst>
+            </p:cNvPr>
+            <p:cNvCxnSpPr>
+              <a:cxnSpLocks/>
+            </p:cNvCxnSpPr>
+            <p:nvPr/>
+          </p:nvCxnSpPr>
+          <p:spPr>
+            <a:xfrm>
+              <a:off x="1708245" y="1363918"/>
+              <a:ext cx="2256705" cy="1"/>
+            </a:xfrm>
+            <a:prstGeom prst="straightConnector1">
+              <a:avLst/>
+            </a:prstGeom>
+            <a:ln w="19050">
               <a:solidFill>
-                <a:schemeClr val="bg1"/>
+                <a:srgbClr val="0070C0"/>
               </a:solidFill>
-            </a:endParaRPr>
-          </a:p>
-        </p:txBody>
-      </p:sp>
-      <p:cxnSp>
-        <p:nvCxnSpPr>
-          <p:cNvPr id="17" name="Straight Connector 16"/>
-          <p:cNvCxnSpPr>
-            <a:cxnSpLocks/>
-          </p:cNvCxnSpPr>
-          <p:nvPr/>
-        </p:nvCxnSpPr>
-        <p:spPr>
-          <a:xfrm>
-            <a:off x="4050587" y="907617"/>
-            <a:ext cx="0" cy="1482984"/>
-          </a:xfrm>
-          <a:prstGeom prst="line">
-            <a:avLst/>
-          </a:prstGeom>
-          <a:ln w="19050">
-            <a:solidFill>
-              <a:srgbClr val="0070C0"/>
-            </a:solidFill>
-            <a:prstDash val="sysDash"/>
-          </a:ln>
-          <a:effectLst/>
-        </p:spPr>
-        <p:style>
-          <a:lnRef idx="1">
-            <a:schemeClr val="accent1"/>
-          </a:lnRef>
-          <a:fillRef idx="2">
-            <a:schemeClr val="accent1"/>
-          </a:fillRef>
-          <a:effectRef idx="1">
-            <a:schemeClr val="accent1"/>
-          </a:effectRef>
-          <a:fontRef idx="minor">
-            <a:schemeClr val="dk1"/>
-          </a:fontRef>
-        </p:style>
-      </p:cxnSp>
-      <p:sp>
-        <p:nvSpPr>
-          <p:cNvPr id="18" name="Rectangle 17"/>
-          <p:cNvSpPr/>
-          <p:nvPr/>
-        </p:nvSpPr>
-        <p:spPr>
-          <a:xfrm>
-            <a:off x="3978580" y="1365810"/>
-            <a:ext cx="154408" cy="767790"/>
-          </a:xfrm>
-          <a:prstGeom prst="rect">
-            <a:avLst/>
-          </a:prstGeom>
-          <a:solidFill>
-            <a:srgbClr val="0070C0"/>
-          </a:solidFill>
-          <a:ln>
-            <a:solidFill>
-              <a:srgbClr val="0070C0"/>
-            </a:solidFill>
-          </a:ln>
-          <a:effectLst/>
-        </p:spPr>
-        <p:style>
-          <a:lnRef idx="1">
-            <a:schemeClr val="accent3"/>
-          </a:lnRef>
-          <a:fillRef idx="2">
-            <a:schemeClr val="accent3"/>
-          </a:fillRef>
-          <a:effectRef idx="1">
-            <a:schemeClr val="accent3"/>
-          </a:effectRef>
-          <a:fontRef idx="minor">
-            <a:schemeClr val="dk1"/>
-          </a:fontRef>
-        </p:style>
-        <p:txBody>
-          <a:bodyPr rtlCol="0" anchor="ctr"/>
-          <a:lstStyle/>
-          <a:p>
-            <a:pPr algn="ctr"/>
-            <a:endParaRPr lang="en-SG" sz="1400">
+              <a:tailEnd type="arrow"/>
+            </a:ln>
+          </p:spPr>
+          <p:style>
+            <a:lnRef idx="1">
+              <a:schemeClr val="accent1"/>
+            </a:lnRef>
+            <a:fillRef idx="0">
+              <a:schemeClr val="accent1"/>
+            </a:fillRef>
+            <a:effectRef idx="0">
+              <a:schemeClr val="accent1"/>
+            </a:effectRef>
+            <a:fontRef idx="minor">
+              <a:schemeClr val="tx1"/>
+            </a:fontRef>
+          </p:style>
+        </p:cxnSp>
+        <p:cxnSp>
+          <p:nvCxnSpPr>
+            <p:cNvPr id="69" name="Straight Arrow Connector 68">
+              <a:extLst>
+                <a:ext uri="{FF2B5EF4-FFF2-40B4-BE49-F238E27FC236}">
+                  <a16:creationId xmlns:a16="http://schemas.microsoft.com/office/drawing/2014/main" id="{7C9F21BC-13A9-471F-825A-2621FD36355F}"/>
+                </a:ext>
+              </a:extLst>
+            </p:cNvPr>
+            <p:cNvCxnSpPr>
+              <a:cxnSpLocks/>
+            </p:cNvCxnSpPr>
+            <p:nvPr/>
+          </p:nvCxnSpPr>
+          <p:spPr>
+            <a:xfrm>
+              <a:off x="1691998" y="4036462"/>
+              <a:ext cx="3831517" cy="0"/>
+            </a:xfrm>
+            <a:prstGeom prst="straightConnector1">
+              <a:avLst/>
+            </a:prstGeom>
+            <a:ln w="19050">
               <a:solidFill>
-                <a:schemeClr val="dk1"/>
+                <a:srgbClr val="0070C0"/>
               </a:solidFill>
-            </a:endParaRPr>
-          </a:p>
-        </p:txBody>
-      </p:sp>
-      <p:cxnSp>
-        <p:nvCxnSpPr>
-          <p:cNvPr id="20" name="Straight Connector 19"/>
-          <p:cNvCxnSpPr>
-            <a:cxnSpLocks/>
-            <a:stCxn id="21" idx="0"/>
-            <a:endCxn id="4" idx="0"/>
-          </p:cNvCxnSpPr>
-          <p:nvPr/>
-        </p:nvCxnSpPr>
-        <p:spPr>
-          <a:xfrm>
-            <a:off x="5602082" y="1613633"/>
-            <a:ext cx="0" cy="2644578"/>
-          </a:xfrm>
-          <a:prstGeom prst="line">
-            <a:avLst/>
-          </a:prstGeom>
-          <a:ln w="19050">
-            <a:solidFill>
-              <a:srgbClr val="0070C0"/>
-            </a:solidFill>
-            <a:prstDash val="sysDash"/>
-          </a:ln>
-          <a:effectLst/>
-        </p:spPr>
-        <p:style>
-          <a:lnRef idx="1">
-            <a:schemeClr val="accent1"/>
-          </a:lnRef>
-          <a:fillRef idx="2">
-            <a:schemeClr val="accent1"/>
-          </a:fillRef>
-          <a:effectRef idx="1">
-            <a:schemeClr val="accent1"/>
-          </a:effectRef>
-          <a:fontRef idx="minor">
-            <a:schemeClr val="dk1"/>
-          </a:fontRef>
-        </p:style>
-      </p:cxnSp>
-      <p:sp>
-        <p:nvSpPr>
-          <p:cNvPr id="21" name="Rectangle 20"/>
-          <p:cNvSpPr/>
-          <p:nvPr/>
-        </p:nvSpPr>
-        <p:spPr>
-          <a:xfrm>
-            <a:off x="5525882" y="1613633"/>
-            <a:ext cx="152400" cy="276003"/>
-          </a:xfrm>
-          <a:prstGeom prst="rect">
-            <a:avLst/>
-          </a:prstGeom>
-          <a:solidFill>
-            <a:srgbClr val="0070C0"/>
-          </a:solidFill>
-          <a:ln>
-            <a:solidFill>
-              <a:srgbClr val="0070C0"/>
-            </a:solidFill>
-          </a:ln>
-          <a:effectLst/>
-        </p:spPr>
-        <p:style>
-          <a:lnRef idx="1">
-            <a:schemeClr val="accent3"/>
-          </a:lnRef>
-          <a:fillRef idx="2">
-            <a:schemeClr val="accent3"/>
-          </a:fillRef>
-          <a:effectRef idx="1">
-            <a:schemeClr val="accent3"/>
-          </a:effectRef>
-          <a:fontRef idx="minor">
-            <a:schemeClr val="dk1"/>
-          </a:fontRef>
-        </p:style>
-        <p:txBody>
-          <a:bodyPr rtlCol="0" anchor="ctr"/>
-          <a:lstStyle/>
-          <a:p>
-            <a:pPr algn="ctr"/>
-            <a:endParaRPr lang="en-SG" sz="1400"/>
-          </a:p>
-        </p:txBody>
-      </p:sp>
-      <p:cxnSp>
-        <p:nvCxnSpPr>
-          <p:cNvPr id="23" name="Straight Arrow Connector 22"/>
-          <p:cNvCxnSpPr/>
-          <p:nvPr/>
-        </p:nvCxnSpPr>
-        <p:spPr>
-          <a:xfrm>
-            <a:off x="419100" y="1261999"/>
-            <a:ext cx="1119851" cy="0"/>
-          </a:xfrm>
-          <a:prstGeom prst="straightConnector1">
-            <a:avLst/>
-          </a:prstGeom>
-          <a:ln w="19050">
-            <a:solidFill>
-              <a:srgbClr val="00B050"/>
-            </a:solidFill>
-            <a:tailEnd type="arrow"/>
-          </a:ln>
-        </p:spPr>
-        <p:style>
-          <a:lnRef idx="1">
-            <a:schemeClr val="accent1"/>
-          </a:lnRef>
-          <a:fillRef idx="0">
-            <a:schemeClr val="accent1"/>
-          </a:fillRef>
-          <a:effectRef idx="0">
-            <a:schemeClr val="accent1"/>
-          </a:effectRef>
-          <a:fontRef idx="minor">
-            <a:schemeClr val="tx1"/>
-          </a:fontRef>
-        </p:style>
-      </p:cxnSp>
-      <p:sp>
-        <p:nvSpPr>
-          <p:cNvPr id="26" name="TextBox 25"/>
-          <p:cNvSpPr txBox="1"/>
-          <p:nvPr/>
-        </p:nvSpPr>
-        <p:spPr>
-          <a:xfrm>
-            <a:off x="-457192" y="990600"/>
-            <a:ext cx="1920138" cy="214449"/>
-          </a:xfrm>
-          <a:prstGeom prst="rect">
-            <a:avLst/>
-          </a:prstGeom>
-          <a:noFill/>
-        </p:spPr>
-        <p:txBody>
-          <a:bodyPr wrap="square" lIns="0" tIns="0" rIns="0" bIns="0" rtlCol="0">
-            <a:spAutoFit/>
-          </a:bodyPr>
-          <a:lstStyle/>
-          <a:p>
-            <a:pPr algn="r"/>
-            <a:r>
-              <a:rPr lang="en-US" sz="1400" dirty="0">
-                <a:solidFill>
-                  <a:srgbClr val="0070C0"/>
-                </a:solidFill>
-              </a:rPr>
-              <a:t>execute(“</a:t>
-            </a:r>
-            <a:r>
-              <a:rPr lang="en-US" sz="1400" dirty="0" err="1">
-                <a:solidFill>
-                  <a:srgbClr val="0070C0"/>
-                </a:solidFill>
-              </a:rPr>
-              <a:t>add_event</a:t>
-            </a:r>
-            <a:r>
-              <a:rPr lang="en-US" sz="1400" dirty="0">
-                <a:solidFill>
-                  <a:srgbClr val="0070C0"/>
-                </a:solidFill>
-              </a:rPr>
-              <a:t>”)</a:t>
-            </a:r>
-          </a:p>
-        </p:txBody>
-      </p:sp>
-      <p:cxnSp>
-        <p:nvCxnSpPr>
-          <p:cNvPr id="28" name="Straight Arrow Connector 27"/>
-          <p:cNvCxnSpPr/>
-          <p:nvPr/>
-        </p:nvCxnSpPr>
-        <p:spPr>
-          <a:xfrm flipV="1">
-            <a:off x="4135972" y="1512340"/>
-            <a:ext cx="922392" cy="1"/>
-          </a:xfrm>
-          <a:prstGeom prst="straightConnector1">
-            <a:avLst/>
-          </a:prstGeom>
-          <a:ln w="19050">
-            <a:solidFill>
-              <a:srgbClr val="0070C0"/>
-            </a:solidFill>
-            <a:tailEnd type="arrow"/>
-          </a:ln>
-        </p:spPr>
-        <p:style>
-          <a:lnRef idx="1">
-            <a:schemeClr val="accent1"/>
-          </a:lnRef>
-          <a:fillRef idx="0">
-            <a:schemeClr val="accent1"/>
-          </a:fillRef>
-          <a:effectRef idx="0">
-            <a:schemeClr val="accent1"/>
-          </a:effectRef>
-          <a:fontRef idx="minor">
-            <a:schemeClr val="tx1"/>
-          </a:fontRef>
-        </p:style>
-      </p:cxnSp>
-      <p:sp>
-        <p:nvSpPr>
-          <p:cNvPr id="29" name="TextBox 28"/>
-          <p:cNvSpPr txBox="1"/>
-          <p:nvPr/>
-        </p:nvSpPr>
-        <p:spPr>
-          <a:xfrm>
-            <a:off x="3243421" y="2484071"/>
-            <a:ext cx="855809" cy="215444"/>
-          </a:xfrm>
-          <a:prstGeom prst="rect">
-            <a:avLst/>
-          </a:prstGeom>
-          <a:noFill/>
-        </p:spPr>
-        <p:txBody>
-          <a:bodyPr wrap="square" lIns="0" tIns="0" rIns="0" bIns="0" rtlCol="0">
-            <a:spAutoFit/>
-          </a:bodyPr>
-          <a:lstStyle>
-            <a:defPPr>
-              <a:defRPr lang="en-US"/>
-            </a:defPPr>
-            <a:lvl1pPr algn="r">
-              <a:defRPr sz="1400">
-                <a:solidFill>
-                  <a:srgbClr val="0070C0"/>
-                </a:solidFill>
-              </a:defRPr>
-            </a:lvl1pPr>
-          </a:lstStyle>
-          <a:p>
-            <a:r>
-              <a:rPr lang="en-US" dirty="0"/>
-              <a:t>execute()</a:t>
-            </a:r>
-          </a:p>
-        </p:txBody>
-      </p:sp>
-      <p:cxnSp>
-        <p:nvCxnSpPr>
-          <p:cNvPr id="34" name="Straight Arrow Connector 33"/>
-          <p:cNvCxnSpPr/>
-          <p:nvPr/>
-        </p:nvCxnSpPr>
-        <p:spPr>
-          <a:xfrm>
-            <a:off x="4109108" y="1878232"/>
-            <a:ext cx="1492974" cy="0"/>
-          </a:xfrm>
-          <a:prstGeom prst="straightConnector1">
-            <a:avLst/>
-          </a:prstGeom>
-          <a:ln w="19050">
-            <a:solidFill>
-              <a:srgbClr val="0070C0"/>
-            </a:solidFill>
-            <a:prstDash val="sysDash"/>
-            <a:headEnd type="arrow" w="med" len="med"/>
-            <a:tailEnd type="none" w="med" len="med"/>
-          </a:ln>
-        </p:spPr>
-        <p:style>
-          <a:lnRef idx="1">
-            <a:schemeClr val="accent1"/>
-          </a:lnRef>
-          <a:fillRef idx="0">
-            <a:schemeClr val="accent1"/>
-          </a:fillRef>
-          <a:effectRef idx="0">
-            <a:schemeClr val="accent1"/>
-          </a:effectRef>
-          <a:fontRef idx="minor">
-            <a:schemeClr val="tx1"/>
-          </a:fontRef>
-        </p:style>
-      </p:cxnSp>
-      <p:cxnSp>
-        <p:nvCxnSpPr>
-          <p:cNvPr id="35" name="Straight Arrow Connector 34"/>
-          <p:cNvCxnSpPr>
-            <a:cxnSpLocks/>
-          </p:cNvCxnSpPr>
-          <p:nvPr/>
-        </p:nvCxnSpPr>
-        <p:spPr>
-          <a:xfrm>
-            <a:off x="1691351" y="2133600"/>
-            <a:ext cx="2348067" cy="0"/>
-          </a:xfrm>
-          <a:prstGeom prst="straightConnector1">
-            <a:avLst/>
-          </a:prstGeom>
-          <a:ln w="19050">
-            <a:solidFill>
-              <a:srgbClr val="0070C0"/>
-            </a:solidFill>
-            <a:prstDash val="sysDash"/>
-            <a:headEnd type="arrow" w="med" len="med"/>
-            <a:tailEnd type="none" w="med" len="med"/>
-          </a:ln>
-        </p:spPr>
-        <p:style>
-          <a:lnRef idx="1">
-            <a:schemeClr val="accent1"/>
-          </a:lnRef>
-          <a:fillRef idx="0">
-            <a:schemeClr val="accent1"/>
-          </a:fillRef>
-          <a:effectRef idx="0">
-            <a:schemeClr val="accent1"/>
-          </a:effectRef>
-          <a:fontRef idx="minor">
-            <a:schemeClr val="tx1"/>
-          </a:fontRef>
-        </p:style>
-      </p:cxnSp>
-      <p:cxnSp>
-        <p:nvCxnSpPr>
-          <p:cNvPr id="37" name="Straight Arrow Connector 36"/>
-          <p:cNvCxnSpPr/>
-          <p:nvPr/>
-        </p:nvCxnSpPr>
-        <p:spPr>
-          <a:xfrm>
-            <a:off x="380999" y="4191000"/>
-            <a:ext cx="1196051" cy="0"/>
-          </a:xfrm>
-          <a:prstGeom prst="straightConnector1">
-            <a:avLst/>
-          </a:prstGeom>
-          <a:ln w="19050">
-            <a:solidFill>
+              <a:prstDash val="sysDash"/>
+              <a:headEnd type="arrow" w="med" len="med"/>
+              <a:tailEnd type="none" w="med" len="med"/>
+            </a:ln>
+          </p:spPr>
+          <p:style>
+            <a:lnRef idx="1">
               <a:schemeClr val="accent1"/>
-            </a:solidFill>
-            <a:prstDash val="sysDash"/>
-            <a:headEnd type="arrow" w="med" len="med"/>
-            <a:tailEnd type="none" w="med" len="med"/>
-          </a:ln>
-        </p:spPr>
-        <p:style>
-          <a:lnRef idx="1">
-            <a:schemeClr val="accent1"/>
-          </a:lnRef>
-          <a:fillRef idx="0">
-            <a:schemeClr val="accent1"/>
-          </a:fillRef>
-          <a:effectRef idx="0">
-            <a:schemeClr val="accent1"/>
-          </a:effectRef>
-          <a:fontRef idx="minor">
-            <a:schemeClr val="tx1"/>
-          </a:fontRef>
-        </p:style>
-      </p:cxnSp>
-      <p:sp>
-        <p:nvSpPr>
-          <p:cNvPr id="65" name="Rectangle 64"/>
-          <p:cNvSpPr/>
-          <p:nvPr/>
-        </p:nvSpPr>
-        <p:spPr>
-          <a:xfrm>
-            <a:off x="5526488" y="2731313"/>
-            <a:ext cx="161322" cy="1307285"/>
-          </a:xfrm>
-          <a:prstGeom prst="rect">
-            <a:avLst/>
-          </a:prstGeom>
-          <a:solidFill>
-            <a:srgbClr val="0070C0"/>
-          </a:solidFill>
-          <a:ln>
-            <a:solidFill>
-              <a:srgbClr val="0070C0"/>
-            </a:solidFill>
-          </a:ln>
-          <a:effectLst/>
-        </p:spPr>
-        <p:style>
-          <a:lnRef idx="1">
-            <a:schemeClr val="accent3"/>
-          </a:lnRef>
-          <a:fillRef idx="2">
-            <a:schemeClr val="accent3"/>
-          </a:fillRef>
-          <a:effectRef idx="1">
-            <a:schemeClr val="accent3"/>
-          </a:effectRef>
-          <a:fontRef idx="minor">
-            <a:schemeClr val="dk1"/>
-          </a:fontRef>
-        </p:style>
-        <p:txBody>
-          <a:bodyPr rtlCol="0" anchor="ctr"/>
-          <a:lstStyle/>
-          <a:p>
-            <a:pPr algn="ctr"/>
-            <a:endParaRPr lang="en-SG" sz="1400"/>
-          </a:p>
-        </p:txBody>
-      </p:sp>
-      <p:sp>
-        <p:nvSpPr>
-          <p:cNvPr id="79" name="TextBox 78"/>
-          <p:cNvSpPr txBox="1"/>
-          <p:nvPr/>
-        </p:nvSpPr>
-        <p:spPr>
-          <a:xfrm>
-            <a:off x="6194514" y="2748246"/>
-            <a:ext cx="755111" cy="184666"/>
-          </a:xfrm>
-          <a:prstGeom prst="rect">
-            <a:avLst/>
-          </a:prstGeom>
-          <a:noFill/>
-        </p:spPr>
-        <p:txBody>
-          <a:bodyPr wrap="square" lIns="0" tIns="0" rIns="0" bIns="0" rtlCol="0">
-            <a:spAutoFit/>
-          </a:bodyPr>
-          <a:lstStyle>
-            <a:defPPr>
-              <a:defRPr lang="en-US"/>
-            </a:defPPr>
-            <a:lvl1pPr algn="r">
-              <a:defRPr sz="1400">
-                <a:solidFill>
-                  <a:srgbClr val="0070C0"/>
-                </a:solidFill>
-              </a:defRPr>
-            </a:lvl1pPr>
-          </a:lstStyle>
-          <a:p>
-            <a:r>
-              <a:rPr lang="en-US" sz="1200" dirty="0" err="1">
-                <a:solidFill>
-                  <a:schemeClr val="accent4">
-                    <a:lumMod val="75000"/>
-                  </a:schemeClr>
-                </a:solidFill>
-              </a:rPr>
-              <a:t>addEvent</a:t>
-            </a:r>
-            <a:r>
-              <a:rPr lang="en-US" sz="1200" dirty="0">
-                <a:solidFill>
-                  <a:srgbClr val="7030A0"/>
-                </a:solidFill>
-              </a:rPr>
-              <a:t>()</a:t>
-            </a:r>
-            <a:endParaRPr lang="en-US" sz="1200" dirty="0"/>
-          </a:p>
-        </p:txBody>
-      </p:sp>
-      <p:sp>
-        <p:nvSpPr>
-          <p:cNvPr id="80" name="TextBox 79"/>
-          <p:cNvSpPr txBox="1"/>
-          <p:nvPr/>
-        </p:nvSpPr>
-        <p:spPr>
-          <a:xfrm>
-            <a:off x="1622129" y="1106152"/>
-            <a:ext cx="2271840" cy="215444"/>
-          </a:xfrm>
-          <a:prstGeom prst="rect">
-            <a:avLst/>
-          </a:prstGeom>
-          <a:noFill/>
-        </p:spPr>
-        <p:txBody>
-          <a:bodyPr wrap="square" lIns="0" tIns="0" rIns="0" bIns="0" rtlCol="0">
-            <a:spAutoFit/>
-          </a:bodyPr>
-          <a:lstStyle>
-            <a:defPPr>
-              <a:defRPr lang="en-US"/>
-            </a:defPPr>
-            <a:lvl1pPr algn="r">
-              <a:defRPr sz="1400">
-                <a:solidFill>
-                  <a:srgbClr val="0070C0"/>
-                </a:solidFill>
-              </a:defRPr>
-            </a:lvl1pPr>
-          </a:lstStyle>
-          <a:p>
-            <a:r>
-              <a:rPr lang="en-US" dirty="0" err="1"/>
-              <a:t>parseCommand</a:t>
-            </a:r>
-            <a:r>
-              <a:rPr lang="en-US" dirty="0"/>
-              <a:t>(“</a:t>
-            </a:r>
-            <a:r>
-              <a:rPr lang="en-US" dirty="0" err="1"/>
-              <a:t>add_event</a:t>
-            </a:r>
-            <a:r>
-              <a:rPr lang="en-US" dirty="0"/>
-              <a:t>”)</a:t>
-            </a:r>
-          </a:p>
-        </p:txBody>
-      </p:sp>
-      <p:sp>
-        <p:nvSpPr>
-          <p:cNvPr id="82" name="TextBox 81"/>
-          <p:cNvSpPr txBox="1"/>
-          <p:nvPr/>
-        </p:nvSpPr>
-        <p:spPr>
-          <a:xfrm>
-            <a:off x="3272755" y="3791076"/>
-            <a:ext cx="621216" cy="215444"/>
-          </a:xfrm>
-          <a:prstGeom prst="rect">
-            <a:avLst/>
-          </a:prstGeom>
-          <a:noFill/>
-        </p:spPr>
-        <p:txBody>
-          <a:bodyPr wrap="square" lIns="0" tIns="0" rIns="0" bIns="0" rtlCol="0">
-            <a:spAutoFit/>
-          </a:bodyPr>
-          <a:lstStyle>
-            <a:defPPr>
-              <a:defRPr lang="en-US"/>
-            </a:defPPr>
-            <a:lvl1pPr algn="r">
-              <a:defRPr sz="1400">
-                <a:solidFill>
-                  <a:srgbClr val="0070C0"/>
-                </a:solidFill>
-              </a:defRPr>
-            </a:lvl1pPr>
-          </a:lstStyle>
-          <a:p>
-            <a:r>
-              <a:rPr lang="en-US" dirty="0"/>
-              <a:t>result</a:t>
-            </a:r>
-          </a:p>
-        </p:txBody>
-      </p:sp>
-      <p:sp>
-        <p:nvSpPr>
-          <p:cNvPr id="83" name="TextBox 82"/>
-          <p:cNvSpPr txBox="1"/>
-          <p:nvPr/>
-        </p:nvSpPr>
-        <p:spPr>
-          <a:xfrm>
-            <a:off x="645270" y="3945901"/>
-            <a:ext cx="762000" cy="215444"/>
-          </a:xfrm>
-          <a:prstGeom prst="rect">
-            <a:avLst/>
-          </a:prstGeom>
-          <a:noFill/>
-        </p:spPr>
-        <p:txBody>
-          <a:bodyPr wrap="square" lIns="0" tIns="0" rIns="0" bIns="0" rtlCol="0">
-            <a:spAutoFit/>
-          </a:bodyPr>
-          <a:lstStyle>
-            <a:defPPr>
-              <a:defRPr lang="en-US"/>
-            </a:defPPr>
-            <a:lvl1pPr algn="r">
-              <a:defRPr sz="1400">
-                <a:solidFill>
-                  <a:srgbClr val="0070C0"/>
-                </a:solidFill>
-              </a:defRPr>
-            </a:lvl1pPr>
-          </a:lstStyle>
-          <a:p>
-            <a:r>
-              <a:rPr lang="en-US" dirty="0"/>
-              <a:t>result</a:t>
-            </a:r>
-          </a:p>
-        </p:txBody>
-      </p:sp>
-      <p:sp>
-        <p:nvSpPr>
-          <p:cNvPr id="84" name="Rectangle 62"/>
-          <p:cNvSpPr/>
-          <p:nvPr/>
-        </p:nvSpPr>
-        <p:spPr>
-          <a:xfrm>
-            <a:off x="7497155" y="2568606"/>
-            <a:ext cx="2181777" cy="335427"/>
-          </a:xfrm>
-          <a:prstGeom prst="rect">
-            <a:avLst/>
-          </a:prstGeom>
-          <a:solidFill>
-            <a:srgbClr val="7030A0"/>
-          </a:solidFill>
-          <a:ln w="19050">
-            <a:solidFill>
-              <a:srgbClr val="7030A0"/>
-            </a:solidFill>
-          </a:ln>
-          <a:effectLst/>
-        </p:spPr>
-        <p:style>
-          <a:lnRef idx="1">
-            <a:schemeClr val="accent2"/>
-          </a:lnRef>
-          <a:fillRef idx="2">
-            <a:schemeClr val="accent2"/>
-          </a:fillRef>
-          <a:effectRef idx="1">
-            <a:schemeClr val="accent2"/>
-          </a:effectRef>
-          <a:fontRef idx="minor">
-            <a:schemeClr val="dk1"/>
-          </a:fontRef>
-        </p:style>
-        <p:txBody>
-          <a:bodyPr rtlCol="0" anchor="ctr"/>
-          <a:lstStyle/>
-          <a:p>
-            <a:pPr algn="ctr"/>
-            <a:r>
-              <a:rPr lang="en-US" sz="1600" dirty="0">
-                <a:solidFill>
-                  <a:schemeClr val="bg1"/>
-                </a:solidFill>
-              </a:rPr>
-              <a:t>:</a:t>
-            </a:r>
-            <a:r>
-              <a:rPr lang="en-US" sz="1600" dirty="0" err="1">
-                <a:solidFill>
-                  <a:schemeClr val="bg1"/>
-                </a:solidFill>
-              </a:rPr>
-              <a:t>VersionedAddressBook</a:t>
-            </a:r>
-            <a:endParaRPr lang="en-SG" sz="1600" dirty="0">
+            </a:lnRef>
+            <a:fillRef idx="0">
+              <a:schemeClr val="accent1"/>
+            </a:fillRef>
+            <a:effectRef idx="0">
+              <a:schemeClr val="accent1"/>
+            </a:effectRef>
+            <a:fontRef idx="minor">
+              <a:schemeClr val="tx1"/>
+            </a:fontRef>
+          </p:style>
+        </p:cxnSp>
+        <p:cxnSp>
+          <p:nvCxnSpPr>
+            <p:cNvPr id="89" name="Straight Connector 88">
+              <a:extLst>
+                <a:ext uri="{FF2B5EF4-FFF2-40B4-BE49-F238E27FC236}">
+                  <a16:creationId xmlns:a16="http://schemas.microsoft.com/office/drawing/2014/main" id="{E4E1C8CA-49DF-45D8-80A5-D5C8282EE927}"/>
+                </a:ext>
+              </a:extLst>
+            </p:cNvPr>
+            <p:cNvCxnSpPr>
+              <a:cxnSpLocks/>
+            </p:cNvCxnSpPr>
+            <p:nvPr/>
+          </p:nvCxnSpPr>
+          <p:spPr>
+            <a:xfrm>
+              <a:off x="8588043" y="2871355"/>
+              <a:ext cx="17996" cy="1467648"/>
+            </a:xfrm>
+            <a:prstGeom prst="line">
+              <a:avLst/>
+            </a:prstGeom>
+            <a:ln w="19050">
               <a:solidFill>
-                <a:schemeClr val="bg1"/>
+                <a:srgbClr val="7030A0"/>
               </a:solidFill>
-            </a:endParaRPr>
-          </a:p>
-        </p:txBody>
-      </p:sp>
-      <p:sp>
-        <p:nvSpPr>
-          <p:cNvPr id="86" name="Rectangle 85"/>
-          <p:cNvSpPr/>
-          <p:nvPr/>
-        </p:nvSpPr>
-        <p:spPr>
-          <a:xfrm>
-            <a:off x="8514207" y="3182840"/>
-            <a:ext cx="129933" cy="398562"/>
-          </a:xfrm>
-          <a:prstGeom prst="rect">
-            <a:avLst/>
-          </a:prstGeom>
-          <a:solidFill>
-            <a:srgbClr val="7030A0"/>
-          </a:solidFill>
-          <a:ln>
-            <a:solidFill>
-              <a:srgbClr val="7030A0"/>
-            </a:solidFill>
-          </a:ln>
-          <a:effectLst/>
-        </p:spPr>
-        <p:style>
-          <a:lnRef idx="1">
-            <a:schemeClr val="accent3"/>
-          </a:lnRef>
-          <a:fillRef idx="2">
-            <a:schemeClr val="accent3"/>
-          </a:fillRef>
-          <a:effectRef idx="1">
-            <a:schemeClr val="accent3"/>
-          </a:effectRef>
-          <a:fontRef idx="minor">
-            <a:schemeClr val="dk1"/>
-          </a:fontRef>
-        </p:style>
-        <p:txBody>
-          <a:bodyPr rtlCol="0" anchor="ctr"/>
-          <a:lstStyle/>
-          <a:p>
-            <a:pPr algn="ctr"/>
-            <a:endParaRPr lang="en-SG" sz="1400"/>
-          </a:p>
-        </p:txBody>
-      </p:sp>
-      <p:sp>
-        <p:nvSpPr>
-          <p:cNvPr id="93" name="TextBox 92"/>
-          <p:cNvSpPr txBox="1"/>
-          <p:nvPr/>
-        </p:nvSpPr>
-        <p:spPr>
-          <a:xfrm>
-            <a:off x="2724792" y="1905793"/>
-            <a:ext cx="220343" cy="215444"/>
-          </a:xfrm>
-          <a:prstGeom prst="rect">
-            <a:avLst/>
-          </a:prstGeom>
-          <a:noFill/>
-        </p:spPr>
-        <p:txBody>
-          <a:bodyPr wrap="square" lIns="0" tIns="0" rIns="0" bIns="0" rtlCol="0">
-            <a:spAutoFit/>
-          </a:bodyPr>
-          <a:lstStyle>
-            <a:defPPr>
-              <a:defRPr lang="en-US"/>
-            </a:defPPr>
-            <a:lvl1pPr algn="r">
-              <a:defRPr sz="1400">
-                <a:solidFill>
-                  <a:srgbClr val="0070C0"/>
-                </a:solidFill>
-              </a:defRPr>
-            </a:lvl1pPr>
-          </a:lstStyle>
-          <a:p>
-            <a:r>
-              <a:rPr lang="en-US" dirty="0"/>
-              <a:t>a</a:t>
-            </a:r>
-          </a:p>
-        </p:txBody>
-      </p:sp>
-      <p:sp>
-        <p:nvSpPr>
-          <p:cNvPr id="40" name="Rectangle 62"/>
-          <p:cNvSpPr/>
-          <p:nvPr/>
-        </p:nvSpPr>
-        <p:spPr>
-          <a:xfrm>
-            <a:off x="6549765" y="2362200"/>
-            <a:ext cx="841636" cy="300180"/>
-          </a:xfrm>
-          <a:prstGeom prst="rect">
-            <a:avLst/>
-          </a:prstGeom>
-          <a:solidFill>
-            <a:srgbClr val="7030A0"/>
-          </a:solidFill>
-          <a:ln w="19050">
-            <a:solidFill>
-              <a:srgbClr val="7030A0"/>
-            </a:solidFill>
-          </a:ln>
-          <a:effectLst/>
-        </p:spPr>
-        <p:style>
-          <a:lnRef idx="1">
-            <a:schemeClr val="accent2"/>
-          </a:lnRef>
-          <a:fillRef idx="2">
-            <a:schemeClr val="accent2"/>
-          </a:fillRef>
-          <a:effectRef idx="1">
-            <a:schemeClr val="accent2"/>
-          </a:effectRef>
-          <a:fontRef idx="minor">
-            <a:schemeClr val="dk1"/>
-          </a:fontRef>
-        </p:style>
-        <p:txBody>
-          <a:bodyPr rtlCol="0" anchor="ctr"/>
-          <a:lstStyle/>
-          <a:p>
-            <a:pPr algn="ctr"/>
-            <a:r>
-              <a:rPr lang="en-US" sz="1600" dirty="0">
-                <a:solidFill>
-                  <a:schemeClr val="bg1"/>
-                </a:solidFill>
-              </a:rPr>
-              <a:t>: Model</a:t>
-            </a:r>
-            <a:endParaRPr lang="en-SG" sz="1600" dirty="0">
+              <a:prstDash val="sysDash"/>
+            </a:ln>
+            <a:effectLst/>
+          </p:spPr>
+          <p:style>
+            <a:lnRef idx="1">
+              <a:schemeClr val="accent1"/>
+            </a:lnRef>
+            <a:fillRef idx="2">
+              <a:schemeClr val="accent1"/>
+            </a:fillRef>
+            <a:effectRef idx="1">
+              <a:schemeClr val="accent1"/>
+            </a:effectRef>
+            <a:fontRef idx="minor">
+              <a:schemeClr val="dk1"/>
+            </a:fontRef>
+          </p:style>
+        </p:cxnSp>
+        <p:sp>
+          <p:nvSpPr>
+            <p:cNvPr id="41" name="TextBox 40"/>
+            <p:cNvSpPr txBox="1"/>
+            <p:nvPr/>
+          </p:nvSpPr>
+          <p:spPr>
+            <a:xfrm>
+              <a:off x="7474923" y="2975344"/>
+              <a:ext cx="744455" cy="184666"/>
+            </a:xfrm>
+            <a:prstGeom prst="rect">
+              <a:avLst/>
+            </a:prstGeom>
+            <a:noFill/>
+            <a:ln>
+              <a:noFill/>
+            </a:ln>
+          </p:spPr>
+          <p:txBody>
+            <a:bodyPr wrap="square" lIns="0" tIns="0" rIns="0" bIns="0" rtlCol="0">
+              <a:spAutoFit/>
+            </a:bodyPr>
+            <a:lstStyle>
+              <a:defPPr>
+                <a:defRPr lang="en-US"/>
+              </a:defPPr>
+              <a:lvl1pPr algn="r">
+                <a:defRPr sz="1400">
+                  <a:solidFill>
+                    <a:srgbClr val="0070C0"/>
+                  </a:solidFill>
+                </a:defRPr>
+              </a:lvl1pPr>
+            </a:lstStyle>
+            <a:p>
+              <a:r>
+                <a:rPr lang="en-US" sz="1200" dirty="0" err="1">
+                  <a:solidFill>
+                    <a:srgbClr val="7030A0"/>
+                  </a:solidFill>
+                </a:rPr>
+                <a:t>addEvent</a:t>
+              </a:r>
+              <a:r>
+                <a:rPr lang="en-US" sz="1200" dirty="0">
+                  <a:solidFill>
+                    <a:schemeClr val="accent4">
+                      <a:lumMod val="75000"/>
+                    </a:schemeClr>
+                  </a:solidFill>
+                </a:rPr>
+                <a:t>()</a:t>
+              </a:r>
+            </a:p>
+          </p:txBody>
+        </p:sp>
+        <p:cxnSp>
+          <p:nvCxnSpPr>
+            <p:cNvPr id="52" name="Straight Arrow Connector 51"/>
+            <p:cNvCxnSpPr>
+              <a:cxnSpLocks/>
+            </p:cNvCxnSpPr>
+            <p:nvPr/>
+          </p:nvCxnSpPr>
+          <p:spPr>
+            <a:xfrm>
+              <a:off x="7043991" y="3182839"/>
+              <a:ext cx="1470216" cy="0"/>
+            </a:xfrm>
+            <a:prstGeom prst="straightConnector1">
+              <a:avLst/>
+            </a:prstGeom>
+            <a:ln w="19050">
               <a:solidFill>
-                <a:schemeClr val="bg1"/>
+                <a:srgbClr val="7030A0"/>
               </a:solidFill>
-            </a:endParaRPr>
-          </a:p>
-        </p:txBody>
-      </p:sp>
-      <p:cxnSp>
-        <p:nvCxnSpPr>
-          <p:cNvPr id="46" name="Straight Connector 45"/>
-          <p:cNvCxnSpPr>
-            <a:cxnSpLocks/>
-          </p:cNvCxnSpPr>
-          <p:nvPr/>
-        </p:nvCxnSpPr>
-        <p:spPr>
-          <a:xfrm flipH="1">
-            <a:off x="6986491" y="2653306"/>
-            <a:ext cx="3959" cy="1735710"/>
-          </a:xfrm>
-          <a:prstGeom prst="line">
-            <a:avLst/>
-          </a:prstGeom>
-          <a:ln w="19050">
-            <a:solidFill>
-              <a:srgbClr val="7030A0"/>
-            </a:solidFill>
-            <a:prstDash val="sysDash"/>
-          </a:ln>
-          <a:effectLst/>
-        </p:spPr>
-        <p:style>
-          <a:lnRef idx="1">
-            <a:schemeClr val="accent1"/>
-          </a:lnRef>
-          <a:fillRef idx="2">
-            <a:schemeClr val="accent1"/>
-          </a:fillRef>
-          <a:effectRef idx="1">
-            <a:schemeClr val="accent1"/>
-          </a:effectRef>
-          <a:fontRef idx="minor">
-            <a:schemeClr val="dk1"/>
-          </a:fontRef>
-        </p:style>
-      </p:cxnSp>
-      <p:sp>
-        <p:nvSpPr>
-          <p:cNvPr id="49" name="Rectangle 48"/>
-          <p:cNvSpPr/>
-          <p:nvPr/>
-        </p:nvSpPr>
-        <p:spPr>
-          <a:xfrm>
-            <a:off x="6887527" y="2958106"/>
-            <a:ext cx="168896" cy="775693"/>
-          </a:xfrm>
-          <a:prstGeom prst="rect">
-            <a:avLst/>
-          </a:prstGeom>
-          <a:solidFill>
-            <a:srgbClr val="7030A0"/>
-          </a:solidFill>
-          <a:ln>
-            <a:solidFill>
-              <a:srgbClr val="7030A0"/>
-            </a:solidFill>
-          </a:ln>
-          <a:effectLst/>
-        </p:spPr>
-        <p:style>
-          <a:lnRef idx="1">
-            <a:schemeClr val="accent3"/>
-          </a:lnRef>
-          <a:fillRef idx="2">
-            <a:schemeClr val="accent3"/>
-          </a:fillRef>
-          <a:effectRef idx="1">
-            <a:schemeClr val="accent3"/>
-          </a:effectRef>
-          <a:fontRef idx="minor">
-            <a:schemeClr val="dk1"/>
-          </a:fontRef>
-        </p:style>
-        <p:txBody>
-          <a:bodyPr rtlCol="0" anchor="ctr"/>
-          <a:lstStyle/>
-          <a:p>
-            <a:pPr algn="ctr"/>
-            <a:endParaRPr lang="en-SG" sz="1400"/>
-          </a:p>
-        </p:txBody>
-      </p:sp>
-      <p:cxnSp>
-        <p:nvCxnSpPr>
-          <p:cNvPr id="50" name="Straight Arrow Connector 49"/>
-          <p:cNvCxnSpPr>
-            <a:cxnSpLocks/>
-          </p:cNvCxnSpPr>
-          <p:nvPr/>
-        </p:nvCxnSpPr>
-        <p:spPr>
-          <a:xfrm>
-            <a:off x="5685755" y="2975344"/>
-            <a:ext cx="1210345" cy="0"/>
-          </a:xfrm>
-          <a:prstGeom prst="straightConnector1">
-            <a:avLst/>
-          </a:prstGeom>
-          <a:ln w="19050">
-            <a:solidFill>
-              <a:srgbClr val="0070C0"/>
-            </a:solidFill>
-            <a:tailEnd type="arrow"/>
-          </a:ln>
-        </p:spPr>
-        <p:style>
-          <a:lnRef idx="1">
-            <a:schemeClr val="accent1"/>
-          </a:lnRef>
-          <a:fillRef idx="0">
-            <a:schemeClr val="accent1"/>
-          </a:fillRef>
-          <a:effectRef idx="0">
-            <a:schemeClr val="accent1"/>
-          </a:effectRef>
-          <a:fontRef idx="minor">
-            <a:schemeClr val="tx1"/>
-          </a:fontRef>
-        </p:style>
-      </p:cxnSp>
-      <p:sp>
-        <p:nvSpPr>
-          <p:cNvPr id="4" name="TextBox 3"/>
-          <p:cNvSpPr txBox="1"/>
-          <p:nvPr/>
-        </p:nvSpPr>
-        <p:spPr>
-          <a:xfrm>
-            <a:off x="5472880" y="4258211"/>
-            <a:ext cx="258404" cy="261610"/>
-          </a:xfrm>
-          <a:prstGeom prst="rect">
-            <a:avLst/>
-          </a:prstGeom>
-          <a:noFill/>
-        </p:spPr>
-        <p:txBody>
-          <a:bodyPr wrap="none" rtlCol="0">
-            <a:spAutoFit/>
-          </a:bodyPr>
-          <a:lstStyle/>
-          <a:p>
-            <a:r>
-              <a:rPr lang="en-SG" sz="1100" dirty="0">
-                <a:solidFill>
-                  <a:srgbClr val="002060"/>
-                </a:solidFill>
-              </a:rPr>
-              <a:t>X</a:t>
-            </a:r>
-          </a:p>
-        </p:txBody>
-      </p:sp>
-      <p:sp>
-        <p:nvSpPr>
-          <p:cNvPr id="19" name="Rectangle 62"/>
-          <p:cNvSpPr/>
-          <p:nvPr/>
-        </p:nvSpPr>
-        <p:spPr>
-          <a:xfrm>
-            <a:off x="5035976" y="1260268"/>
-            <a:ext cx="1216200" cy="459665"/>
-          </a:xfrm>
-          <a:prstGeom prst="rect">
-            <a:avLst/>
-          </a:prstGeom>
-          <a:solidFill>
-            <a:srgbClr val="0070C0"/>
-          </a:solidFill>
-          <a:ln w="19050">
-            <a:solidFill>
-              <a:srgbClr val="0070C0"/>
-            </a:solidFill>
-          </a:ln>
-          <a:effectLst/>
-        </p:spPr>
-        <p:style>
-          <a:lnRef idx="1">
-            <a:schemeClr val="accent2"/>
-          </a:lnRef>
-          <a:fillRef idx="2">
-            <a:schemeClr val="accent2"/>
-          </a:fillRef>
-          <a:effectRef idx="1">
-            <a:schemeClr val="accent2"/>
-          </a:effectRef>
-          <a:fontRef idx="minor">
-            <a:schemeClr val="dk1"/>
-          </a:fontRef>
-        </p:style>
-        <p:txBody>
-          <a:bodyPr rtlCol="0" anchor="ctr"/>
-          <a:lstStyle/>
-          <a:p>
-            <a:pPr algn="ctr"/>
-            <a:r>
-              <a:rPr lang="en-US" sz="1600" dirty="0">
-                <a:solidFill>
-                  <a:schemeClr val="bg1"/>
-                </a:solidFill>
-              </a:rPr>
-              <a:t>a:AddEvent</a:t>
-            </a:r>
-            <a:br>
-              <a:rPr lang="en-US" sz="1600" dirty="0">
-                <a:solidFill>
-                  <a:schemeClr val="bg1"/>
-                </a:solidFill>
-              </a:rPr>
-            </a:br>
-            <a:r>
-              <a:rPr lang="en-US" sz="1600" dirty="0">
-                <a:solidFill>
-                  <a:schemeClr val="bg1"/>
-                </a:solidFill>
-              </a:rPr>
-              <a:t>Command</a:t>
-            </a:r>
-            <a:endParaRPr lang="en-SG" sz="1600" dirty="0">
+              <a:tailEnd type="arrow"/>
+            </a:ln>
+          </p:spPr>
+          <p:style>
+            <a:lnRef idx="1">
+              <a:schemeClr val="accent1"/>
+            </a:lnRef>
+            <a:fillRef idx="0">
+              <a:schemeClr val="accent1"/>
+            </a:fillRef>
+            <a:effectRef idx="0">
+              <a:schemeClr val="accent1"/>
+            </a:effectRef>
+            <a:fontRef idx="minor">
+              <a:schemeClr val="tx1"/>
+            </a:fontRef>
+          </p:style>
+        </p:cxnSp>
+        <p:cxnSp>
+          <p:nvCxnSpPr>
+            <p:cNvPr id="60" name="Straight Arrow Connector 59">
+              <a:extLst>
+                <a:ext uri="{FF2B5EF4-FFF2-40B4-BE49-F238E27FC236}">
+                  <a16:creationId xmlns:a16="http://schemas.microsoft.com/office/drawing/2014/main" id="{7C9F21BC-13A9-471F-825A-2621FD36355F}"/>
+                </a:ext>
+              </a:extLst>
+            </p:cNvPr>
+            <p:cNvCxnSpPr>
+              <a:cxnSpLocks/>
+            </p:cNvCxnSpPr>
+            <p:nvPr/>
+          </p:nvCxnSpPr>
+          <p:spPr>
+            <a:xfrm flipV="1">
+              <a:off x="7043991" y="3564914"/>
+              <a:ext cx="1470216" cy="6325"/>
+            </a:xfrm>
+            <a:prstGeom prst="straightConnector1">
+              <a:avLst/>
+            </a:prstGeom>
+            <a:ln w="19050">
               <a:solidFill>
-                <a:schemeClr val="bg1"/>
+                <a:srgbClr val="7030A0"/>
               </a:solidFill>
-            </a:endParaRPr>
-          </a:p>
-        </p:txBody>
-      </p:sp>
-      <p:cxnSp>
-        <p:nvCxnSpPr>
-          <p:cNvPr id="66" name="Straight Arrow Connector 65">
-            <a:extLst>
-              <a:ext uri="{FF2B5EF4-FFF2-40B4-BE49-F238E27FC236}">
-                <a16:creationId xmlns:a16="http://schemas.microsoft.com/office/drawing/2014/main" id="{39916E2E-195A-4DC8-B025-B05FA87E6796}"/>
-              </a:ext>
-            </a:extLst>
-          </p:cNvPr>
-          <p:cNvCxnSpPr>
-            <a:cxnSpLocks/>
-          </p:cNvCxnSpPr>
-          <p:nvPr/>
-        </p:nvCxnSpPr>
-        <p:spPr>
-          <a:xfrm>
-            <a:off x="1691351" y="2731314"/>
-            <a:ext cx="3832164" cy="1"/>
-          </a:xfrm>
-          <a:prstGeom prst="straightConnector1">
-            <a:avLst/>
-          </a:prstGeom>
-          <a:ln w="19050">
-            <a:solidFill>
-              <a:srgbClr val="0070C0"/>
-            </a:solidFill>
-            <a:tailEnd type="arrow"/>
-          </a:ln>
-        </p:spPr>
-        <p:style>
-          <a:lnRef idx="1">
-            <a:schemeClr val="accent1"/>
-          </a:lnRef>
-          <a:fillRef idx="0">
-            <a:schemeClr val="accent1"/>
-          </a:fillRef>
-          <a:effectRef idx="0">
-            <a:schemeClr val="accent1"/>
-          </a:effectRef>
-          <a:fontRef idx="minor">
-            <a:schemeClr val="tx1"/>
-          </a:fontRef>
-        </p:style>
-      </p:cxnSp>
-      <p:cxnSp>
-        <p:nvCxnSpPr>
-          <p:cNvPr id="67" name="Straight Arrow Connector 66">
-            <a:extLst>
-              <a:ext uri="{FF2B5EF4-FFF2-40B4-BE49-F238E27FC236}">
-                <a16:creationId xmlns:a16="http://schemas.microsoft.com/office/drawing/2014/main" id="{D881596E-177C-4FDC-8E60-CAB90B3D5FAB}"/>
-              </a:ext>
-            </a:extLst>
-          </p:cNvPr>
-          <p:cNvCxnSpPr>
-            <a:cxnSpLocks/>
-          </p:cNvCxnSpPr>
-          <p:nvPr/>
-        </p:nvCxnSpPr>
-        <p:spPr>
-          <a:xfrm>
-            <a:off x="1708245" y="1363918"/>
-            <a:ext cx="2256705" cy="1"/>
-          </a:xfrm>
-          <a:prstGeom prst="straightConnector1">
-            <a:avLst/>
-          </a:prstGeom>
-          <a:ln w="19050">
-            <a:solidFill>
-              <a:srgbClr val="0070C0"/>
-            </a:solidFill>
-            <a:tailEnd type="arrow"/>
-          </a:ln>
-        </p:spPr>
-        <p:style>
-          <a:lnRef idx="1">
-            <a:schemeClr val="accent1"/>
-          </a:lnRef>
-          <a:fillRef idx="0">
-            <a:schemeClr val="accent1"/>
-          </a:fillRef>
-          <a:effectRef idx="0">
-            <a:schemeClr val="accent1"/>
-          </a:effectRef>
-          <a:fontRef idx="minor">
-            <a:schemeClr val="tx1"/>
-          </a:fontRef>
-        </p:style>
-      </p:cxnSp>
-      <p:cxnSp>
-        <p:nvCxnSpPr>
-          <p:cNvPr id="69" name="Straight Arrow Connector 68">
-            <a:extLst>
-              <a:ext uri="{FF2B5EF4-FFF2-40B4-BE49-F238E27FC236}">
-                <a16:creationId xmlns:a16="http://schemas.microsoft.com/office/drawing/2014/main" id="{7C9F21BC-13A9-471F-825A-2621FD36355F}"/>
-              </a:ext>
-            </a:extLst>
-          </p:cNvPr>
-          <p:cNvCxnSpPr>
-            <a:cxnSpLocks/>
-          </p:cNvCxnSpPr>
-          <p:nvPr/>
-        </p:nvCxnSpPr>
-        <p:spPr>
-          <a:xfrm>
-            <a:off x="1691998" y="4036462"/>
-            <a:ext cx="3831517" cy="0"/>
-          </a:xfrm>
-          <a:prstGeom prst="straightConnector1">
-            <a:avLst/>
-          </a:prstGeom>
-          <a:ln w="19050">
-            <a:solidFill>
-              <a:srgbClr val="0070C0"/>
-            </a:solidFill>
-            <a:prstDash val="sysDash"/>
-            <a:headEnd type="arrow" w="med" len="med"/>
-            <a:tailEnd type="none" w="med" len="med"/>
-          </a:ln>
-        </p:spPr>
-        <p:style>
-          <a:lnRef idx="1">
-            <a:schemeClr val="accent1"/>
-          </a:lnRef>
-          <a:fillRef idx="0">
-            <a:schemeClr val="accent1"/>
-          </a:fillRef>
-          <a:effectRef idx="0">
-            <a:schemeClr val="accent1"/>
-          </a:effectRef>
-          <a:fontRef idx="minor">
-            <a:schemeClr val="tx1"/>
-          </a:fontRef>
-        </p:style>
-      </p:cxnSp>
-      <p:cxnSp>
-        <p:nvCxnSpPr>
-          <p:cNvPr id="89" name="Straight Connector 88">
-            <a:extLst>
-              <a:ext uri="{FF2B5EF4-FFF2-40B4-BE49-F238E27FC236}">
-                <a16:creationId xmlns:a16="http://schemas.microsoft.com/office/drawing/2014/main" id="{E4E1C8CA-49DF-45D8-80A5-D5C8282EE927}"/>
-              </a:ext>
-            </a:extLst>
-          </p:cNvPr>
-          <p:cNvCxnSpPr>
-            <a:cxnSpLocks/>
-          </p:cNvCxnSpPr>
-          <p:nvPr/>
-        </p:nvCxnSpPr>
-        <p:spPr>
-          <a:xfrm>
-            <a:off x="8588043" y="2871355"/>
-            <a:ext cx="17996" cy="1467648"/>
-          </a:xfrm>
-          <a:prstGeom prst="line">
-            <a:avLst/>
-          </a:prstGeom>
-          <a:ln w="19050">
-            <a:solidFill>
-              <a:srgbClr val="7030A0"/>
-            </a:solidFill>
-            <a:prstDash val="sysDash"/>
-          </a:ln>
-          <a:effectLst/>
-        </p:spPr>
-        <p:style>
-          <a:lnRef idx="1">
-            <a:schemeClr val="accent1"/>
-          </a:lnRef>
-          <a:fillRef idx="2">
-            <a:schemeClr val="accent1"/>
-          </a:fillRef>
-          <a:effectRef idx="1">
-            <a:schemeClr val="accent1"/>
-          </a:effectRef>
-          <a:fontRef idx="minor">
-            <a:schemeClr val="dk1"/>
-          </a:fontRef>
-        </p:style>
-      </p:cxnSp>
-      <p:sp>
-        <p:nvSpPr>
-          <p:cNvPr id="41" name="TextBox 40"/>
-          <p:cNvSpPr txBox="1"/>
-          <p:nvPr/>
-        </p:nvSpPr>
-        <p:spPr>
-          <a:xfrm>
-            <a:off x="7474923" y="2975344"/>
-            <a:ext cx="744455" cy="184666"/>
-          </a:xfrm>
-          <a:prstGeom prst="rect">
-            <a:avLst/>
-          </a:prstGeom>
-          <a:noFill/>
-          <a:ln>
-            <a:noFill/>
-          </a:ln>
-        </p:spPr>
-        <p:txBody>
-          <a:bodyPr wrap="square" lIns="0" tIns="0" rIns="0" bIns="0" rtlCol="0">
-            <a:spAutoFit/>
-          </a:bodyPr>
-          <a:lstStyle>
-            <a:defPPr>
-              <a:defRPr lang="en-US"/>
-            </a:defPPr>
-            <a:lvl1pPr algn="r">
-              <a:defRPr sz="1400">
-                <a:solidFill>
-                  <a:srgbClr val="0070C0"/>
-                </a:solidFill>
-              </a:defRPr>
-            </a:lvl1pPr>
-          </a:lstStyle>
-          <a:p>
-            <a:r>
-              <a:rPr lang="en-US" sz="1200" dirty="0" err="1">
-                <a:solidFill>
-                  <a:srgbClr val="7030A0"/>
-                </a:solidFill>
-              </a:rPr>
-              <a:t>addEvent</a:t>
-            </a:r>
-            <a:r>
-              <a:rPr lang="en-US" sz="1200" dirty="0">
-                <a:solidFill>
-                  <a:schemeClr val="accent4">
-                    <a:lumMod val="75000"/>
-                  </a:schemeClr>
-                </a:solidFill>
-              </a:rPr>
-              <a:t>()</a:t>
-            </a:r>
-          </a:p>
-        </p:txBody>
-      </p:sp>
-      <p:cxnSp>
-        <p:nvCxnSpPr>
-          <p:cNvPr id="52" name="Straight Arrow Connector 51"/>
-          <p:cNvCxnSpPr>
-            <a:cxnSpLocks/>
-          </p:cNvCxnSpPr>
-          <p:nvPr/>
-        </p:nvCxnSpPr>
-        <p:spPr>
-          <a:xfrm>
-            <a:off x="7043991" y="3182839"/>
-            <a:ext cx="1470216" cy="0"/>
-          </a:xfrm>
-          <a:prstGeom prst="straightConnector1">
-            <a:avLst/>
-          </a:prstGeom>
-          <a:ln w="19050">
-            <a:solidFill>
-              <a:srgbClr val="7030A0"/>
-            </a:solidFill>
-            <a:tailEnd type="arrow"/>
-          </a:ln>
-        </p:spPr>
-        <p:style>
-          <a:lnRef idx="1">
-            <a:schemeClr val="accent1"/>
-          </a:lnRef>
-          <a:fillRef idx="0">
-            <a:schemeClr val="accent1"/>
-          </a:fillRef>
-          <a:effectRef idx="0">
-            <a:schemeClr val="accent1"/>
-          </a:effectRef>
-          <a:fontRef idx="minor">
-            <a:schemeClr val="tx1"/>
-          </a:fontRef>
-        </p:style>
-      </p:cxnSp>
-      <p:cxnSp>
-        <p:nvCxnSpPr>
-          <p:cNvPr id="60" name="Straight Arrow Connector 59">
-            <a:extLst>
-              <a:ext uri="{FF2B5EF4-FFF2-40B4-BE49-F238E27FC236}">
-                <a16:creationId xmlns:a16="http://schemas.microsoft.com/office/drawing/2014/main" id="{7C9F21BC-13A9-471F-825A-2621FD36355F}"/>
-              </a:ext>
-            </a:extLst>
-          </p:cNvPr>
-          <p:cNvCxnSpPr>
-            <a:cxnSpLocks/>
-          </p:cNvCxnSpPr>
-          <p:nvPr/>
-        </p:nvCxnSpPr>
-        <p:spPr>
-          <a:xfrm flipV="1">
-            <a:off x="7043991" y="3564914"/>
-            <a:ext cx="1470216" cy="6325"/>
-          </a:xfrm>
-          <a:prstGeom prst="straightConnector1">
-            <a:avLst/>
-          </a:prstGeom>
-          <a:ln w="19050">
-            <a:solidFill>
-              <a:srgbClr val="7030A0"/>
-            </a:solidFill>
-            <a:prstDash val="sysDash"/>
-            <a:headEnd type="arrow" w="med" len="med"/>
-            <a:tailEnd type="none" w="med" len="med"/>
-          </a:ln>
-        </p:spPr>
-        <p:style>
-          <a:lnRef idx="1">
-            <a:schemeClr val="accent1"/>
-          </a:lnRef>
-          <a:fillRef idx="0">
-            <a:schemeClr val="accent1"/>
-          </a:fillRef>
-          <a:effectRef idx="0">
-            <a:schemeClr val="accent1"/>
-          </a:effectRef>
-          <a:fontRef idx="minor">
-            <a:schemeClr val="tx1"/>
-          </a:fontRef>
-        </p:style>
-      </p:cxnSp>
-      <p:cxnSp>
-        <p:nvCxnSpPr>
-          <p:cNvPr id="63" name="Straight Arrow Connector 62">
-            <a:extLst>
-              <a:ext uri="{FF2B5EF4-FFF2-40B4-BE49-F238E27FC236}">
-                <a16:creationId xmlns:a16="http://schemas.microsoft.com/office/drawing/2014/main" id="{7C9F21BC-13A9-471F-825A-2621FD36355F}"/>
-              </a:ext>
-            </a:extLst>
-          </p:cNvPr>
-          <p:cNvCxnSpPr>
-            <a:cxnSpLocks/>
-            <a:endCxn id="49" idx="2"/>
-          </p:cNvCxnSpPr>
-          <p:nvPr/>
-        </p:nvCxnSpPr>
-        <p:spPr>
-          <a:xfrm>
-            <a:off x="5675919" y="3733799"/>
-            <a:ext cx="1296056" cy="0"/>
-          </a:xfrm>
-          <a:prstGeom prst="straightConnector1">
-            <a:avLst/>
-          </a:prstGeom>
-          <a:ln w="19050">
-            <a:solidFill>
-              <a:srgbClr val="7030A0"/>
-            </a:solidFill>
-            <a:prstDash val="sysDash"/>
-            <a:headEnd type="arrow" w="med" len="med"/>
-            <a:tailEnd type="none" w="med" len="med"/>
-          </a:ln>
-        </p:spPr>
-        <p:style>
-          <a:lnRef idx="1">
-            <a:schemeClr val="accent1"/>
-          </a:lnRef>
-          <a:fillRef idx="0">
-            <a:schemeClr val="accent1"/>
-          </a:fillRef>
-          <a:effectRef idx="0">
-            <a:schemeClr val="accent1"/>
-          </a:effectRef>
-          <a:fontRef idx="minor">
-            <a:schemeClr val="tx1"/>
-          </a:fontRef>
-        </p:style>
-      </p:cxnSp>
+              <a:prstDash val="sysDash"/>
+              <a:headEnd type="arrow" w="med" len="med"/>
+              <a:tailEnd type="none" w="med" len="med"/>
+            </a:ln>
+          </p:spPr>
+          <p:style>
+            <a:lnRef idx="1">
+              <a:schemeClr val="accent1"/>
+            </a:lnRef>
+            <a:fillRef idx="0">
+              <a:schemeClr val="accent1"/>
+            </a:fillRef>
+            <a:effectRef idx="0">
+              <a:schemeClr val="accent1"/>
+            </a:effectRef>
+            <a:fontRef idx="minor">
+              <a:schemeClr val="tx1"/>
+            </a:fontRef>
+          </p:style>
+        </p:cxnSp>
+        <p:cxnSp>
+          <p:nvCxnSpPr>
+            <p:cNvPr id="63" name="Straight Arrow Connector 62">
+              <a:extLst>
+                <a:ext uri="{FF2B5EF4-FFF2-40B4-BE49-F238E27FC236}">
+                  <a16:creationId xmlns:a16="http://schemas.microsoft.com/office/drawing/2014/main" id="{7C9F21BC-13A9-471F-825A-2621FD36355F}"/>
+                </a:ext>
+              </a:extLst>
+            </p:cNvPr>
+            <p:cNvCxnSpPr>
+              <a:cxnSpLocks/>
+              <a:endCxn id="49" idx="2"/>
+            </p:cNvCxnSpPr>
+            <p:nvPr/>
+          </p:nvCxnSpPr>
+          <p:spPr>
+            <a:xfrm>
+              <a:off x="5675919" y="3733799"/>
+              <a:ext cx="1296056" cy="0"/>
+            </a:xfrm>
+            <a:prstGeom prst="straightConnector1">
+              <a:avLst/>
+            </a:prstGeom>
+            <a:ln w="19050">
+              <a:solidFill>
+                <a:srgbClr val="7030A0"/>
+              </a:solidFill>
+              <a:prstDash val="sysDash"/>
+              <a:headEnd type="arrow" w="med" len="med"/>
+              <a:tailEnd type="none" w="med" len="med"/>
+            </a:ln>
+          </p:spPr>
+          <p:style>
+            <a:lnRef idx="1">
+              <a:schemeClr val="accent1"/>
+            </a:lnRef>
+            <a:fillRef idx="0">
+              <a:schemeClr val="accent1"/>
+            </a:fillRef>
+            <a:effectRef idx="0">
+              <a:schemeClr val="accent1"/>
+            </a:effectRef>
+            <a:fontRef idx="minor">
+              <a:schemeClr val="tx1"/>
+            </a:fontRef>
+          </p:style>
+        </p:cxnSp>
+      </p:grpSp>
     </p:spTree>
     <p:extLst>
       <p:ext uri="{BB962C8B-B14F-4D97-AF65-F5344CB8AC3E}">

</xml_diff>

<commit_message>
Revert "Edited AddDeleteEventSequenceDiagram to be seen in DeveloperGuide.adoc"
This reverts commit d9db019fe9d89e626d65b4266a482bfac74d2170.
</commit_message>
<xml_diff>
--- a/docs/diagrams/AddDeleteEventSequenceDiagram.pptx
+++ b/docs/diagrams/AddDeleteEventSequenceDiagram.pptx
@@ -208,7 +208,7 @@
           <a:p>
             <a:fld id="{F5CC4B3F-88C1-4FFA-B1B6-F41C21DC6924}" type="datetimeFigureOut">
               <a:rPr lang="en-US" smtClean="0"/>
-              <a:t>10/18/2018</a:t>
+              <a:t>10/17/2018</a:t>
             </a:fld>
             <a:endParaRPr lang="en-US"/>
           </a:p>
@@ -654,7 +654,7 @@
           <a:p>
             <a:fld id="{78C97017-6FC3-485B-9764-EAC9E56C1D49}" type="datetimeFigureOut">
               <a:rPr lang="en-US" smtClean="0"/>
-              <a:t>10/18/2018</a:t>
+              <a:t>10/17/2018</a:t>
             </a:fld>
             <a:endParaRPr lang="en-US"/>
           </a:p>
@@ -822,7 +822,7 @@
           <a:p>
             <a:fld id="{78C97017-6FC3-485B-9764-EAC9E56C1D49}" type="datetimeFigureOut">
               <a:rPr lang="en-US" smtClean="0"/>
-              <a:t>10/18/2018</a:t>
+              <a:t>10/17/2018</a:t>
             </a:fld>
             <a:endParaRPr lang="en-US"/>
           </a:p>
@@ -1000,7 +1000,7 @@
           <a:p>
             <a:fld id="{78C97017-6FC3-485B-9764-EAC9E56C1D49}" type="datetimeFigureOut">
               <a:rPr lang="en-US" smtClean="0"/>
-              <a:t>10/18/2018</a:t>
+              <a:t>10/17/2018</a:t>
             </a:fld>
             <a:endParaRPr lang="en-US"/>
           </a:p>
@@ -1168,7 +1168,7 @@
           <a:p>
             <a:fld id="{78C97017-6FC3-485B-9764-EAC9E56C1D49}" type="datetimeFigureOut">
               <a:rPr lang="en-US" smtClean="0"/>
-              <a:t>10/18/2018</a:t>
+              <a:t>10/17/2018</a:t>
             </a:fld>
             <a:endParaRPr lang="en-US"/>
           </a:p>
@@ -1413,7 +1413,7 @@
           <a:p>
             <a:fld id="{78C97017-6FC3-485B-9764-EAC9E56C1D49}" type="datetimeFigureOut">
               <a:rPr lang="en-US" smtClean="0"/>
-              <a:t>10/18/2018</a:t>
+              <a:t>10/17/2018</a:t>
             </a:fld>
             <a:endParaRPr lang="en-US"/>
           </a:p>
@@ -1698,7 +1698,7 @@
           <a:p>
             <a:fld id="{78C97017-6FC3-485B-9764-EAC9E56C1D49}" type="datetimeFigureOut">
               <a:rPr lang="en-US" smtClean="0"/>
-              <a:t>10/18/2018</a:t>
+              <a:t>10/17/2018</a:t>
             </a:fld>
             <a:endParaRPr lang="en-US"/>
           </a:p>
@@ -2117,7 +2117,7 @@
           <a:p>
             <a:fld id="{78C97017-6FC3-485B-9764-EAC9E56C1D49}" type="datetimeFigureOut">
               <a:rPr lang="en-US" smtClean="0"/>
-              <a:t>10/18/2018</a:t>
+              <a:t>10/17/2018</a:t>
             </a:fld>
             <a:endParaRPr lang="en-US"/>
           </a:p>
@@ -2234,7 +2234,7 @@
           <a:p>
             <a:fld id="{78C97017-6FC3-485B-9764-EAC9E56C1D49}" type="datetimeFigureOut">
               <a:rPr lang="en-US" smtClean="0"/>
-              <a:t>10/18/2018</a:t>
+              <a:t>10/17/2018</a:t>
             </a:fld>
             <a:endParaRPr lang="en-US"/>
           </a:p>
@@ -2329,7 +2329,7 @@
           <a:p>
             <a:fld id="{78C97017-6FC3-485B-9764-EAC9E56C1D49}" type="datetimeFigureOut">
               <a:rPr lang="en-US" smtClean="0"/>
-              <a:t>10/18/2018</a:t>
+              <a:t>10/17/2018</a:t>
             </a:fld>
             <a:endParaRPr lang="en-US"/>
           </a:p>
@@ -2604,7 +2604,7 @@
           <a:p>
             <a:fld id="{78C97017-6FC3-485B-9764-EAC9E56C1D49}" type="datetimeFigureOut">
               <a:rPr lang="en-US" smtClean="0"/>
-              <a:t>10/18/2018</a:t>
+              <a:t>10/17/2018</a:t>
             </a:fld>
             <a:endParaRPr lang="en-US"/>
           </a:p>
@@ -2856,7 +2856,7 @@
           <a:p>
             <a:fld id="{78C97017-6FC3-485B-9764-EAC9E56C1D49}" type="datetimeFigureOut">
               <a:rPr lang="en-US" smtClean="0"/>
-              <a:t>10/18/2018</a:t>
+              <a:t>10/17/2018</a:t>
             </a:fld>
             <a:endParaRPr lang="en-US"/>
           </a:p>
@@ -3067,7 +3067,7 @@
           <a:p>
             <a:fld id="{78C97017-6FC3-485B-9764-EAC9E56C1D49}" type="datetimeFigureOut">
               <a:rPr lang="en-US" smtClean="0"/>
-              <a:t>10/18/2018</a:t>
+              <a:t>10/17/2018</a:t>
             </a:fld>
             <a:endParaRPr lang="en-US"/>
           </a:p>
@@ -3442,1873 +3442,1852 @@
           <a:chExt cx="0" cy="0"/>
         </a:xfrm>
       </p:grpSpPr>
-      <p:grpSp>
-        <p:nvGrpSpPr>
-          <p:cNvPr id="3" name="Group 2">
+      <p:sp>
+        <p:nvSpPr>
+          <p:cNvPr id="56" name="Rectangle 65"/>
+          <p:cNvSpPr/>
+          <p:nvPr/>
+        </p:nvSpPr>
+        <p:spPr>
+          <a:xfrm>
+            <a:off x="6459374" y="75352"/>
+            <a:ext cx="3903825" cy="4400926"/>
+          </a:xfrm>
+          <a:prstGeom prst="roundRect">
+            <a:avLst>
+              <a:gd name="adj" fmla="val 3484"/>
+            </a:avLst>
+          </a:prstGeom>
+          <a:solidFill>
+            <a:schemeClr val="accent4">
+              <a:lumMod val="20000"/>
+              <a:lumOff val="80000"/>
+            </a:schemeClr>
+          </a:solidFill>
+          <a:ln w="19050">
+            <a:noFill/>
+          </a:ln>
+          <a:effectLst/>
+        </p:spPr>
+        <p:style>
+          <a:lnRef idx="1">
+            <a:schemeClr val="accent2"/>
+          </a:lnRef>
+          <a:fillRef idx="2">
+            <a:schemeClr val="accent2"/>
+          </a:fillRef>
+          <a:effectRef idx="1">
+            <a:schemeClr val="accent2"/>
+          </a:effectRef>
+          <a:fontRef idx="minor">
+            <a:schemeClr val="dk1"/>
+          </a:fontRef>
+        </p:style>
+        <p:txBody>
+          <a:bodyPr rtlCol="0" anchor="t"/>
+          <a:lstStyle/>
+          <a:p>
+            <a:r>
+              <a:rPr lang="en-US" sz="1200" b="1" dirty="0">
+                <a:solidFill>
+                  <a:srgbClr val="7030A0"/>
+                </a:solidFill>
+              </a:rPr>
+              <a:t>Model</a:t>
+            </a:r>
+            <a:endParaRPr lang="en-SG" sz="1200" b="1" dirty="0">
+              <a:solidFill>
+                <a:srgbClr val="7030A0"/>
+              </a:solidFill>
+            </a:endParaRPr>
+          </a:p>
+        </p:txBody>
+      </p:sp>
+      <p:sp>
+        <p:nvSpPr>
+          <p:cNvPr id="81" name="Rectangle 65"/>
+          <p:cNvSpPr/>
+          <p:nvPr/>
+        </p:nvSpPr>
+        <p:spPr>
+          <a:xfrm>
+            <a:off x="467813" y="119475"/>
+            <a:ext cx="5863964" cy="4343400"/>
+          </a:xfrm>
+          <a:prstGeom prst="roundRect">
+            <a:avLst>
+              <a:gd name="adj" fmla="val 3484"/>
+            </a:avLst>
+          </a:prstGeom>
+          <a:solidFill>
+            <a:schemeClr val="accent1">
+              <a:lumMod val="20000"/>
+              <a:lumOff val="80000"/>
+            </a:schemeClr>
+          </a:solidFill>
+          <a:ln w="19050">
+            <a:noFill/>
+          </a:ln>
+          <a:effectLst/>
+        </p:spPr>
+        <p:style>
+          <a:lnRef idx="1">
+            <a:schemeClr val="accent2"/>
+          </a:lnRef>
+          <a:fillRef idx="2">
+            <a:schemeClr val="accent2"/>
+          </a:fillRef>
+          <a:effectRef idx="1">
+            <a:schemeClr val="accent2"/>
+          </a:effectRef>
+          <a:fontRef idx="minor">
+            <a:schemeClr val="dk1"/>
+          </a:fontRef>
+        </p:style>
+        <p:txBody>
+          <a:bodyPr rtlCol="0" anchor="t"/>
+          <a:lstStyle/>
+          <a:p>
+            <a:r>
+              <a:rPr lang="en-US" sz="1200" b="1" dirty="0">
+                <a:solidFill>
+                  <a:srgbClr val="0070C0"/>
+                </a:solidFill>
+              </a:rPr>
+              <a:t>Logic</a:t>
+            </a:r>
+            <a:endParaRPr lang="en-SG" sz="1200" b="1" dirty="0">
+              <a:solidFill>
+                <a:srgbClr val="0070C0"/>
+              </a:solidFill>
+            </a:endParaRPr>
+          </a:p>
+        </p:txBody>
+      </p:sp>
+      <p:sp>
+        <p:nvSpPr>
+          <p:cNvPr id="2" name="Rectangle 62"/>
+          <p:cNvSpPr/>
+          <p:nvPr/>
+        </p:nvSpPr>
+        <p:spPr>
+          <a:xfrm>
+            <a:off x="883145" y="543946"/>
+            <a:ext cx="1455629" cy="346760"/>
+          </a:xfrm>
+          <a:prstGeom prst="rect">
+            <a:avLst/>
+          </a:prstGeom>
+          <a:solidFill>
+            <a:srgbClr val="0070C0"/>
+          </a:solidFill>
+          <a:ln w="19050">
+            <a:solidFill>
+              <a:srgbClr val="0070C0"/>
+            </a:solidFill>
+          </a:ln>
+          <a:effectLst/>
+        </p:spPr>
+        <p:style>
+          <a:lnRef idx="1">
+            <a:schemeClr val="accent2"/>
+          </a:lnRef>
+          <a:fillRef idx="2">
+            <a:schemeClr val="accent2"/>
+          </a:fillRef>
+          <a:effectRef idx="1">
+            <a:schemeClr val="accent2"/>
+          </a:effectRef>
+          <a:fontRef idx="minor">
+            <a:schemeClr val="dk1"/>
+          </a:fontRef>
+        </p:style>
+        <p:txBody>
+          <a:bodyPr rtlCol="0" anchor="ctr"/>
+          <a:lstStyle/>
+          <a:p>
+            <a:pPr algn="ctr"/>
+            <a:r>
+              <a:rPr lang="en-US" sz="1600" dirty="0">
+                <a:solidFill>
+                  <a:schemeClr val="bg1"/>
+                </a:solidFill>
+              </a:rPr>
+              <a:t>:</a:t>
+            </a:r>
+            <a:r>
+              <a:rPr lang="en-US" sz="1600" dirty="0" err="1">
+                <a:solidFill>
+                  <a:schemeClr val="bg1"/>
+                </a:solidFill>
+              </a:rPr>
+              <a:t>LogicManager</a:t>
+            </a:r>
+            <a:endParaRPr lang="en-SG" sz="1600" dirty="0">
+              <a:solidFill>
+                <a:schemeClr val="bg1"/>
+              </a:solidFill>
+            </a:endParaRPr>
+          </a:p>
+        </p:txBody>
+      </p:sp>
+      <p:cxnSp>
+        <p:nvCxnSpPr>
+          <p:cNvPr id="5" name="Straight Connector 4"/>
+          <p:cNvCxnSpPr>
+            <a:cxnSpLocks/>
+          </p:cNvCxnSpPr>
+          <p:nvPr/>
+        </p:nvCxnSpPr>
+        <p:spPr>
+          <a:xfrm>
+            <a:off x="1610959" y="907617"/>
+            <a:ext cx="0" cy="3481399"/>
+          </a:xfrm>
+          <a:prstGeom prst="line">
+            <a:avLst/>
+          </a:prstGeom>
+          <a:ln w="19050">
+            <a:solidFill>
+              <a:srgbClr val="0070C0"/>
+            </a:solidFill>
+            <a:prstDash val="sysDash"/>
+          </a:ln>
+          <a:effectLst/>
+        </p:spPr>
+        <p:style>
+          <a:lnRef idx="1">
+            <a:schemeClr val="accent1"/>
+          </a:lnRef>
+          <a:fillRef idx="2">
+            <a:schemeClr val="accent1"/>
+          </a:fillRef>
+          <a:effectRef idx="1">
+            <a:schemeClr val="accent1"/>
+          </a:effectRef>
+          <a:fontRef idx="minor">
+            <a:schemeClr val="dk1"/>
+          </a:fontRef>
+        </p:style>
+      </p:cxnSp>
+      <p:sp>
+        <p:nvSpPr>
+          <p:cNvPr id="6" name="Rectangle 5"/>
+          <p:cNvSpPr/>
+          <p:nvPr/>
+        </p:nvSpPr>
+        <p:spPr>
+          <a:xfrm>
+            <a:off x="1538951" y="1258311"/>
+            <a:ext cx="152400" cy="2932689"/>
+          </a:xfrm>
+          <a:prstGeom prst="rect">
+            <a:avLst/>
+          </a:prstGeom>
+          <a:solidFill>
+            <a:srgbClr val="0070C0"/>
+          </a:solidFill>
+          <a:ln>
+            <a:solidFill>
+              <a:srgbClr val="0070C0"/>
+            </a:solidFill>
+          </a:ln>
+          <a:effectLst/>
+        </p:spPr>
+        <p:style>
+          <a:lnRef idx="1">
+            <a:schemeClr val="accent3"/>
+          </a:lnRef>
+          <a:fillRef idx="2">
+            <a:schemeClr val="accent3"/>
+          </a:fillRef>
+          <a:effectRef idx="1">
+            <a:schemeClr val="accent3"/>
+          </a:effectRef>
+          <a:fontRef idx="minor">
+            <a:schemeClr val="dk1"/>
+          </a:fontRef>
+        </p:style>
+        <p:txBody>
+          <a:bodyPr rtlCol="0" anchor="ctr"/>
+          <a:lstStyle/>
+          <a:p>
+            <a:pPr algn="ctr"/>
+            <a:endParaRPr lang="en-SG" sz="1400"/>
+          </a:p>
+        </p:txBody>
+      </p:sp>
+      <p:sp>
+        <p:nvSpPr>
+          <p:cNvPr id="16" name="Rectangle 62"/>
+          <p:cNvSpPr/>
+          <p:nvPr/>
+        </p:nvSpPr>
+        <p:spPr>
+          <a:xfrm>
+            <a:off x="3437188" y="423022"/>
+            <a:ext cx="1219200" cy="467684"/>
+          </a:xfrm>
+          <a:prstGeom prst="rect">
+            <a:avLst/>
+          </a:prstGeom>
+          <a:solidFill>
+            <a:srgbClr val="0070C0"/>
+          </a:solidFill>
+          <a:ln w="19050">
+            <a:solidFill>
+              <a:srgbClr val="0070C0"/>
+            </a:solidFill>
+          </a:ln>
+          <a:effectLst/>
+        </p:spPr>
+        <p:style>
+          <a:lnRef idx="1">
+            <a:schemeClr val="accent2"/>
+          </a:lnRef>
+          <a:fillRef idx="2">
+            <a:schemeClr val="accent2"/>
+          </a:fillRef>
+          <a:effectRef idx="1">
+            <a:schemeClr val="accent2"/>
+          </a:effectRef>
+          <a:fontRef idx="minor">
+            <a:schemeClr val="dk1"/>
+          </a:fontRef>
+        </p:style>
+        <p:txBody>
+          <a:bodyPr rtlCol="0" anchor="ctr"/>
+          <a:lstStyle/>
+          <a:p>
+            <a:pPr algn="ctr"/>
+            <a:r>
+              <a:rPr lang="en-US" sz="1600" dirty="0">
+                <a:solidFill>
+                  <a:schemeClr val="bg1"/>
+                </a:solidFill>
+              </a:rPr>
+              <a:t>:Address</a:t>
+            </a:r>
+          </a:p>
+          <a:p>
+            <a:pPr algn="ctr"/>
+            <a:r>
+              <a:rPr lang="en-US" sz="1600" dirty="0" err="1">
+                <a:solidFill>
+                  <a:schemeClr val="bg1"/>
+                </a:solidFill>
+              </a:rPr>
+              <a:t>BookParser</a:t>
+            </a:r>
+            <a:endParaRPr lang="en-SG" sz="1600" dirty="0">
+              <a:solidFill>
+                <a:schemeClr val="bg1"/>
+              </a:solidFill>
+            </a:endParaRPr>
+          </a:p>
+        </p:txBody>
+      </p:sp>
+      <p:cxnSp>
+        <p:nvCxnSpPr>
+          <p:cNvPr id="17" name="Straight Connector 16"/>
+          <p:cNvCxnSpPr>
+            <a:cxnSpLocks/>
+          </p:cNvCxnSpPr>
+          <p:nvPr/>
+        </p:nvCxnSpPr>
+        <p:spPr>
+          <a:xfrm>
+            <a:off x="4050587" y="907617"/>
+            <a:ext cx="0" cy="1482984"/>
+          </a:xfrm>
+          <a:prstGeom prst="line">
+            <a:avLst/>
+          </a:prstGeom>
+          <a:ln w="19050">
+            <a:solidFill>
+              <a:srgbClr val="0070C0"/>
+            </a:solidFill>
+            <a:prstDash val="sysDash"/>
+          </a:ln>
+          <a:effectLst/>
+        </p:spPr>
+        <p:style>
+          <a:lnRef idx="1">
+            <a:schemeClr val="accent1"/>
+          </a:lnRef>
+          <a:fillRef idx="2">
+            <a:schemeClr val="accent1"/>
+          </a:fillRef>
+          <a:effectRef idx="1">
+            <a:schemeClr val="accent1"/>
+          </a:effectRef>
+          <a:fontRef idx="minor">
+            <a:schemeClr val="dk1"/>
+          </a:fontRef>
+        </p:style>
+      </p:cxnSp>
+      <p:sp>
+        <p:nvSpPr>
+          <p:cNvPr id="18" name="Rectangle 17"/>
+          <p:cNvSpPr/>
+          <p:nvPr/>
+        </p:nvSpPr>
+        <p:spPr>
+          <a:xfrm>
+            <a:off x="3978580" y="1365810"/>
+            <a:ext cx="154408" cy="767790"/>
+          </a:xfrm>
+          <a:prstGeom prst="rect">
+            <a:avLst/>
+          </a:prstGeom>
+          <a:solidFill>
+            <a:srgbClr val="0070C0"/>
+          </a:solidFill>
+          <a:ln>
+            <a:solidFill>
+              <a:srgbClr val="0070C0"/>
+            </a:solidFill>
+          </a:ln>
+          <a:effectLst/>
+        </p:spPr>
+        <p:style>
+          <a:lnRef idx="1">
+            <a:schemeClr val="accent3"/>
+          </a:lnRef>
+          <a:fillRef idx="2">
+            <a:schemeClr val="accent3"/>
+          </a:fillRef>
+          <a:effectRef idx="1">
+            <a:schemeClr val="accent3"/>
+          </a:effectRef>
+          <a:fontRef idx="minor">
+            <a:schemeClr val="dk1"/>
+          </a:fontRef>
+        </p:style>
+        <p:txBody>
+          <a:bodyPr rtlCol="0" anchor="ctr"/>
+          <a:lstStyle/>
+          <a:p>
+            <a:pPr algn="ctr"/>
+            <a:endParaRPr lang="en-SG" sz="1400">
+              <a:solidFill>
+                <a:schemeClr val="dk1"/>
+              </a:solidFill>
+            </a:endParaRPr>
+          </a:p>
+        </p:txBody>
+      </p:sp>
+      <p:cxnSp>
+        <p:nvCxnSpPr>
+          <p:cNvPr id="20" name="Straight Connector 19"/>
+          <p:cNvCxnSpPr>
+            <a:cxnSpLocks/>
+            <a:stCxn id="21" idx="0"/>
+            <a:endCxn id="4" idx="0"/>
+          </p:cNvCxnSpPr>
+          <p:nvPr/>
+        </p:nvCxnSpPr>
+        <p:spPr>
+          <a:xfrm>
+            <a:off x="5602082" y="1613633"/>
+            <a:ext cx="0" cy="2644578"/>
+          </a:xfrm>
+          <a:prstGeom prst="line">
+            <a:avLst/>
+          </a:prstGeom>
+          <a:ln w="19050">
+            <a:solidFill>
+              <a:srgbClr val="0070C0"/>
+            </a:solidFill>
+            <a:prstDash val="sysDash"/>
+          </a:ln>
+          <a:effectLst/>
+        </p:spPr>
+        <p:style>
+          <a:lnRef idx="1">
+            <a:schemeClr val="accent1"/>
+          </a:lnRef>
+          <a:fillRef idx="2">
+            <a:schemeClr val="accent1"/>
+          </a:fillRef>
+          <a:effectRef idx="1">
+            <a:schemeClr val="accent1"/>
+          </a:effectRef>
+          <a:fontRef idx="minor">
+            <a:schemeClr val="dk1"/>
+          </a:fontRef>
+        </p:style>
+      </p:cxnSp>
+      <p:sp>
+        <p:nvSpPr>
+          <p:cNvPr id="21" name="Rectangle 20"/>
+          <p:cNvSpPr/>
+          <p:nvPr/>
+        </p:nvSpPr>
+        <p:spPr>
+          <a:xfrm>
+            <a:off x="5525882" y="1613633"/>
+            <a:ext cx="152400" cy="276003"/>
+          </a:xfrm>
+          <a:prstGeom prst="rect">
+            <a:avLst/>
+          </a:prstGeom>
+          <a:solidFill>
+            <a:srgbClr val="0070C0"/>
+          </a:solidFill>
+          <a:ln>
+            <a:solidFill>
+              <a:srgbClr val="0070C0"/>
+            </a:solidFill>
+          </a:ln>
+          <a:effectLst/>
+        </p:spPr>
+        <p:style>
+          <a:lnRef idx="1">
+            <a:schemeClr val="accent3"/>
+          </a:lnRef>
+          <a:fillRef idx="2">
+            <a:schemeClr val="accent3"/>
+          </a:fillRef>
+          <a:effectRef idx="1">
+            <a:schemeClr val="accent3"/>
+          </a:effectRef>
+          <a:fontRef idx="minor">
+            <a:schemeClr val="dk1"/>
+          </a:fontRef>
+        </p:style>
+        <p:txBody>
+          <a:bodyPr rtlCol="0" anchor="ctr"/>
+          <a:lstStyle/>
+          <a:p>
+            <a:pPr algn="ctr"/>
+            <a:endParaRPr lang="en-SG" sz="1400"/>
+          </a:p>
+        </p:txBody>
+      </p:sp>
+      <p:cxnSp>
+        <p:nvCxnSpPr>
+          <p:cNvPr id="23" name="Straight Arrow Connector 22"/>
+          <p:cNvCxnSpPr/>
+          <p:nvPr/>
+        </p:nvCxnSpPr>
+        <p:spPr>
+          <a:xfrm>
+            <a:off x="419100" y="1261999"/>
+            <a:ext cx="1119851" cy="0"/>
+          </a:xfrm>
+          <a:prstGeom prst="straightConnector1">
+            <a:avLst/>
+          </a:prstGeom>
+          <a:ln w="19050">
+            <a:solidFill>
+              <a:srgbClr val="00B050"/>
+            </a:solidFill>
+            <a:tailEnd type="arrow"/>
+          </a:ln>
+        </p:spPr>
+        <p:style>
+          <a:lnRef idx="1">
+            <a:schemeClr val="accent1"/>
+          </a:lnRef>
+          <a:fillRef idx="0">
+            <a:schemeClr val="accent1"/>
+          </a:fillRef>
+          <a:effectRef idx="0">
+            <a:schemeClr val="accent1"/>
+          </a:effectRef>
+          <a:fontRef idx="minor">
+            <a:schemeClr val="tx1"/>
+          </a:fontRef>
+        </p:style>
+      </p:cxnSp>
+      <p:sp>
+        <p:nvSpPr>
+          <p:cNvPr id="26" name="TextBox 25"/>
+          <p:cNvSpPr txBox="1"/>
+          <p:nvPr/>
+        </p:nvSpPr>
+        <p:spPr>
+          <a:xfrm>
+            <a:off x="-457192" y="990600"/>
+            <a:ext cx="1920138" cy="214449"/>
+          </a:xfrm>
+          <a:prstGeom prst="rect">
+            <a:avLst/>
+          </a:prstGeom>
+          <a:noFill/>
+        </p:spPr>
+        <p:txBody>
+          <a:bodyPr wrap="square" lIns="0" tIns="0" rIns="0" bIns="0" rtlCol="0">
+            <a:spAutoFit/>
+          </a:bodyPr>
+          <a:lstStyle/>
+          <a:p>
+            <a:pPr algn="r"/>
+            <a:r>
+              <a:rPr lang="en-US" sz="1400" dirty="0">
+                <a:solidFill>
+                  <a:srgbClr val="0070C0"/>
+                </a:solidFill>
+              </a:rPr>
+              <a:t>execute(“</a:t>
+            </a:r>
+            <a:r>
+              <a:rPr lang="en-US" sz="1400" dirty="0" err="1">
+                <a:solidFill>
+                  <a:srgbClr val="0070C0"/>
+                </a:solidFill>
+              </a:rPr>
+              <a:t>add_event</a:t>
+            </a:r>
+            <a:r>
+              <a:rPr lang="en-US" sz="1400" dirty="0">
+                <a:solidFill>
+                  <a:srgbClr val="0070C0"/>
+                </a:solidFill>
+              </a:rPr>
+              <a:t>”)</a:t>
+            </a:r>
+          </a:p>
+        </p:txBody>
+      </p:sp>
+      <p:cxnSp>
+        <p:nvCxnSpPr>
+          <p:cNvPr id="28" name="Straight Arrow Connector 27"/>
+          <p:cNvCxnSpPr/>
+          <p:nvPr/>
+        </p:nvCxnSpPr>
+        <p:spPr>
+          <a:xfrm flipV="1">
+            <a:off x="4135972" y="1512340"/>
+            <a:ext cx="922392" cy="1"/>
+          </a:xfrm>
+          <a:prstGeom prst="straightConnector1">
+            <a:avLst/>
+          </a:prstGeom>
+          <a:ln w="19050">
+            <a:solidFill>
+              <a:srgbClr val="0070C0"/>
+            </a:solidFill>
+            <a:tailEnd type="arrow"/>
+          </a:ln>
+        </p:spPr>
+        <p:style>
+          <a:lnRef idx="1">
+            <a:schemeClr val="accent1"/>
+          </a:lnRef>
+          <a:fillRef idx="0">
+            <a:schemeClr val="accent1"/>
+          </a:fillRef>
+          <a:effectRef idx="0">
+            <a:schemeClr val="accent1"/>
+          </a:effectRef>
+          <a:fontRef idx="minor">
+            <a:schemeClr val="tx1"/>
+          </a:fontRef>
+        </p:style>
+      </p:cxnSp>
+      <p:sp>
+        <p:nvSpPr>
+          <p:cNvPr id="29" name="TextBox 28"/>
+          <p:cNvSpPr txBox="1"/>
+          <p:nvPr/>
+        </p:nvSpPr>
+        <p:spPr>
+          <a:xfrm>
+            <a:off x="3243421" y="2484071"/>
+            <a:ext cx="855809" cy="215444"/>
+          </a:xfrm>
+          <a:prstGeom prst="rect">
+            <a:avLst/>
+          </a:prstGeom>
+          <a:noFill/>
+        </p:spPr>
+        <p:txBody>
+          <a:bodyPr wrap="square" lIns="0" tIns="0" rIns="0" bIns="0" rtlCol="0">
+            <a:spAutoFit/>
+          </a:bodyPr>
+          <a:lstStyle>
+            <a:defPPr>
+              <a:defRPr lang="en-US"/>
+            </a:defPPr>
+            <a:lvl1pPr algn="r">
+              <a:defRPr sz="1400">
+                <a:solidFill>
+                  <a:srgbClr val="0070C0"/>
+                </a:solidFill>
+              </a:defRPr>
+            </a:lvl1pPr>
+          </a:lstStyle>
+          <a:p>
+            <a:r>
+              <a:rPr lang="en-US" dirty="0"/>
+              <a:t>execute()</a:t>
+            </a:r>
+          </a:p>
+        </p:txBody>
+      </p:sp>
+      <p:cxnSp>
+        <p:nvCxnSpPr>
+          <p:cNvPr id="34" name="Straight Arrow Connector 33"/>
+          <p:cNvCxnSpPr/>
+          <p:nvPr/>
+        </p:nvCxnSpPr>
+        <p:spPr>
+          <a:xfrm>
+            <a:off x="4109108" y="1878232"/>
+            <a:ext cx="1492974" cy="0"/>
+          </a:xfrm>
+          <a:prstGeom prst="straightConnector1">
+            <a:avLst/>
+          </a:prstGeom>
+          <a:ln w="19050">
+            <a:solidFill>
+              <a:srgbClr val="0070C0"/>
+            </a:solidFill>
+            <a:prstDash val="sysDash"/>
+            <a:headEnd type="arrow" w="med" len="med"/>
+            <a:tailEnd type="none" w="med" len="med"/>
+          </a:ln>
+        </p:spPr>
+        <p:style>
+          <a:lnRef idx="1">
+            <a:schemeClr val="accent1"/>
+          </a:lnRef>
+          <a:fillRef idx="0">
+            <a:schemeClr val="accent1"/>
+          </a:fillRef>
+          <a:effectRef idx="0">
+            <a:schemeClr val="accent1"/>
+          </a:effectRef>
+          <a:fontRef idx="minor">
+            <a:schemeClr val="tx1"/>
+          </a:fontRef>
+        </p:style>
+      </p:cxnSp>
+      <p:cxnSp>
+        <p:nvCxnSpPr>
+          <p:cNvPr id="35" name="Straight Arrow Connector 34"/>
+          <p:cNvCxnSpPr>
+            <a:cxnSpLocks/>
+          </p:cNvCxnSpPr>
+          <p:nvPr/>
+        </p:nvCxnSpPr>
+        <p:spPr>
+          <a:xfrm>
+            <a:off x="1691351" y="2133600"/>
+            <a:ext cx="2348067" cy="0"/>
+          </a:xfrm>
+          <a:prstGeom prst="straightConnector1">
+            <a:avLst/>
+          </a:prstGeom>
+          <a:ln w="19050">
+            <a:solidFill>
+              <a:srgbClr val="0070C0"/>
+            </a:solidFill>
+            <a:prstDash val="sysDash"/>
+            <a:headEnd type="arrow" w="med" len="med"/>
+            <a:tailEnd type="none" w="med" len="med"/>
+          </a:ln>
+        </p:spPr>
+        <p:style>
+          <a:lnRef idx="1">
+            <a:schemeClr val="accent1"/>
+          </a:lnRef>
+          <a:fillRef idx="0">
+            <a:schemeClr val="accent1"/>
+          </a:fillRef>
+          <a:effectRef idx="0">
+            <a:schemeClr val="accent1"/>
+          </a:effectRef>
+          <a:fontRef idx="minor">
+            <a:schemeClr val="tx1"/>
+          </a:fontRef>
+        </p:style>
+      </p:cxnSp>
+      <p:cxnSp>
+        <p:nvCxnSpPr>
+          <p:cNvPr id="37" name="Straight Arrow Connector 36"/>
+          <p:cNvCxnSpPr/>
+          <p:nvPr/>
+        </p:nvCxnSpPr>
+        <p:spPr>
+          <a:xfrm>
+            <a:off x="380999" y="4191000"/>
+            <a:ext cx="1196051" cy="0"/>
+          </a:xfrm>
+          <a:prstGeom prst="straightConnector1">
+            <a:avLst/>
+          </a:prstGeom>
+          <a:ln w="19050">
+            <a:solidFill>
+              <a:schemeClr val="accent1"/>
+            </a:solidFill>
+            <a:prstDash val="sysDash"/>
+            <a:headEnd type="arrow" w="med" len="med"/>
+            <a:tailEnd type="none" w="med" len="med"/>
+          </a:ln>
+        </p:spPr>
+        <p:style>
+          <a:lnRef idx="1">
+            <a:schemeClr val="accent1"/>
+          </a:lnRef>
+          <a:fillRef idx="0">
+            <a:schemeClr val="accent1"/>
+          </a:fillRef>
+          <a:effectRef idx="0">
+            <a:schemeClr val="accent1"/>
+          </a:effectRef>
+          <a:fontRef idx="minor">
+            <a:schemeClr val="tx1"/>
+          </a:fontRef>
+        </p:style>
+      </p:cxnSp>
+      <p:sp>
+        <p:nvSpPr>
+          <p:cNvPr id="65" name="Rectangle 64"/>
+          <p:cNvSpPr/>
+          <p:nvPr/>
+        </p:nvSpPr>
+        <p:spPr>
+          <a:xfrm>
+            <a:off x="5526488" y="2731313"/>
+            <a:ext cx="161322" cy="1307285"/>
+          </a:xfrm>
+          <a:prstGeom prst="rect">
+            <a:avLst/>
+          </a:prstGeom>
+          <a:solidFill>
+            <a:srgbClr val="0070C0"/>
+          </a:solidFill>
+          <a:ln>
+            <a:solidFill>
+              <a:srgbClr val="0070C0"/>
+            </a:solidFill>
+          </a:ln>
+          <a:effectLst/>
+        </p:spPr>
+        <p:style>
+          <a:lnRef idx="1">
+            <a:schemeClr val="accent3"/>
+          </a:lnRef>
+          <a:fillRef idx="2">
+            <a:schemeClr val="accent3"/>
+          </a:fillRef>
+          <a:effectRef idx="1">
+            <a:schemeClr val="accent3"/>
+          </a:effectRef>
+          <a:fontRef idx="minor">
+            <a:schemeClr val="dk1"/>
+          </a:fontRef>
+        </p:style>
+        <p:txBody>
+          <a:bodyPr rtlCol="0" anchor="ctr"/>
+          <a:lstStyle/>
+          <a:p>
+            <a:pPr algn="ctr"/>
+            <a:endParaRPr lang="en-SG" sz="1400"/>
+          </a:p>
+        </p:txBody>
+      </p:sp>
+      <p:sp>
+        <p:nvSpPr>
+          <p:cNvPr id="79" name="TextBox 78"/>
+          <p:cNvSpPr txBox="1"/>
+          <p:nvPr/>
+        </p:nvSpPr>
+        <p:spPr>
+          <a:xfrm>
+            <a:off x="6194514" y="2748246"/>
+            <a:ext cx="755111" cy="184666"/>
+          </a:xfrm>
+          <a:prstGeom prst="rect">
+            <a:avLst/>
+          </a:prstGeom>
+          <a:noFill/>
+        </p:spPr>
+        <p:txBody>
+          <a:bodyPr wrap="square" lIns="0" tIns="0" rIns="0" bIns="0" rtlCol="0">
+            <a:spAutoFit/>
+          </a:bodyPr>
+          <a:lstStyle>
+            <a:defPPr>
+              <a:defRPr lang="en-US"/>
+            </a:defPPr>
+            <a:lvl1pPr algn="r">
+              <a:defRPr sz="1400">
+                <a:solidFill>
+                  <a:srgbClr val="0070C0"/>
+                </a:solidFill>
+              </a:defRPr>
+            </a:lvl1pPr>
+          </a:lstStyle>
+          <a:p>
+            <a:r>
+              <a:rPr lang="en-US" sz="1200" dirty="0" err="1">
+                <a:solidFill>
+                  <a:schemeClr val="accent4">
+                    <a:lumMod val="75000"/>
+                  </a:schemeClr>
+                </a:solidFill>
+              </a:rPr>
+              <a:t>addEvent</a:t>
+            </a:r>
+            <a:r>
+              <a:rPr lang="en-US" sz="1200" dirty="0">
+                <a:solidFill>
+                  <a:srgbClr val="7030A0"/>
+                </a:solidFill>
+              </a:rPr>
+              <a:t>()</a:t>
+            </a:r>
+            <a:endParaRPr lang="en-US" sz="1200" dirty="0"/>
+          </a:p>
+        </p:txBody>
+      </p:sp>
+      <p:sp>
+        <p:nvSpPr>
+          <p:cNvPr id="80" name="TextBox 79"/>
+          <p:cNvSpPr txBox="1"/>
+          <p:nvPr/>
+        </p:nvSpPr>
+        <p:spPr>
+          <a:xfrm>
+            <a:off x="1622129" y="1106152"/>
+            <a:ext cx="2271840" cy="215444"/>
+          </a:xfrm>
+          <a:prstGeom prst="rect">
+            <a:avLst/>
+          </a:prstGeom>
+          <a:noFill/>
+        </p:spPr>
+        <p:txBody>
+          <a:bodyPr wrap="square" lIns="0" tIns="0" rIns="0" bIns="0" rtlCol="0">
+            <a:spAutoFit/>
+          </a:bodyPr>
+          <a:lstStyle>
+            <a:defPPr>
+              <a:defRPr lang="en-US"/>
+            </a:defPPr>
+            <a:lvl1pPr algn="r">
+              <a:defRPr sz="1400">
+                <a:solidFill>
+                  <a:srgbClr val="0070C0"/>
+                </a:solidFill>
+              </a:defRPr>
+            </a:lvl1pPr>
+          </a:lstStyle>
+          <a:p>
+            <a:r>
+              <a:rPr lang="en-US" dirty="0" err="1"/>
+              <a:t>parseCommand</a:t>
+            </a:r>
+            <a:r>
+              <a:rPr lang="en-US" dirty="0"/>
+              <a:t>(“</a:t>
+            </a:r>
+            <a:r>
+              <a:rPr lang="en-US" dirty="0" err="1"/>
+              <a:t>add_event</a:t>
+            </a:r>
+            <a:r>
+              <a:rPr lang="en-US" dirty="0"/>
+              <a:t>”)</a:t>
+            </a:r>
+          </a:p>
+        </p:txBody>
+      </p:sp>
+      <p:sp>
+        <p:nvSpPr>
+          <p:cNvPr id="82" name="TextBox 81"/>
+          <p:cNvSpPr txBox="1"/>
+          <p:nvPr/>
+        </p:nvSpPr>
+        <p:spPr>
+          <a:xfrm>
+            <a:off x="3272755" y="3791076"/>
+            <a:ext cx="621216" cy="215444"/>
+          </a:xfrm>
+          <a:prstGeom prst="rect">
+            <a:avLst/>
+          </a:prstGeom>
+          <a:noFill/>
+        </p:spPr>
+        <p:txBody>
+          <a:bodyPr wrap="square" lIns="0" tIns="0" rIns="0" bIns="0" rtlCol="0">
+            <a:spAutoFit/>
+          </a:bodyPr>
+          <a:lstStyle>
+            <a:defPPr>
+              <a:defRPr lang="en-US"/>
+            </a:defPPr>
+            <a:lvl1pPr algn="r">
+              <a:defRPr sz="1400">
+                <a:solidFill>
+                  <a:srgbClr val="0070C0"/>
+                </a:solidFill>
+              </a:defRPr>
+            </a:lvl1pPr>
+          </a:lstStyle>
+          <a:p>
+            <a:r>
+              <a:rPr lang="en-US" dirty="0"/>
+              <a:t>result</a:t>
+            </a:r>
+          </a:p>
+        </p:txBody>
+      </p:sp>
+      <p:sp>
+        <p:nvSpPr>
+          <p:cNvPr id="83" name="TextBox 82"/>
+          <p:cNvSpPr txBox="1"/>
+          <p:nvPr/>
+        </p:nvSpPr>
+        <p:spPr>
+          <a:xfrm>
+            <a:off x="645270" y="3945901"/>
+            <a:ext cx="762000" cy="215444"/>
+          </a:xfrm>
+          <a:prstGeom prst="rect">
+            <a:avLst/>
+          </a:prstGeom>
+          <a:noFill/>
+        </p:spPr>
+        <p:txBody>
+          <a:bodyPr wrap="square" lIns="0" tIns="0" rIns="0" bIns="0" rtlCol="0">
+            <a:spAutoFit/>
+          </a:bodyPr>
+          <a:lstStyle>
+            <a:defPPr>
+              <a:defRPr lang="en-US"/>
+            </a:defPPr>
+            <a:lvl1pPr algn="r">
+              <a:defRPr sz="1400">
+                <a:solidFill>
+                  <a:srgbClr val="0070C0"/>
+                </a:solidFill>
+              </a:defRPr>
+            </a:lvl1pPr>
+          </a:lstStyle>
+          <a:p>
+            <a:r>
+              <a:rPr lang="en-US" dirty="0"/>
+              <a:t>result</a:t>
+            </a:r>
+          </a:p>
+        </p:txBody>
+      </p:sp>
+      <p:sp>
+        <p:nvSpPr>
+          <p:cNvPr id="84" name="Rectangle 62"/>
+          <p:cNvSpPr/>
+          <p:nvPr/>
+        </p:nvSpPr>
+        <p:spPr>
+          <a:xfrm>
+            <a:off x="7497155" y="2568606"/>
+            <a:ext cx="2181777" cy="335427"/>
+          </a:xfrm>
+          <a:prstGeom prst="rect">
+            <a:avLst/>
+          </a:prstGeom>
+          <a:solidFill>
+            <a:srgbClr val="7030A0"/>
+          </a:solidFill>
+          <a:ln w="19050">
+            <a:solidFill>
+              <a:srgbClr val="7030A0"/>
+            </a:solidFill>
+          </a:ln>
+          <a:effectLst/>
+        </p:spPr>
+        <p:style>
+          <a:lnRef idx="1">
+            <a:schemeClr val="accent2"/>
+          </a:lnRef>
+          <a:fillRef idx="2">
+            <a:schemeClr val="accent2"/>
+          </a:fillRef>
+          <a:effectRef idx="1">
+            <a:schemeClr val="accent2"/>
+          </a:effectRef>
+          <a:fontRef idx="minor">
+            <a:schemeClr val="dk1"/>
+          </a:fontRef>
+        </p:style>
+        <p:txBody>
+          <a:bodyPr rtlCol="0" anchor="ctr"/>
+          <a:lstStyle/>
+          <a:p>
+            <a:pPr algn="ctr"/>
+            <a:r>
+              <a:rPr lang="en-US" sz="1600" dirty="0">
+                <a:solidFill>
+                  <a:schemeClr val="bg1"/>
+                </a:solidFill>
+              </a:rPr>
+              <a:t>:</a:t>
+            </a:r>
+            <a:r>
+              <a:rPr lang="en-US" sz="1600" dirty="0" err="1">
+                <a:solidFill>
+                  <a:schemeClr val="bg1"/>
+                </a:solidFill>
+              </a:rPr>
+              <a:t>VersionedAddressBook</a:t>
+            </a:r>
+            <a:endParaRPr lang="en-SG" sz="1600" dirty="0">
+              <a:solidFill>
+                <a:schemeClr val="bg1"/>
+              </a:solidFill>
+            </a:endParaRPr>
+          </a:p>
+        </p:txBody>
+      </p:sp>
+      <p:sp>
+        <p:nvSpPr>
+          <p:cNvPr id="86" name="Rectangle 85"/>
+          <p:cNvSpPr/>
+          <p:nvPr/>
+        </p:nvSpPr>
+        <p:spPr>
+          <a:xfrm>
+            <a:off x="8514207" y="3182840"/>
+            <a:ext cx="129933" cy="398562"/>
+          </a:xfrm>
+          <a:prstGeom prst="rect">
+            <a:avLst/>
+          </a:prstGeom>
+          <a:solidFill>
+            <a:srgbClr val="7030A0"/>
+          </a:solidFill>
+          <a:ln>
+            <a:solidFill>
+              <a:srgbClr val="7030A0"/>
+            </a:solidFill>
+          </a:ln>
+          <a:effectLst/>
+        </p:spPr>
+        <p:style>
+          <a:lnRef idx="1">
+            <a:schemeClr val="accent3"/>
+          </a:lnRef>
+          <a:fillRef idx="2">
+            <a:schemeClr val="accent3"/>
+          </a:fillRef>
+          <a:effectRef idx="1">
+            <a:schemeClr val="accent3"/>
+          </a:effectRef>
+          <a:fontRef idx="minor">
+            <a:schemeClr val="dk1"/>
+          </a:fontRef>
+        </p:style>
+        <p:txBody>
+          <a:bodyPr rtlCol="0" anchor="ctr"/>
+          <a:lstStyle/>
+          <a:p>
+            <a:pPr algn="ctr"/>
+            <a:endParaRPr lang="en-SG" sz="1400"/>
+          </a:p>
+        </p:txBody>
+      </p:sp>
+      <p:sp>
+        <p:nvSpPr>
+          <p:cNvPr id="93" name="TextBox 92"/>
+          <p:cNvSpPr txBox="1"/>
+          <p:nvPr/>
+        </p:nvSpPr>
+        <p:spPr>
+          <a:xfrm>
+            <a:off x="2724792" y="1905793"/>
+            <a:ext cx="220343" cy="215444"/>
+          </a:xfrm>
+          <a:prstGeom prst="rect">
+            <a:avLst/>
+          </a:prstGeom>
+          <a:noFill/>
+        </p:spPr>
+        <p:txBody>
+          <a:bodyPr wrap="square" lIns="0" tIns="0" rIns="0" bIns="0" rtlCol="0">
+            <a:spAutoFit/>
+          </a:bodyPr>
+          <a:lstStyle>
+            <a:defPPr>
+              <a:defRPr lang="en-US"/>
+            </a:defPPr>
+            <a:lvl1pPr algn="r">
+              <a:defRPr sz="1400">
+                <a:solidFill>
+                  <a:srgbClr val="0070C0"/>
+                </a:solidFill>
+              </a:defRPr>
+            </a:lvl1pPr>
+          </a:lstStyle>
+          <a:p>
+            <a:r>
+              <a:rPr lang="en-US" dirty="0"/>
+              <a:t>a</a:t>
+            </a:r>
+          </a:p>
+        </p:txBody>
+      </p:sp>
+      <p:sp>
+        <p:nvSpPr>
+          <p:cNvPr id="40" name="Rectangle 62"/>
+          <p:cNvSpPr/>
+          <p:nvPr/>
+        </p:nvSpPr>
+        <p:spPr>
+          <a:xfrm>
+            <a:off x="6549765" y="2362200"/>
+            <a:ext cx="841636" cy="300180"/>
+          </a:xfrm>
+          <a:prstGeom prst="rect">
+            <a:avLst/>
+          </a:prstGeom>
+          <a:solidFill>
+            <a:srgbClr val="7030A0"/>
+          </a:solidFill>
+          <a:ln w="19050">
+            <a:solidFill>
+              <a:srgbClr val="7030A0"/>
+            </a:solidFill>
+          </a:ln>
+          <a:effectLst/>
+        </p:spPr>
+        <p:style>
+          <a:lnRef idx="1">
+            <a:schemeClr val="accent2"/>
+          </a:lnRef>
+          <a:fillRef idx="2">
+            <a:schemeClr val="accent2"/>
+          </a:fillRef>
+          <a:effectRef idx="1">
+            <a:schemeClr val="accent2"/>
+          </a:effectRef>
+          <a:fontRef idx="minor">
+            <a:schemeClr val="dk1"/>
+          </a:fontRef>
+        </p:style>
+        <p:txBody>
+          <a:bodyPr rtlCol="0" anchor="ctr"/>
+          <a:lstStyle/>
+          <a:p>
+            <a:pPr algn="ctr"/>
+            <a:r>
+              <a:rPr lang="en-US" sz="1600" dirty="0">
+                <a:solidFill>
+                  <a:schemeClr val="bg1"/>
+                </a:solidFill>
+              </a:rPr>
+              <a:t>: Model</a:t>
+            </a:r>
+            <a:endParaRPr lang="en-SG" sz="1600" dirty="0">
+              <a:solidFill>
+                <a:schemeClr val="bg1"/>
+              </a:solidFill>
+            </a:endParaRPr>
+          </a:p>
+        </p:txBody>
+      </p:sp>
+      <p:cxnSp>
+        <p:nvCxnSpPr>
+          <p:cNvPr id="46" name="Straight Connector 45"/>
+          <p:cNvCxnSpPr>
+            <a:cxnSpLocks/>
+          </p:cNvCxnSpPr>
+          <p:nvPr/>
+        </p:nvCxnSpPr>
+        <p:spPr>
+          <a:xfrm flipH="1">
+            <a:off x="6986491" y="2653306"/>
+            <a:ext cx="3959" cy="1735710"/>
+          </a:xfrm>
+          <a:prstGeom prst="line">
+            <a:avLst/>
+          </a:prstGeom>
+          <a:ln w="19050">
+            <a:solidFill>
+              <a:srgbClr val="7030A0"/>
+            </a:solidFill>
+            <a:prstDash val="sysDash"/>
+          </a:ln>
+          <a:effectLst/>
+        </p:spPr>
+        <p:style>
+          <a:lnRef idx="1">
+            <a:schemeClr val="accent1"/>
+          </a:lnRef>
+          <a:fillRef idx="2">
+            <a:schemeClr val="accent1"/>
+          </a:fillRef>
+          <a:effectRef idx="1">
+            <a:schemeClr val="accent1"/>
+          </a:effectRef>
+          <a:fontRef idx="minor">
+            <a:schemeClr val="dk1"/>
+          </a:fontRef>
+        </p:style>
+      </p:cxnSp>
+      <p:sp>
+        <p:nvSpPr>
+          <p:cNvPr id="49" name="Rectangle 48"/>
+          <p:cNvSpPr/>
+          <p:nvPr/>
+        </p:nvSpPr>
+        <p:spPr>
+          <a:xfrm>
+            <a:off x="6887527" y="2958106"/>
+            <a:ext cx="168896" cy="775693"/>
+          </a:xfrm>
+          <a:prstGeom prst="rect">
+            <a:avLst/>
+          </a:prstGeom>
+          <a:solidFill>
+            <a:srgbClr val="7030A0"/>
+          </a:solidFill>
+          <a:ln>
+            <a:solidFill>
+              <a:srgbClr val="7030A0"/>
+            </a:solidFill>
+          </a:ln>
+          <a:effectLst/>
+        </p:spPr>
+        <p:style>
+          <a:lnRef idx="1">
+            <a:schemeClr val="accent3"/>
+          </a:lnRef>
+          <a:fillRef idx="2">
+            <a:schemeClr val="accent3"/>
+          </a:fillRef>
+          <a:effectRef idx="1">
+            <a:schemeClr val="accent3"/>
+          </a:effectRef>
+          <a:fontRef idx="minor">
+            <a:schemeClr val="dk1"/>
+          </a:fontRef>
+        </p:style>
+        <p:txBody>
+          <a:bodyPr rtlCol="0" anchor="ctr"/>
+          <a:lstStyle/>
+          <a:p>
+            <a:pPr algn="ctr"/>
+            <a:endParaRPr lang="en-SG" sz="1400"/>
+          </a:p>
+        </p:txBody>
+      </p:sp>
+      <p:cxnSp>
+        <p:nvCxnSpPr>
+          <p:cNvPr id="50" name="Straight Arrow Connector 49"/>
+          <p:cNvCxnSpPr>
+            <a:cxnSpLocks/>
+          </p:cNvCxnSpPr>
+          <p:nvPr/>
+        </p:nvCxnSpPr>
+        <p:spPr>
+          <a:xfrm>
+            <a:off x="5685755" y="2975344"/>
+            <a:ext cx="1210345" cy="0"/>
+          </a:xfrm>
+          <a:prstGeom prst="straightConnector1">
+            <a:avLst/>
+          </a:prstGeom>
+          <a:ln w="19050">
+            <a:solidFill>
+              <a:srgbClr val="0070C0"/>
+            </a:solidFill>
+            <a:tailEnd type="arrow"/>
+          </a:ln>
+        </p:spPr>
+        <p:style>
+          <a:lnRef idx="1">
+            <a:schemeClr val="accent1"/>
+          </a:lnRef>
+          <a:fillRef idx="0">
+            <a:schemeClr val="accent1"/>
+          </a:fillRef>
+          <a:effectRef idx="0">
+            <a:schemeClr val="accent1"/>
+          </a:effectRef>
+          <a:fontRef idx="minor">
+            <a:schemeClr val="tx1"/>
+          </a:fontRef>
+        </p:style>
+      </p:cxnSp>
+      <p:sp>
+        <p:nvSpPr>
+          <p:cNvPr id="4" name="TextBox 3"/>
+          <p:cNvSpPr txBox="1"/>
+          <p:nvPr/>
+        </p:nvSpPr>
+        <p:spPr>
+          <a:xfrm>
+            <a:off x="5472880" y="4258211"/>
+            <a:ext cx="258404" cy="261610"/>
+          </a:xfrm>
+          <a:prstGeom prst="rect">
+            <a:avLst/>
+          </a:prstGeom>
+          <a:noFill/>
+        </p:spPr>
+        <p:txBody>
+          <a:bodyPr wrap="none" rtlCol="0">
+            <a:spAutoFit/>
+          </a:bodyPr>
+          <a:lstStyle/>
+          <a:p>
+            <a:r>
+              <a:rPr lang="en-SG" sz="1100" dirty="0">
+                <a:solidFill>
+                  <a:srgbClr val="002060"/>
+                </a:solidFill>
+              </a:rPr>
+              <a:t>X</a:t>
+            </a:r>
+          </a:p>
+        </p:txBody>
+      </p:sp>
+      <p:sp>
+        <p:nvSpPr>
+          <p:cNvPr id="19" name="Rectangle 62"/>
+          <p:cNvSpPr/>
+          <p:nvPr/>
+        </p:nvSpPr>
+        <p:spPr>
+          <a:xfrm>
+            <a:off x="5035976" y="1260268"/>
+            <a:ext cx="1216200" cy="459665"/>
+          </a:xfrm>
+          <a:prstGeom prst="rect">
+            <a:avLst/>
+          </a:prstGeom>
+          <a:solidFill>
+            <a:srgbClr val="0070C0"/>
+          </a:solidFill>
+          <a:ln w="19050">
+            <a:solidFill>
+              <a:srgbClr val="0070C0"/>
+            </a:solidFill>
+          </a:ln>
+          <a:effectLst/>
+        </p:spPr>
+        <p:style>
+          <a:lnRef idx="1">
+            <a:schemeClr val="accent2"/>
+          </a:lnRef>
+          <a:fillRef idx="2">
+            <a:schemeClr val="accent2"/>
+          </a:fillRef>
+          <a:effectRef idx="1">
+            <a:schemeClr val="accent2"/>
+          </a:effectRef>
+          <a:fontRef idx="minor">
+            <a:schemeClr val="dk1"/>
+          </a:fontRef>
+        </p:style>
+        <p:txBody>
+          <a:bodyPr rtlCol="0" anchor="ctr"/>
+          <a:lstStyle/>
+          <a:p>
+            <a:pPr algn="ctr"/>
+            <a:r>
+              <a:rPr lang="en-US" sz="1600" dirty="0">
+                <a:solidFill>
+                  <a:schemeClr val="bg1"/>
+                </a:solidFill>
+              </a:rPr>
+              <a:t>a:AddEvent</a:t>
+            </a:r>
+            <a:br>
+              <a:rPr lang="en-US" sz="1600" dirty="0">
+                <a:solidFill>
+                  <a:schemeClr val="bg1"/>
+                </a:solidFill>
+              </a:rPr>
+            </a:br>
+            <a:r>
+              <a:rPr lang="en-US" sz="1600" dirty="0">
+                <a:solidFill>
+                  <a:schemeClr val="bg1"/>
+                </a:solidFill>
+              </a:rPr>
+              <a:t>Command</a:t>
+            </a:r>
+            <a:endParaRPr lang="en-SG" sz="1600" dirty="0">
+              <a:solidFill>
+                <a:schemeClr val="bg1"/>
+              </a:solidFill>
+            </a:endParaRPr>
+          </a:p>
+        </p:txBody>
+      </p:sp>
+      <p:cxnSp>
+        <p:nvCxnSpPr>
+          <p:cNvPr id="66" name="Straight Arrow Connector 65">
             <a:extLst>
               <a:ext uri="{FF2B5EF4-FFF2-40B4-BE49-F238E27FC236}">
-                <a16:creationId xmlns:a16="http://schemas.microsoft.com/office/drawing/2014/main" id="{C5298A1E-7265-434E-AEB2-1C1C09DB478B}"/>
+                <a16:creationId xmlns:a16="http://schemas.microsoft.com/office/drawing/2014/main" id="{39916E2E-195A-4DC8-B025-B05FA87E6796}"/>
               </a:ext>
             </a:extLst>
           </p:cNvPr>
-          <p:cNvGrpSpPr/>
+          <p:cNvCxnSpPr>
+            <a:cxnSpLocks/>
+          </p:cNvCxnSpPr>
           <p:nvPr/>
-        </p:nvGrpSpPr>
-        <p:grpSpPr>
-          <a:xfrm>
-            <a:off x="-457192" y="75352"/>
-            <a:ext cx="10820391" cy="4444469"/>
-            <a:chOff x="-457192" y="75352"/>
-            <a:chExt cx="10820391" cy="4444469"/>
-          </a:xfrm>
-        </p:grpSpPr>
-        <p:sp>
-          <p:nvSpPr>
-            <p:cNvPr id="56" name="Rectangle 65"/>
-            <p:cNvSpPr/>
-            <p:nvPr/>
-          </p:nvSpPr>
-          <p:spPr>
-            <a:xfrm>
-              <a:off x="6459374" y="75352"/>
-              <a:ext cx="3903825" cy="4400926"/>
-            </a:xfrm>
-            <a:prstGeom prst="roundRect">
-              <a:avLst>
-                <a:gd name="adj" fmla="val 3484"/>
-              </a:avLst>
-            </a:prstGeom>
+        </p:nvCxnSpPr>
+        <p:spPr>
+          <a:xfrm>
+            <a:off x="1691351" y="2731314"/>
+            <a:ext cx="3832164" cy="1"/>
+          </a:xfrm>
+          <a:prstGeom prst="straightConnector1">
+            <a:avLst/>
+          </a:prstGeom>
+          <a:ln w="19050">
             <a:solidFill>
-              <a:schemeClr val="accent4">
-                <a:lumMod val="20000"/>
-                <a:lumOff val="80000"/>
-              </a:schemeClr>
+              <a:srgbClr val="0070C0"/>
             </a:solidFill>
-            <a:ln w="19050">
-              <a:noFill/>
-            </a:ln>
-            <a:effectLst/>
-          </p:spPr>
-          <p:style>
-            <a:lnRef idx="1">
-              <a:schemeClr val="accent2"/>
-            </a:lnRef>
-            <a:fillRef idx="2">
-              <a:schemeClr val="accent2"/>
-            </a:fillRef>
-            <a:effectRef idx="1">
-              <a:schemeClr val="accent2"/>
-            </a:effectRef>
-            <a:fontRef idx="minor">
-              <a:schemeClr val="dk1"/>
-            </a:fontRef>
-          </p:style>
-          <p:txBody>
-            <a:bodyPr rtlCol="0" anchor="t"/>
-            <a:lstStyle/>
-            <a:p>
-              <a:r>
-                <a:rPr lang="en-US" sz="1200" b="1" dirty="0">
-                  <a:solidFill>
-                    <a:srgbClr val="7030A0"/>
-                  </a:solidFill>
-                </a:rPr>
-                <a:t>Model</a:t>
-              </a:r>
-              <a:endParaRPr lang="en-SG" sz="1200" b="1" dirty="0">
+            <a:tailEnd type="arrow"/>
+          </a:ln>
+        </p:spPr>
+        <p:style>
+          <a:lnRef idx="1">
+            <a:schemeClr val="accent1"/>
+          </a:lnRef>
+          <a:fillRef idx="0">
+            <a:schemeClr val="accent1"/>
+          </a:fillRef>
+          <a:effectRef idx="0">
+            <a:schemeClr val="accent1"/>
+          </a:effectRef>
+          <a:fontRef idx="minor">
+            <a:schemeClr val="tx1"/>
+          </a:fontRef>
+        </p:style>
+      </p:cxnSp>
+      <p:cxnSp>
+        <p:nvCxnSpPr>
+          <p:cNvPr id="67" name="Straight Arrow Connector 66">
+            <a:extLst>
+              <a:ext uri="{FF2B5EF4-FFF2-40B4-BE49-F238E27FC236}">
+                <a16:creationId xmlns:a16="http://schemas.microsoft.com/office/drawing/2014/main" id="{D881596E-177C-4FDC-8E60-CAB90B3D5FAB}"/>
+              </a:ext>
+            </a:extLst>
+          </p:cNvPr>
+          <p:cNvCxnSpPr>
+            <a:cxnSpLocks/>
+          </p:cNvCxnSpPr>
+          <p:nvPr/>
+        </p:nvCxnSpPr>
+        <p:spPr>
+          <a:xfrm>
+            <a:off x="1708245" y="1363918"/>
+            <a:ext cx="2256705" cy="1"/>
+          </a:xfrm>
+          <a:prstGeom prst="straightConnector1">
+            <a:avLst/>
+          </a:prstGeom>
+          <a:ln w="19050">
+            <a:solidFill>
+              <a:srgbClr val="0070C0"/>
+            </a:solidFill>
+            <a:tailEnd type="arrow"/>
+          </a:ln>
+        </p:spPr>
+        <p:style>
+          <a:lnRef idx="1">
+            <a:schemeClr val="accent1"/>
+          </a:lnRef>
+          <a:fillRef idx="0">
+            <a:schemeClr val="accent1"/>
+          </a:fillRef>
+          <a:effectRef idx="0">
+            <a:schemeClr val="accent1"/>
+          </a:effectRef>
+          <a:fontRef idx="minor">
+            <a:schemeClr val="tx1"/>
+          </a:fontRef>
+        </p:style>
+      </p:cxnSp>
+      <p:cxnSp>
+        <p:nvCxnSpPr>
+          <p:cNvPr id="69" name="Straight Arrow Connector 68">
+            <a:extLst>
+              <a:ext uri="{FF2B5EF4-FFF2-40B4-BE49-F238E27FC236}">
+                <a16:creationId xmlns:a16="http://schemas.microsoft.com/office/drawing/2014/main" id="{7C9F21BC-13A9-471F-825A-2621FD36355F}"/>
+              </a:ext>
+            </a:extLst>
+          </p:cNvPr>
+          <p:cNvCxnSpPr>
+            <a:cxnSpLocks/>
+          </p:cNvCxnSpPr>
+          <p:nvPr/>
+        </p:nvCxnSpPr>
+        <p:spPr>
+          <a:xfrm>
+            <a:off x="1691998" y="4036462"/>
+            <a:ext cx="3831517" cy="0"/>
+          </a:xfrm>
+          <a:prstGeom prst="straightConnector1">
+            <a:avLst/>
+          </a:prstGeom>
+          <a:ln w="19050">
+            <a:solidFill>
+              <a:srgbClr val="0070C0"/>
+            </a:solidFill>
+            <a:prstDash val="sysDash"/>
+            <a:headEnd type="arrow" w="med" len="med"/>
+            <a:tailEnd type="none" w="med" len="med"/>
+          </a:ln>
+        </p:spPr>
+        <p:style>
+          <a:lnRef idx="1">
+            <a:schemeClr val="accent1"/>
+          </a:lnRef>
+          <a:fillRef idx="0">
+            <a:schemeClr val="accent1"/>
+          </a:fillRef>
+          <a:effectRef idx="0">
+            <a:schemeClr val="accent1"/>
+          </a:effectRef>
+          <a:fontRef idx="minor">
+            <a:schemeClr val="tx1"/>
+          </a:fontRef>
+        </p:style>
+      </p:cxnSp>
+      <p:cxnSp>
+        <p:nvCxnSpPr>
+          <p:cNvPr id="89" name="Straight Connector 88">
+            <a:extLst>
+              <a:ext uri="{FF2B5EF4-FFF2-40B4-BE49-F238E27FC236}">
+                <a16:creationId xmlns:a16="http://schemas.microsoft.com/office/drawing/2014/main" id="{E4E1C8CA-49DF-45D8-80A5-D5C8282EE927}"/>
+              </a:ext>
+            </a:extLst>
+          </p:cNvPr>
+          <p:cNvCxnSpPr>
+            <a:cxnSpLocks/>
+          </p:cNvCxnSpPr>
+          <p:nvPr/>
+        </p:nvCxnSpPr>
+        <p:spPr>
+          <a:xfrm>
+            <a:off x="8588043" y="2871355"/>
+            <a:ext cx="17996" cy="1467648"/>
+          </a:xfrm>
+          <a:prstGeom prst="line">
+            <a:avLst/>
+          </a:prstGeom>
+          <a:ln w="19050">
+            <a:solidFill>
+              <a:srgbClr val="7030A0"/>
+            </a:solidFill>
+            <a:prstDash val="sysDash"/>
+          </a:ln>
+          <a:effectLst/>
+        </p:spPr>
+        <p:style>
+          <a:lnRef idx="1">
+            <a:schemeClr val="accent1"/>
+          </a:lnRef>
+          <a:fillRef idx="2">
+            <a:schemeClr val="accent1"/>
+          </a:fillRef>
+          <a:effectRef idx="1">
+            <a:schemeClr val="accent1"/>
+          </a:effectRef>
+          <a:fontRef idx="minor">
+            <a:schemeClr val="dk1"/>
+          </a:fontRef>
+        </p:style>
+      </p:cxnSp>
+      <p:sp>
+        <p:nvSpPr>
+          <p:cNvPr id="41" name="TextBox 40"/>
+          <p:cNvSpPr txBox="1"/>
+          <p:nvPr/>
+        </p:nvSpPr>
+        <p:spPr>
+          <a:xfrm>
+            <a:off x="7474923" y="2975344"/>
+            <a:ext cx="744455" cy="184666"/>
+          </a:xfrm>
+          <a:prstGeom prst="rect">
+            <a:avLst/>
+          </a:prstGeom>
+          <a:noFill/>
+          <a:ln>
+            <a:noFill/>
+          </a:ln>
+        </p:spPr>
+        <p:txBody>
+          <a:bodyPr wrap="square" lIns="0" tIns="0" rIns="0" bIns="0" rtlCol="0">
+            <a:spAutoFit/>
+          </a:bodyPr>
+          <a:lstStyle>
+            <a:defPPr>
+              <a:defRPr lang="en-US"/>
+            </a:defPPr>
+            <a:lvl1pPr algn="r">
+              <a:defRPr sz="1400">
+                <a:solidFill>
+                  <a:srgbClr val="0070C0"/>
+                </a:solidFill>
+              </a:defRPr>
+            </a:lvl1pPr>
+          </a:lstStyle>
+          <a:p>
+            <a:r>
+              <a:rPr lang="en-US" sz="1200" dirty="0" err="1">
                 <a:solidFill>
                   <a:srgbClr val="7030A0"/>
                 </a:solidFill>
-              </a:endParaRPr>
-            </a:p>
-          </p:txBody>
-        </p:sp>
-        <p:sp>
-          <p:nvSpPr>
-            <p:cNvPr id="81" name="Rectangle 65"/>
-            <p:cNvSpPr/>
-            <p:nvPr/>
-          </p:nvSpPr>
-          <p:spPr>
-            <a:xfrm>
-              <a:off x="467813" y="119475"/>
-              <a:ext cx="5863964" cy="4343400"/>
-            </a:xfrm>
-            <a:prstGeom prst="roundRect">
-              <a:avLst>
-                <a:gd name="adj" fmla="val 3484"/>
-              </a:avLst>
-            </a:prstGeom>
-            <a:solidFill>
-              <a:schemeClr val="accent1">
-                <a:lumMod val="20000"/>
-                <a:lumOff val="80000"/>
-              </a:schemeClr>
-            </a:solidFill>
-            <a:ln w="19050">
-              <a:noFill/>
-            </a:ln>
-            <a:effectLst/>
-          </p:spPr>
-          <p:style>
-            <a:lnRef idx="1">
-              <a:schemeClr val="accent2"/>
-            </a:lnRef>
-            <a:fillRef idx="2">
-              <a:schemeClr val="accent2"/>
-            </a:fillRef>
-            <a:effectRef idx="1">
-              <a:schemeClr val="accent2"/>
-            </a:effectRef>
-            <a:fontRef idx="minor">
-              <a:schemeClr val="dk1"/>
-            </a:fontRef>
-          </p:style>
-          <p:txBody>
-            <a:bodyPr rtlCol="0" anchor="t"/>
-            <a:lstStyle/>
-            <a:p>
-              <a:r>
-                <a:rPr lang="en-US" sz="1200" b="1" dirty="0">
-                  <a:solidFill>
-                    <a:srgbClr val="0070C0"/>
-                  </a:solidFill>
-                </a:rPr>
-                <a:t>Logic</a:t>
-              </a:r>
-              <a:endParaRPr lang="en-SG" sz="1200" b="1" dirty="0">
+              </a:rPr>
+              <a:t>addEvent</a:t>
+            </a:r>
+            <a:r>
+              <a:rPr lang="en-US" sz="1200" dirty="0">
                 <a:solidFill>
-                  <a:srgbClr val="0070C0"/>
+                  <a:schemeClr val="accent4">
+                    <a:lumMod val="75000"/>
+                  </a:schemeClr>
                 </a:solidFill>
-              </a:endParaRPr>
-            </a:p>
-          </p:txBody>
-        </p:sp>
-        <p:sp>
-          <p:nvSpPr>
-            <p:cNvPr id="2" name="Rectangle 62"/>
-            <p:cNvSpPr/>
-            <p:nvPr/>
-          </p:nvSpPr>
-          <p:spPr>
-            <a:xfrm>
-              <a:off x="883145" y="543946"/>
-              <a:ext cx="1455629" cy="346760"/>
-            </a:xfrm>
-            <a:prstGeom prst="rect">
-              <a:avLst/>
-            </a:prstGeom>
-            <a:solidFill>
-              <a:srgbClr val="0070C0"/>
-            </a:solidFill>
-            <a:ln w="19050">
-              <a:solidFill>
-                <a:srgbClr val="0070C0"/>
-              </a:solidFill>
-            </a:ln>
-            <a:effectLst/>
-          </p:spPr>
-          <p:style>
-            <a:lnRef idx="1">
-              <a:schemeClr val="accent2"/>
-            </a:lnRef>
-            <a:fillRef idx="2">
-              <a:schemeClr val="accent2"/>
-            </a:fillRef>
-            <a:effectRef idx="1">
-              <a:schemeClr val="accent2"/>
-            </a:effectRef>
-            <a:fontRef idx="minor">
-              <a:schemeClr val="dk1"/>
-            </a:fontRef>
-          </p:style>
-          <p:txBody>
-            <a:bodyPr rtlCol="0" anchor="ctr"/>
-            <a:lstStyle/>
-            <a:p>
-              <a:pPr algn="ctr"/>
-              <a:r>
-                <a:rPr lang="en-US" sz="1600" dirty="0">
-                  <a:solidFill>
-                    <a:schemeClr val="bg1"/>
-                  </a:solidFill>
-                </a:rPr>
-                <a:t>:</a:t>
-              </a:r>
-              <a:r>
-                <a:rPr lang="en-US" sz="1600" dirty="0" err="1">
-                  <a:solidFill>
-                    <a:schemeClr val="bg1"/>
-                  </a:solidFill>
-                </a:rPr>
-                <a:t>LogicManager</a:t>
-              </a:r>
-              <a:endParaRPr lang="en-SG" sz="1600" dirty="0">
-                <a:solidFill>
-                  <a:schemeClr val="bg1"/>
-                </a:solidFill>
-              </a:endParaRPr>
-            </a:p>
-          </p:txBody>
-        </p:sp>
-        <p:cxnSp>
-          <p:nvCxnSpPr>
-            <p:cNvPr id="5" name="Straight Connector 4"/>
-            <p:cNvCxnSpPr>
-              <a:cxnSpLocks/>
-            </p:cNvCxnSpPr>
-            <p:nvPr/>
-          </p:nvCxnSpPr>
-          <p:spPr>
-            <a:xfrm>
-              <a:off x="1610959" y="907617"/>
-              <a:ext cx="0" cy="3481399"/>
-            </a:xfrm>
-            <a:prstGeom prst="line">
-              <a:avLst/>
-            </a:prstGeom>
-            <a:ln w="19050">
-              <a:solidFill>
-                <a:srgbClr val="0070C0"/>
-              </a:solidFill>
-              <a:prstDash val="sysDash"/>
-            </a:ln>
-            <a:effectLst/>
-          </p:spPr>
-          <p:style>
-            <a:lnRef idx="1">
-              <a:schemeClr val="accent1"/>
-            </a:lnRef>
-            <a:fillRef idx="2">
-              <a:schemeClr val="accent1"/>
-            </a:fillRef>
-            <a:effectRef idx="1">
-              <a:schemeClr val="accent1"/>
-            </a:effectRef>
-            <a:fontRef idx="minor">
-              <a:schemeClr val="dk1"/>
-            </a:fontRef>
-          </p:style>
-        </p:cxnSp>
-        <p:sp>
-          <p:nvSpPr>
-            <p:cNvPr id="6" name="Rectangle 5"/>
-            <p:cNvSpPr/>
-            <p:nvPr/>
-          </p:nvSpPr>
-          <p:spPr>
-            <a:xfrm>
-              <a:off x="1538951" y="1258311"/>
-              <a:ext cx="152400" cy="2932689"/>
-            </a:xfrm>
-            <a:prstGeom prst="rect">
-              <a:avLst/>
-            </a:prstGeom>
-            <a:solidFill>
-              <a:srgbClr val="0070C0"/>
-            </a:solidFill>
-            <a:ln>
-              <a:solidFill>
-                <a:srgbClr val="0070C0"/>
-              </a:solidFill>
-            </a:ln>
-            <a:effectLst/>
-          </p:spPr>
-          <p:style>
-            <a:lnRef idx="1">
-              <a:schemeClr val="accent3"/>
-            </a:lnRef>
-            <a:fillRef idx="2">
-              <a:schemeClr val="accent3"/>
-            </a:fillRef>
-            <a:effectRef idx="1">
-              <a:schemeClr val="accent3"/>
-            </a:effectRef>
-            <a:fontRef idx="minor">
-              <a:schemeClr val="dk1"/>
-            </a:fontRef>
-          </p:style>
-          <p:txBody>
-            <a:bodyPr rtlCol="0" anchor="ctr"/>
-            <a:lstStyle/>
-            <a:p>
-              <a:pPr algn="ctr"/>
-              <a:endParaRPr lang="en-SG" sz="1400"/>
-            </a:p>
-          </p:txBody>
-        </p:sp>
-        <p:sp>
-          <p:nvSpPr>
-            <p:cNvPr id="16" name="Rectangle 62"/>
-            <p:cNvSpPr/>
-            <p:nvPr/>
-          </p:nvSpPr>
-          <p:spPr>
-            <a:xfrm>
-              <a:off x="3437188" y="423022"/>
-              <a:ext cx="1219200" cy="467684"/>
-            </a:xfrm>
-            <a:prstGeom prst="rect">
-              <a:avLst/>
-            </a:prstGeom>
-            <a:solidFill>
-              <a:srgbClr val="0070C0"/>
-            </a:solidFill>
-            <a:ln w="19050">
-              <a:solidFill>
-                <a:srgbClr val="0070C0"/>
-              </a:solidFill>
-            </a:ln>
-            <a:effectLst/>
-          </p:spPr>
-          <p:style>
-            <a:lnRef idx="1">
-              <a:schemeClr val="accent2"/>
-            </a:lnRef>
-            <a:fillRef idx="2">
-              <a:schemeClr val="accent2"/>
-            </a:fillRef>
-            <a:effectRef idx="1">
-              <a:schemeClr val="accent2"/>
-            </a:effectRef>
-            <a:fontRef idx="minor">
-              <a:schemeClr val="dk1"/>
-            </a:fontRef>
-          </p:style>
-          <p:txBody>
-            <a:bodyPr rtlCol="0" anchor="ctr"/>
-            <a:lstStyle/>
-            <a:p>
-              <a:pPr algn="ctr"/>
-              <a:r>
-                <a:rPr lang="en-US" sz="1600" dirty="0">
-                  <a:solidFill>
-                    <a:schemeClr val="bg1"/>
-                  </a:solidFill>
-                </a:rPr>
-                <a:t>:Address</a:t>
-              </a:r>
-            </a:p>
-            <a:p>
-              <a:pPr algn="ctr"/>
-              <a:r>
-                <a:rPr lang="en-US" sz="1600" dirty="0" err="1">
-                  <a:solidFill>
-                    <a:schemeClr val="bg1"/>
-                  </a:solidFill>
-                </a:rPr>
-                <a:t>BookParser</a:t>
-              </a:r>
-              <a:endParaRPr lang="en-SG" sz="1600" dirty="0">
-                <a:solidFill>
-                  <a:schemeClr val="bg1"/>
-                </a:solidFill>
-              </a:endParaRPr>
-            </a:p>
-          </p:txBody>
-        </p:sp>
-        <p:cxnSp>
-          <p:nvCxnSpPr>
-            <p:cNvPr id="17" name="Straight Connector 16"/>
-            <p:cNvCxnSpPr>
-              <a:cxnSpLocks/>
-            </p:cNvCxnSpPr>
-            <p:nvPr/>
-          </p:nvCxnSpPr>
-          <p:spPr>
-            <a:xfrm>
-              <a:off x="4050587" y="907617"/>
-              <a:ext cx="0" cy="1482984"/>
-            </a:xfrm>
-            <a:prstGeom prst="line">
-              <a:avLst/>
-            </a:prstGeom>
-            <a:ln w="19050">
-              <a:solidFill>
-                <a:srgbClr val="0070C0"/>
-              </a:solidFill>
-              <a:prstDash val="sysDash"/>
-            </a:ln>
-            <a:effectLst/>
-          </p:spPr>
-          <p:style>
-            <a:lnRef idx="1">
-              <a:schemeClr val="accent1"/>
-            </a:lnRef>
-            <a:fillRef idx="2">
-              <a:schemeClr val="accent1"/>
-            </a:fillRef>
-            <a:effectRef idx="1">
-              <a:schemeClr val="accent1"/>
-            </a:effectRef>
-            <a:fontRef idx="minor">
-              <a:schemeClr val="dk1"/>
-            </a:fontRef>
-          </p:style>
-        </p:cxnSp>
-        <p:sp>
-          <p:nvSpPr>
-            <p:cNvPr id="18" name="Rectangle 17"/>
-            <p:cNvSpPr/>
-            <p:nvPr/>
-          </p:nvSpPr>
-          <p:spPr>
-            <a:xfrm>
-              <a:off x="3978580" y="1365810"/>
-              <a:ext cx="154408" cy="767790"/>
-            </a:xfrm>
-            <a:prstGeom prst="rect">
-              <a:avLst/>
-            </a:prstGeom>
-            <a:solidFill>
-              <a:srgbClr val="0070C0"/>
-            </a:solidFill>
-            <a:ln>
-              <a:solidFill>
-                <a:srgbClr val="0070C0"/>
-              </a:solidFill>
-            </a:ln>
-            <a:effectLst/>
-          </p:spPr>
-          <p:style>
-            <a:lnRef idx="1">
-              <a:schemeClr val="accent3"/>
-            </a:lnRef>
-            <a:fillRef idx="2">
-              <a:schemeClr val="accent3"/>
-            </a:fillRef>
-            <a:effectRef idx="1">
-              <a:schemeClr val="accent3"/>
-            </a:effectRef>
-            <a:fontRef idx="minor">
-              <a:schemeClr val="dk1"/>
-            </a:fontRef>
-          </p:style>
-          <p:txBody>
-            <a:bodyPr rtlCol="0" anchor="ctr"/>
-            <a:lstStyle/>
-            <a:p>
-              <a:pPr algn="ctr"/>
-              <a:endParaRPr lang="en-SG" sz="1400">
-                <a:solidFill>
-                  <a:schemeClr val="dk1"/>
-                </a:solidFill>
-              </a:endParaRPr>
-            </a:p>
-          </p:txBody>
-        </p:sp>
-        <p:cxnSp>
-          <p:nvCxnSpPr>
-            <p:cNvPr id="20" name="Straight Connector 19"/>
-            <p:cNvCxnSpPr>
-              <a:cxnSpLocks/>
-              <a:stCxn id="21" idx="0"/>
-              <a:endCxn id="4" idx="0"/>
-            </p:cNvCxnSpPr>
-            <p:nvPr/>
-          </p:nvCxnSpPr>
-          <p:spPr>
-            <a:xfrm>
-              <a:off x="5602082" y="1613633"/>
-              <a:ext cx="0" cy="2644578"/>
-            </a:xfrm>
-            <a:prstGeom prst="line">
-              <a:avLst/>
-            </a:prstGeom>
-            <a:ln w="19050">
-              <a:solidFill>
-                <a:srgbClr val="0070C0"/>
-              </a:solidFill>
-              <a:prstDash val="sysDash"/>
-            </a:ln>
-            <a:effectLst/>
-          </p:spPr>
-          <p:style>
-            <a:lnRef idx="1">
-              <a:schemeClr val="accent1"/>
-            </a:lnRef>
-            <a:fillRef idx="2">
-              <a:schemeClr val="accent1"/>
-            </a:fillRef>
-            <a:effectRef idx="1">
-              <a:schemeClr val="accent1"/>
-            </a:effectRef>
-            <a:fontRef idx="minor">
-              <a:schemeClr val="dk1"/>
-            </a:fontRef>
-          </p:style>
-        </p:cxnSp>
-        <p:sp>
-          <p:nvSpPr>
-            <p:cNvPr id="21" name="Rectangle 20"/>
-            <p:cNvSpPr/>
-            <p:nvPr/>
-          </p:nvSpPr>
-          <p:spPr>
-            <a:xfrm>
-              <a:off x="5525882" y="1613633"/>
-              <a:ext cx="152400" cy="276003"/>
-            </a:xfrm>
-            <a:prstGeom prst="rect">
-              <a:avLst/>
-            </a:prstGeom>
-            <a:solidFill>
-              <a:srgbClr val="0070C0"/>
-            </a:solidFill>
-            <a:ln>
-              <a:solidFill>
-                <a:srgbClr val="0070C0"/>
-              </a:solidFill>
-            </a:ln>
-            <a:effectLst/>
-          </p:spPr>
-          <p:style>
-            <a:lnRef idx="1">
-              <a:schemeClr val="accent3"/>
-            </a:lnRef>
-            <a:fillRef idx="2">
-              <a:schemeClr val="accent3"/>
-            </a:fillRef>
-            <a:effectRef idx="1">
-              <a:schemeClr val="accent3"/>
-            </a:effectRef>
-            <a:fontRef idx="minor">
-              <a:schemeClr val="dk1"/>
-            </a:fontRef>
-          </p:style>
-          <p:txBody>
-            <a:bodyPr rtlCol="0" anchor="ctr"/>
-            <a:lstStyle/>
-            <a:p>
-              <a:pPr algn="ctr"/>
-              <a:endParaRPr lang="en-SG" sz="1400"/>
-            </a:p>
-          </p:txBody>
-        </p:sp>
-        <p:cxnSp>
-          <p:nvCxnSpPr>
-            <p:cNvPr id="23" name="Straight Arrow Connector 22"/>
-            <p:cNvCxnSpPr/>
-            <p:nvPr/>
-          </p:nvCxnSpPr>
-          <p:spPr>
-            <a:xfrm>
-              <a:off x="419100" y="1261999"/>
-              <a:ext cx="1119851" cy="0"/>
-            </a:xfrm>
-            <a:prstGeom prst="straightConnector1">
-              <a:avLst/>
-            </a:prstGeom>
-            <a:ln w="19050">
-              <a:solidFill>
-                <a:srgbClr val="00B050"/>
-              </a:solidFill>
-              <a:tailEnd type="arrow"/>
-            </a:ln>
-          </p:spPr>
-          <p:style>
-            <a:lnRef idx="1">
-              <a:schemeClr val="accent1"/>
-            </a:lnRef>
-            <a:fillRef idx="0">
-              <a:schemeClr val="accent1"/>
-            </a:fillRef>
-            <a:effectRef idx="0">
-              <a:schemeClr val="accent1"/>
-            </a:effectRef>
-            <a:fontRef idx="minor">
-              <a:schemeClr val="tx1"/>
-            </a:fontRef>
-          </p:style>
-        </p:cxnSp>
-        <p:sp>
-          <p:nvSpPr>
-            <p:cNvPr id="26" name="TextBox 25"/>
-            <p:cNvSpPr txBox="1"/>
-            <p:nvPr/>
-          </p:nvSpPr>
-          <p:spPr>
-            <a:xfrm>
-              <a:off x="-457192" y="990600"/>
-              <a:ext cx="1920138" cy="214449"/>
-            </a:xfrm>
-            <a:prstGeom prst="rect">
-              <a:avLst/>
-            </a:prstGeom>
-            <a:noFill/>
-          </p:spPr>
-          <p:txBody>
-            <a:bodyPr wrap="square" lIns="0" tIns="0" rIns="0" bIns="0" rtlCol="0">
-              <a:spAutoFit/>
-            </a:bodyPr>
-            <a:lstStyle/>
-            <a:p>
-              <a:pPr algn="r"/>
-              <a:r>
-                <a:rPr lang="en-US" sz="1400" dirty="0">
-                  <a:solidFill>
-                    <a:srgbClr val="0070C0"/>
-                  </a:solidFill>
-                </a:rPr>
-                <a:t>execute(“</a:t>
-              </a:r>
-              <a:r>
-                <a:rPr lang="en-US" sz="1400" dirty="0" err="1">
-                  <a:solidFill>
-                    <a:srgbClr val="0070C0"/>
-                  </a:solidFill>
-                </a:rPr>
-                <a:t>add_event</a:t>
-              </a:r>
-              <a:r>
-                <a:rPr lang="en-US" sz="1400" dirty="0">
-                  <a:solidFill>
-                    <a:srgbClr val="0070C0"/>
-                  </a:solidFill>
-                </a:rPr>
-                <a:t>”)</a:t>
-              </a:r>
-            </a:p>
-          </p:txBody>
-        </p:sp>
-        <p:cxnSp>
-          <p:nvCxnSpPr>
-            <p:cNvPr id="28" name="Straight Arrow Connector 27"/>
-            <p:cNvCxnSpPr/>
-            <p:nvPr/>
-          </p:nvCxnSpPr>
-          <p:spPr>
-            <a:xfrm flipV="1">
-              <a:off x="4135972" y="1512340"/>
-              <a:ext cx="922392" cy="1"/>
-            </a:xfrm>
-            <a:prstGeom prst="straightConnector1">
-              <a:avLst/>
-            </a:prstGeom>
-            <a:ln w="19050">
-              <a:solidFill>
-                <a:srgbClr val="0070C0"/>
-              </a:solidFill>
-              <a:tailEnd type="arrow"/>
-            </a:ln>
-          </p:spPr>
-          <p:style>
-            <a:lnRef idx="1">
-              <a:schemeClr val="accent1"/>
-            </a:lnRef>
-            <a:fillRef idx="0">
-              <a:schemeClr val="accent1"/>
-            </a:fillRef>
-            <a:effectRef idx="0">
-              <a:schemeClr val="accent1"/>
-            </a:effectRef>
-            <a:fontRef idx="minor">
-              <a:schemeClr val="tx1"/>
-            </a:fontRef>
-          </p:style>
-        </p:cxnSp>
-        <p:sp>
-          <p:nvSpPr>
-            <p:cNvPr id="29" name="TextBox 28"/>
-            <p:cNvSpPr txBox="1"/>
-            <p:nvPr/>
-          </p:nvSpPr>
-          <p:spPr>
-            <a:xfrm>
-              <a:off x="3243421" y="2484071"/>
-              <a:ext cx="855809" cy="215444"/>
-            </a:xfrm>
-            <a:prstGeom prst="rect">
-              <a:avLst/>
-            </a:prstGeom>
-            <a:noFill/>
-          </p:spPr>
-          <p:txBody>
-            <a:bodyPr wrap="square" lIns="0" tIns="0" rIns="0" bIns="0" rtlCol="0">
-              <a:spAutoFit/>
-            </a:bodyPr>
-            <a:lstStyle>
-              <a:defPPr>
-                <a:defRPr lang="en-US"/>
-              </a:defPPr>
-              <a:lvl1pPr algn="r">
-                <a:defRPr sz="1400">
-                  <a:solidFill>
-                    <a:srgbClr val="0070C0"/>
-                  </a:solidFill>
-                </a:defRPr>
-              </a:lvl1pPr>
-            </a:lstStyle>
-            <a:p>
-              <a:r>
-                <a:rPr lang="en-US" dirty="0"/>
-                <a:t>execute()</a:t>
-              </a:r>
-            </a:p>
-          </p:txBody>
-        </p:sp>
-        <p:cxnSp>
-          <p:nvCxnSpPr>
-            <p:cNvPr id="34" name="Straight Arrow Connector 33"/>
-            <p:cNvCxnSpPr/>
-            <p:nvPr/>
-          </p:nvCxnSpPr>
-          <p:spPr>
-            <a:xfrm>
-              <a:off x="4109108" y="1878232"/>
-              <a:ext cx="1492974" cy="0"/>
-            </a:xfrm>
-            <a:prstGeom prst="straightConnector1">
-              <a:avLst/>
-            </a:prstGeom>
-            <a:ln w="19050">
-              <a:solidFill>
-                <a:srgbClr val="0070C0"/>
-              </a:solidFill>
-              <a:prstDash val="sysDash"/>
-              <a:headEnd type="arrow" w="med" len="med"/>
-              <a:tailEnd type="none" w="med" len="med"/>
-            </a:ln>
-          </p:spPr>
-          <p:style>
-            <a:lnRef idx="1">
-              <a:schemeClr val="accent1"/>
-            </a:lnRef>
-            <a:fillRef idx="0">
-              <a:schemeClr val="accent1"/>
-            </a:fillRef>
-            <a:effectRef idx="0">
-              <a:schemeClr val="accent1"/>
-            </a:effectRef>
-            <a:fontRef idx="minor">
-              <a:schemeClr val="tx1"/>
-            </a:fontRef>
-          </p:style>
-        </p:cxnSp>
-        <p:cxnSp>
-          <p:nvCxnSpPr>
-            <p:cNvPr id="35" name="Straight Arrow Connector 34"/>
-            <p:cNvCxnSpPr>
-              <a:cxnSpLocks/>
-            </p:cNvCxnSpPr>
-            <p:nvPr/>
-          </p:nvCxnSpPr>
-          <p:spPr>
-            <a:xfrm>
-              <a:off x="1691351" y="2133600"/>
-              <a:ext cx="2348067" cy="0"/>
-            </a:xfrm>
-            <a:prstGeom prst="straightConnector1">
-              <a:avLst/>
-            </a:prstGeom>
-            <a:ln w="19050">
-              <a:solidFill>
-                <a:srgbClr val="0070C0"/>
-              </a:solidFill>
-              <a:prstDash val="sysDash"/>
-              <a:headEnd type="arrow" w="med" len="med"/>
-              <a:tailEnd type="none" w="med" len="med"/>
-            </a:ln>
-          </p:spPr>
-          <p:style>
-            <a:lnRef idx="1">
-              <a:schemeClr val="accent1"/>
-            </a:lnRef>
-            <a:fillRef idx="0">
-              <a:schemeClr val="accent1"/>
-            </a:fillRef>
-            <a:effectRef idx="0">
-              <a:schemeClr val="accent1"/>
-            </a:effectRef>
-            <a:fontRef idx="minor">
-              <a:schemeClr val="tx1"/>
-            </a:fontRef>
-          </p:style>
-        </p:cxnSp>
-        <p:cxnSp>
-          <p:nvCxnSpPr>
-            <p:cNvPr id="37" name="Straight Arrow Connector 36"/>
-            <p:cNvCxnSpPr/>
-            <p:nvPr/>
-          </p:nvCxnSpPr>
-          <p:spPr>
-            <a:xfrm>
-              <a:off x="380999" y="4191000"/>
-              <a:ext cx="1196051" cy="0"/>
-            </a:xfrm>
-            <a:prstGeom prst="straightConnector1">
-              <a:avLst/>
-            </a:prstGeom>
-            <a:ln w="19050">
-              <a:solidFill>
-                <a:schemeClr val="accent1"/>
-              </a:solidFill>
-              <a:prstDash val="sysDash"/>
-              <a:headEnd type="arrow" w="med" len="med"/>
-              <a:tailEnd type="none" w="med" len="med"/>
-            </a:ln>
-          </p:spPr>
-          <p:style>
-            <a:lnRef idx="1">
-              <a:schemeClr val="accent1"/>
-            </a:lnRef>
-            <a:fillRef idx="0">
-              <a:schemeClr val="accent1"/>
-            </a:fillRef>
-            <a:effectRef idx="0">
-              <a:schemeClr val="accent1"/>
-            </a:effectRef>
-            <a:fontRef idx="minor">
-              <a:schemeClr val="tx1"/>
-            </a:fontRef>
-          </p:style>
-        </p:cxnSp>
-        <p:sp>
-          <p:nvSpPr>
-            <p:cNvPr id="65" name="Rectangle 64"/>
-            <p:cNvSpPr/>
-            <p:nvPr/>
-          </p:nvSpPr>
-          <p:spPr>
-            <a:xfrm>
-              <a:off x="5526488" y="2731313"/>
-              <a:ext cx="161322" cy="1307285"/>
-            </a:xfrm>
-            <a:prstGeom prst="rect">
-              <a:avLst/>
-            </a:prstGeom>
-            <a:solidFill>
-              <a:srgbClr val="0070C0"/>
-            </a:solidFill>
-            <a:ln>
-              <a:solidFill>
-                <a:srgbClr val="0070C0"/>
-              </a:solidFill>
-            </a:ln>
-            <a:effectLst/>
-          </p:spPr>
-          <p:style>
-            <a:lnRef idx="1">
-              <a:schemeClr val="accent3"/>
-            </a:lnRef>
-            <a:fillRef idx="2">
-              <a:schemeClr val="accent3"/>
-            </a:fillRef>
-            <a:effectRef idx="1">
-              <a:schemeClr val="accent3"/>
-            </a:effectRef>
-            <a:fontRef idx="minor">
-              <a:schemeClr val="dk1"/>
-            </a:fontRef>
-          </p:style>
-          <p:txBody>
-            <a:bodyPr rtlCol="0" anchor="ctr"/>
-            <a:lstStyle/>
-            <a:p>
-              <a:pPr algn="ctr"/>
-              <a:endParaRPr lang="en-SG" sz="1400"/>
-            </a:p>
-          </p:txBody>
-        </p:sp>
-        <p:sp>
-          <p:nvSpPr>
-            <p:cNvPr id="79" name="TextBox 78"/>
-            <p:cNvSpPr txBox="1"/>
-            <p:nvPr/>
-          </p:nvSpPr>
-          <p:spPr>
-            <a:xfrm>
-              <a:off x="6194514" y="2748246"/>
-              <a:ext cx="755111" cy="184666"/>
-            </a:xfrm>
-            <a:prstGeom prst="rect">
-              <a:avLst/>
-            </a:prstGeom>
-            <a:noFill/>
-          </p:spPr>
-          <p:txBody>
-            <a:bodyPr wrap="square" lIns="0" tIns="0" rIns="0" bIns="0" rtlCol="0">
-              <a:spAutoFit/>
-            </a:bodyPr>
-            <a:lstStyle>
-              <a:defPPr>
-                <a:defRPr lang="en-US"/>
-              </a:defPPr>
-              <a:lvl1pPr algn="r">
-                <a:defRPr sz="1400">
-                  <a:solidFill>
-                    <a:srgbClr val="0070C0"/>
-                  </a:solidFill>
-                </a:defRPr>
-              </a:lvl1pPr>
-            </a:lstStyle>
-            <a:p>
-              <a:r>
-                <a:rPr lang="en-US" sz="1200" dirty="0" err="1">
-                  <a:solidFill>
-                    <a:schemeClr val="accent4">
-                      <a:lumMod val="75000"/>
-                    </a:schemeClr>
-                  </a:solidFill>
-                </a:rPr>
-                <a:t>addEvent</a:t>
-              </a:r>
-              <a:r>
-                <a:rPr lang="en-US" sz="1200" dirty="0">
-                  <a:solidFill>
-                    <a:srgbClr val="7030A0"/>
-                  </a:solidFill>
-                </a:rPr>
-                <a:t>()</a:t>
-              </a:r>
-              <a:endParaRPr lang="en-US" sz="1200" dirty="0"/>
-            </a:p>
-          </p:txBody>
-        </p:sp>
-        <p:sp>
-          <p:nvSpPr>
-            <p:cNvPr id="80" name="TextBox 79"/>
-            <p:cNvSpPr txBox="1"/>
-            <p:nvPr/>
-          </p:nvSpPr>
-          <p:spPr>
-            <a:xfrm>
-              <a:off x="1622129" y="1106152"/>
-              <a:ext cx="2271840" cy="215444"/>
-            </a:xfrm>
-            <a:prstGeom prst="rect">
-              <a:avLst/>
-            </a:prstGeom>
-            <a:noFill/>
-          </p:spPr>
-          <p:txBody>
-            <a:bodyPr wrap="square" lIns="0" tIns="0" rIns="0" bIns="0" rtlCol="0">
-              <a:spAutoFit/>
-            </a:bodyPr>
-            <a:lstStyle>
-              <a:defPPr>
-                <a:defRPr lang="en-US"/>
-              </a:defPPr>
-              <a:lvl1pPr algn="r">
-                <a:defRPr sz="1400">
-                  <a:solidFill>
-                    <a:srgbClr val="0070C0"/>
-                  </a:solidFill>
-                </a:defRPr>
-              </a:lvl1pPr>
-            </a:lstStyle>
-            <a:p>
-              <a:r>
-                <a:rPr lang="en-US" dirty="0" err="1"/>
-                <a:t>parseCommand</a:t>
-              </a:r>
-              <a:r>
-                <a:rPr lang="en-US" dirty="0"/>
-                <a:t>(“</a:t>
-              </a:r>
-              <a:r>
-                <a:rPr lang="en-US" dirty="0" err="1"/>
-                <a:t>add_event</a:t>
-              </a:r>
-              <a:r>
-                <a:rPr lang="en-US" dirty="0"/>
-                <a:t>”)</a:t>
-              </a:r>
-            </a:p>
-          </p:txBody>
-        </p:sp>
-        <p:sp>
-          <p:nvSpPr>
-            <p:cNvPr id="82" name="TextBox 81"/>
-            <p:cNvSpPr txBox="1"/>
-            <p:nvPr/>
-          </p:nvSpPr>
-          <p:spPr>
-            <a:xfrm>
-              <a:off x="3272755" y="3791076"/>
-              <a:ext cx="621216" cy="215444"/>
-            </a:xfrm>
-            <a:prstGeom prst="rect">
-              <a:avLst/>
-            </a:prstGeom>
-            <a:noFill/>
-          </p:spPr>
-          <p:txBody>
-            <a:bodyPr wrap="square" lIns="0" tIns="0" rIns="0" bIns="0" rtlCol="0">
-              <a:spAutoFit/>
-            </a:bodyPr>
-            <a:lstStyle>
-              <a:defPPr>
-                <a:defRPr lang="en-US"/>
-              </a:defPPr>
-              <a:lvl1pPr algn="r">
-                <a:defRPr sz="1400">
-                  <a:solidFill>
-                    <a:srgbClr val="0070C0"/>
-                  </a:solidFill>
-                </a:defRPr>
-              </a:lvl1pPr>
-            </a:lstStyle>
-            <a:p>
-              <a:r>
-                <a:rPr lang="en-US" dirty="0"/>
-                <a:t>result</a:t>
-              </a:r>
-            </a:p>
-          </p:txBody>
-        </p:sp>
-        <p:sp>
-          <p:nvSpPr>
-            <p:cNvPr id="83" name="TextBox 82"/>
-            <p:cNvSpPr txBox="1"/>
-            <p:nvPr/>
-          </p:nvSpPr>
-          <p:spPr>
-            <a:xfrm>
-              <a:off x="645270" y="3945901"/>
-              <a:ext cx="762000" cy="215444"/>
-            </a:xfrm>
-            <a:prstGeom prst="rect">
-              <a:avLst/>
-            </a:prstGeom>
-            <a:noFill/>
-          </p:spPr>
-          <p:txBody>
-            <a:bodyPr wrap="square" lIns="0" tIns="0" rIns="0" bIns="0" rtlCol="0">
-              <a:spAutoFit/>
-            </a:bodyPr>
-            <a:lstStyle>
-              <a:defPPr>
-                <a:defRPr lang="en-US"/>
-              </a:defPPr>
-              <a:lvl1pPr algn="r">
-                <a:defRPr sz="1400">
-                  <a:solidFill>
-                    <a:srgbClr val="0070C0"/>
-                  </a:solidFill>
-                </a:defRPr>
-              </a:lvl1pPr>
-            </a:lstStyle>
-            <a:p>
-              <a:r>
-                <a:rPr lang="en-US" dirty="0"/>
-                <a:t>result</a:t>
-              </a:r>
-            </a:p>
-          </p:txBody>
-        </p:sp>
-        <p:sp>
-          <p:nvSpPr>
-            <p:cNvPr id="84" name="Rectangle 62"/>
-            <p:cNvSpPr/>
-            <p:nvPr/>
-          </p:nvSpPr>
-          <p:spPr>
-            <a:xfrm>
-              <a:off x="7497155" y="2568606"/>
-              <a:ext cx="2181777" cy="335427"/>
-            </a:xfrm>
-            <a:prstGeom prst="rect">
-              <a:avLst/>
-            </a:prstGeom>
+              </a:rPr>
+              <a:t>()</a:t>
+            </a:r>
+          </a:p>
+        </p:txBody>
+      </p:sp>
+      <p:cxnSp>
+        <p:nvCxnSpPr>
+          <p:cNvPr id="52" name="Straight Arrow Connector 51"/>
+          <p:cNvCxnSpPr>
+            <a:cxnSpLocks/>
+          </p:cNvCxnSpPr>
+          <p:nvPr/>
+        </p:nvCxnSpPr>
+        <p:spPr>
+          <a:xfrm>
+            <a:off x="7043991" y="3182839"/>
+            <a:ext cx="1470216" cy="0"/>
+          </a:xfrm>
+          <a:prstGeom prst="straightConnector1">
+            <a:avLst/>
+          </a:prstGeom>
+          <a:ln w="19050">
             <a:solidFill>
               <a:srgbClr val="7030A0"/>
             </a:solidFill>
-            <a:ln w="19050">
-              <a:solidFill>
-                <a:srgbClr val="7030A0"/>
-              </a:solidFill>
-            </a:ln>
-            <a:effectLst/>
-          </p:spPr>
-          <p:style>
-            <a:lnRef idx="1">
-              <a:schemeClr val="accent2"/>
-            </a:lnRef>
-            <a:fillRef idx="2">
-              <a:schemeClr val="accent2"/>
-            </a:fillRef>
-            <a:effectRef idx="1">
-              <a:schemeClr val="accent2"/>
-            </a:effectRef>
-            <a:fontRef idx="minor">
-              <a:schemeClr val="dk1"/>
-            </a:fontRef>
-          </p:style>
-          <p:txBody>
-            <a:bodyPr rtlCol="0" anchor="ctr"/>
-            <a:lstStyle/>
-            <a:p>
-              <a:pPr algn="ctr"/>
-              <a:r>
-                <a:rPr lang="en-US" sz="1600" dirty="0">
-                  <a:solidFill>
-                    <a:schemeClr val="bg1"/>
-                  </a:solidFill>
-                </a:rPr>
-                <a:t>:</a:t>
-              </a:r>
-              <a:r>
-                <a:rPr lang="en-US" sz="1600" dirty="0" err="1">
-                  <a:solidFill>
-                    <a:schemeClr val="bg1"/>
-                  </a:solidFill>
-                </a:rPr>
-                <a:t>VersionedAddressBook</a:t>
-              </a:r>
-              <a:endParaRPr lang="en-SG" sz="1600" dirty="0">
-                <a:solidFill>
-                  <a:schemeClr val="bg1"/>
-                </a:solidFill>
-              </a:endParaRPr>
-            </a:p>
-          </p:txBody>
-        </p:sp>
-        <p:sp>
-          <p:nvSpPr>
-            <p:cNvPr id="86" name="Rectangle 85"/>
-            <p:cNvSpPr/>
-            <p:nvPr/>
-          </p:nvSpPr>
-          <p:spPr>
-            <a:xfrm>
-              <a:off x="8514207" y="3182840"/>
-              <a:ext cx="129933" cy="398562"/>
-            </a:xfrm>
-            <a:prstGeom prst="rect">
-              <a:avLst/>
-            </a:prstGeom>
+            <a:tailEnd type="arrow"/>
+          </a:ln>
+        </p:spPr>
+        <p:style>
+          <a:lnRef idx="1">
+            <a:schemeClr val="accent1"/>
+          </a:lnRef>
+          <a:fillRef idx="0">
+            <a:schemeClr val="accent1"/>
+          </a:fillRef>
+          <a:effectRef idx="0">
+            <a:schemeClr val="accent1"/>
+          </a:effectRef>
+          <a:fontRef idx="minor">
+            <a:schemeClr val="tx1"/>
+          </a:fontRef>
+        </p:style>
+      </p:cxnSp>
+      <p:cxnSp>
+        <p:nvCxnSpPr>
+          <p:cNvPr id="60" name="Straight Arrow Connector 59">
+            <a:extLst>
+              <a:ext uri="{FF2B5EF4-FFF2-40B4-BE49-F238E27FC236}">
+                <a16:creationId xmlns:a16="http://schemas.microsoft.com/office/drawing/2014/main" id="{7C9F21BC-13A9-471F-825A-2621FD36355F}"/>
+              </a:ext>
+            </a:extLst>
+          </p:cNvPr>
+          <p:cNvCxnSpPr>
+            <a:cxnSpLocks/>
+          </p:cNvCxnSpPr>
+          <p:nvPr/>
+        </p:nvCxnSpPr>
+        <p:spPr>
+          <a:xfrm flipV="1">
+            <a:off x="7043991" y="3564914"/>
+            <a:ext cx="1470216" cy="6325"/>
+          </a:xfrm>
+          <a:prstGeom prst="straightConnector1">
+            <a:avLst/>
+          </a:prstGeom>
+          <a:ln w="19050">
             <a:solidFill>
               <a:srgbClr val="7030A0"/>
             </a:solidFill>
-            <a:ln>
-              <a:solidFill>
-                <a:srgbClr val="7030A0"/>
-              </a:solidFill>
-            </a:ln>
-            <a:effectLst/>
-          </p:spPr>
-          <p:style>
-            <a:lnRef idx="1">
-              <a:schemeClr val="accent3"/>
-            </a:lnRef>
-            <a:fillRef idx="2">
-              <a:schemeClr val="accent3"/>
-            </a:fillRef>
-            <a:effectRef idx="1">
-              <a:schemeClr val="accent3"/>
-            </a:effectRef>
-            <a:fontRef idx="minor">
-              <a:schemeClr val="dk1"/>
-            </a:fontRef>
-          </p:style>
-          <p:txBody>
-            <a:bodyPr rtlCol="0" anchor="ctr"/>
-            <a:lstStyle/>
-            <a:p>
-              <a:pPr algn="ctr"/>
-              <a:endParaRPr lang="en-SG" sz="1400"/>
-            </a:p>
-          </p:txBody>
-        </p:sp>
-        <p:sp>
-          <p:nvSpPr>
-            <p:cNvPr id="93" name="TextBox 92"/>
-            <p:cNvSpPr txBox="1"/>
-            <p:nvPr/>
-          </p:nvSpPr>
-          <p:spPr>
-            <a:xfrm>
-              <a:off x="2724792" y="1905793"/>
-              <a:ext cx="220343" cy="215444"/>
-            </a:xfrm>
-            <a:prstGeom prst="rect">
-              <a:avLst/>
-            </a:prstGeom>
-            <a:noFill/>
-          </p:spPr>
-          <p:txBody>
-            <a:bodyPr wrap="square" lIns="0" tIns="0" rIns="0" bIns="0" rtlCol="0">
-              <a:spAutoFit/>
-            </a:bodyPr>
-            <a:lstStyle>
-              <a:defPPr>
-                <a:defRPr lang="en-US"/>
-              </a:defPPr>
-              <a:lvl1pPr algn="r">
-                <a:defRPr sz="1400">
-                  <a:solidFill>
-                    <a:srgbClr val="0070C0"/>
-                  </a:solidFill>
-                </a:defRPr>
-              </a:lvl1pPr>
-            </a:lstStyle>
-            <a:p>
-              <a:r>
-                <a:rPr lang="en-US" dirty="0"/>
-                <a:t>a</a:t>
-              </a:r>
-            </a:p>
-          </p:txBody>
-        </p:sp>
-        <p:sp>
-          <p:nvSpPr>
-            <p:cNvPr id="40" name="Rectangle 62"/>
-            <p:cNvSpPr/>
-            <p:nvPr/>
-          </p:nvSpPr>
-          <p:spPr>
-            <a:xfrm>
-              <a:off x="6549765" y="2362200"/>
-              <a:ext cx="841636" cy="300180"/>
-            </a:xfrm>
-            <a:prstGeom prst="rect">
-              <a:avLst/>
-            </a:prstGeom>
+            <a:prstDash val="sysDash"/>
+            <a:headEnd type="arrow" w="med" len="med"/>
+            <a:tailEnd type="none" w="med" len="med"/>
+          </a:ln>
+        </p:spPr>
+        <p:style>
+          <a:lnRef idx="1">
+            <a:schemeClr val="accent1"/>
+          </a:lnRef>
+          <a:fillRef idx="0">
+            <a:schemeClr val="accent1"/>
+          </a:fillRef>
+          <a:effectRef idx="0">
+            <a:schemeClr val="accent1"/>
+          </a:effectRef>
+          <a:fontRef idx="minor">
+            <a:schemeClr val="tx1"/>
+          </a:fontRef>
+        </p:style>
+      </p:cxnSp>
+      <p:cxnSp>
+        <p:nvCxnSpPr>
+          <p:cNvPr id="63" name="Straight Arrow Connector 62">
+            <a:extLst>
+              <a:ext uri="{FF2B5EF4-FFF2-40B4-BE49-F238E27FC236}">
+                <a16:creationId xmlns:a16="http://schemas.microsoft.com/office/drawing/2014/main" id="{7C9F21BC-13A9-471F-825A-2621FD36355F}"/>
+              </a:ext>
+            </a:extLst>
+          </p:cNvPr>
+          <p:cNvCxnSpPr>
+            <a:cxnSpLocks/>
+            <a:endCxn id="49" idx="2"/>
+          </p:cNvCxnSpPr>
+          <p:nvPr/>
+        </p:nvCxnSpPr>
+        <p:spPr>
+          <a:xfrm>
+            <a:off x="5675919" y="3733799"/>
+            <a:ext cx="1296056" cy="0"/>
+          </a:xfrm>
+          <a:prstGeom prst="straightConnector1">
+            <a:avLst/>
+          </a:prstGeom>
+          <a:ln w="19050">
             <a:solidFill>
               <a:srgbClr val="7030A0"/>
             </a:solidFill>
-            <a:ln w="19050">
-              <a:solidFill>
-                <a:srgbClr val="7030A0"/>
-              </a:solidFill>
-            </a:ln>
-            <a:effectLst/>
-          </p:spPr>
-          <p:style>
-            <a:lnRef idx="1">
-              <a:schemeClr val="accent2"/>
-            </a:lnRef>
-            <a:fillRef idx="2">
-              <a:schemeClr val="accent2"/>
-            </a:fillRef>
-            <a:effectRef idx="1">
-              <a:schemeClr val="accent2"/>
-            </a:effectRef>
-            <a:fontRef idx="minor">
-              <a:schemeClr val="dk1"/>
-            </a:fontRef>
-          </p:style>
-          <p:txBody>
-            <a:bodyPr rtlCol="0" anchor="ctr"/>
-            <a:lstStyle/>
-            <a:p>
-              <a:pPr algn="ctr"/>
-              <a:r>
-                <a:rPr lang="en-US" sz="1600" dirty="0">
-                  <a:solidFill>
-                    <a:schemeClr val="bg1"/>
-                  </a:solidFill>
-                </a:rPr>
-                <a:t>: Model</a:t>
-              </a:r>
-              <a:endParaRPr lang="en-SG" sz="1600" dirty="0">
-                <a:solidFill>
-                  <a:schemeClr val="bg1"/>
-                </a:solidFill>
-              </a:endParaRPr>
-            </a:p>
-          </p:txBody>
-        </p:sp>
-        <p:cxnSp>
-          <p:nvCxnSpPr>
-            <p:cNvPr id="46" name="Straight Connector 45"/>
-            <p:cNvCxnSpPr>
-              <a:cxnSpLocks/>
-            </p:cNvCxnSpPr>
-            <p:nvPr/>
-          </p:nvCxnSpPr>
-          <p:spPr>
-            <a:xfrm flipH="1">
-              <a:off x="6986491" y="2653306"/>
-              <a:ext cx="3959" cy="1735710"/>
-            </a:xfrm>
-            <a:prstGeom prst="line">
-              <a:avLst/>
-            </a:prstGeom>
-            <a:ln w="19050">
-              <a:solidFill>
-                <a:srgbClr val="7030A0"/>
-              </a:solidFill>
-              <a:prstDash val="sysDash"/>
-            </a:ln>
-            <a:effectLst/>
-          </p:spPr>
-          <p:style>
-            <a:lnRef idx="1">
-              <a:schemeClr val="accent1"/>
-            </a:lnRef>
-            <a:fillRef idx="2">
-              <a:schemeClr val="accent1"/>
-            </a:fillRef>
-            <a:effectRef idx="1">
-              <a:schemeClr val="accent1"/>
-            </a:effectRef>
-            <a:fontRef idx="minor">
-              <a:schemeClr val="dk1"/>
-            </a:fontRef>
-          </p:style>
-        </p:cxnSp>
-        <p:sp>
-          <p:nvSpPr>
-            <p:cNvPr id="49" name="Rectangle 48"/>
-            <p:cNvSpPr/>
-            <p:nvPr/>
-          </p:nvSpPr>
-          <p:spPr>
-            <a:xfrm>
-              <a:off x="6887527" y="2958106"/>
-              <a:ext cx="168896" cy="775693"/>
-            </a:xfrm>
-            <a:prstGeom prst="rect">
-              <a:avLst/>
-            </a:prstGeom>
-            <a:solidFill>
-              <a:srgbClr val="7030A0"/>
-            </a:solidFill>
-            <a:ln>
-              <a:solidFill>
-                <a:srgbClr val="7030A0"/>
-              </a:solidFill>
-            </a:ln>
-            <a:effectLst/>
-          </p:spPr>
-          <p:style>
-            <a:lnRef idx="1">
-              <a:schemeClr val="accent3"/>
-            </a:lnRef>
-            <a:fillRef idx="2">
-              <a:schemeClr val="accent3"/>
-            </a:fillRef>
-            <a:effectRef idx="1">
-              <a:schemeClr val="accent3"/>
-            </a:effectRef>
-            <a:fontRef idx="minor">
-              <a:schemeClr val="dk1"/>
-            </a:fontRef>
-          </p:style>
-          <p:txBody>
-            <a:bodyPr rtlCol="0" anchor="ctr"/>
-            <a:lstStyle/>
-            <a:p>
-              <a:pPr algn="ctr"/>
-              <a:endParaRPr lang="en-SG" sz="1400"/>
-            </a:p>
-          </p:txBody>
-        </p:sp>
-        <p:cxnSp>
-          <p:nvCxnSpPr>
-            <p:cNvPr id="50" name="Straight Arrow Connector 49"/>
-            <p:cNvCxnSpPr>
-              <a:cxnSpLocks/>
-            </p:cNvCxnSpPr>
-            <p:nvPr/>
-          </p:nvCxnSpPr>
-          <p:spPr>
-            <a:xfrm>
-              <a:off x="5685755" y="2975344"/>
-              <a:ext cx="1210345" cy="0"/>
-            </a:xfrm>
-            <a:prstGeom prst="straightConnector1">
-              <a:avLst/>
-            </a:prstGeom>
-            <a:ln w="19050">
-              <a:solidFill>
-                <a:srgbClr val="0070C0"/>
-              </a:solidFill>
-              <a:tailEnd type="arrow"/>
-            </a:ln>
-          </p:spPr>
-          <p:style>
-            <a:lnRef idx="1">
-              <a:schemeClr val="accent1"/>
-            </a:lnRef>
-            <a:fillRef idx="0">
-              <a:schemeClr val="accent1"/>
-            </a:fillRef>
-            <a:effectRef idx="0">
-              <a:schemeClr val="accent1"/>
-            </a:effectRef>
-            <a:fontRef idx="minor">
-              <a:schemeClr val="tx1"/>
-            </a:fontRef>
-          </p:style>
-        </p:cxnSp>
-        <p:sp>
-          <p:nvSpPr>
-            <p:cNvPr id="4" name="TextBox 3"/>
-            <p:cNvSpPr txBox="1"/>
-            <p:nvPr/>
-          </p:nvSpPr>
-          <p:spPr>
-            <a:xfrm>
-              <a:off x="5472880" y="4258211"/>
-              <a:ext cx="258404" cy="261610"/>
-            </a:xfrm>
-            <a:prstGeom prst="rect">
-              <a:avLst/>
-            </a:prstGeom>
-            <a:noFill/>
-          </p:spPr>
-          <p:txBody>
-            <a:bodyPr wrap="none" rtlCol="0">
-              <a:spAutoFit/>
-            </a:bodyPr>
-            <a:lstStyle/>
-            <a:p>
-              <a:r>
-                <a:rPr lang="en-SG" sz="1100" dirty="0">
-                  <a:solidFill>
-                    <a:srgbClr val="002060"/>
-                  </a:solidFill>
-                </a:rPr>
-                <a:t>X</a:t>
-              </a:r>
-            </a:p>
-          </p:txBody>
-        </p:sp>
-        <p:sp>
-          <p:nvSpPr>
-            <p:cNvPr id="19" name="Rectangle 62"/>
-            <p:cNvSpPr/>
-            <p:nvPr/>
-          </p:nvSpPr>
-          <p:spPr>
-            <a:xfrm>
-              <a:off x="5035976" y="1260268"/>
-              <a:ext cx="1216200" cy="459665"/>
-            </a:xfrm>
-            <a:prstGeom prst="rect">
-              <a:avLst/>
-            </a:prstGeom>
-            <a:solidFill>
-              <a:srgbClr val="0070C0"/>
-            </a:solidFill>
-            <a:ln w="19050">
-              <a:solidFill>
-                <a:srgbClr val="0070C0"/>
-              </a:solidFill>
-            </a:ln>
-            <a:effectLst/>
-          </p:spPr>
-          <p:style>
-            <a:lnRef idx="1">
-              <a:schemeClr val="accent2"/>
-            </a:lnRef>
-            <a:fillRef idx="2">
-              <a:schemeClr val="accent2"/>
-            </a:fillRef>
-            <a:effectRef idx="1">
-              <a:schemeClr val="accent2"/>
-            </a:effectRef>
-            <a:fontRef idx="minor">
-              <a:schemeClr val="dk1"/>
-            </a:fontRef>
-          </p:style>
-          <p:txBody>
-            <a:bodyPr rtlCol="0" anchor="ctr"/>
-            <a:lstStyle/>
-            <a:p>
-              <a:pPr algn="ctr"/>
-              <a:r>
-                <a:rPr lang="en-US" sz="1600" dirty="0">
-                  <a:solidFill>
-                    <a:schemeClr val="bg1"/>
-                  </a:solidFill>
-                </a:rPr>
-                <a:t>a:AddEvent</a:t>
-              </a:r>
-              <a:br>
-                <a:rPr lang="en-US" sz="1600" dirty="0">
-                  <a:solidFill>
-                    <a:schemeClr val="bg1"/>
-                  </a:solidFill>
-                </a:rPr>
-              </a:br>
-              <a:r>
-                <a:rPr lang="en-US" sz="1600" dirty="0">
-                  <a:solidFill>
-                    <a:schemeClr val="bg1"/>
-                  </a:solidFill>
-                </a:rPr>
-                <a:t>Command</a:t>
-              </a:r>
-              <a:endParaRPr lang="en-SG" sz="1600" dirty="0">
-                <a:solidFill>
-                  <a:schemeClr val="bg1"/>
-                </a:solidFill>
-              </a:endParaRPr>
-            </a:p>
-          </p:txBody>
-        </p:sp>
-        <p:cxnSp>
-          <p:nvCxnSpPr>
-            <p:cNvPr id="66" name="Straight Arrow Connector 65">
-              <a:extLst>
-                <a:ext uri="{FF2B5EF4-FFF2-40B4-BE49-F238E27FC236}">
-                  <a16:creationId xmlns:a16="http://schemas.microsoft.com/office/drawing/2014/main" id="{39916E2E-195A-4DC8-B025-B05FA87E6796}"/>
-                </a:ext>
-              </a:extLst>
-            </p:cNvPr>
-            <p:cNvCxnSpPr>
-              <a:cxnSpLocks/>
-            </p:cNvCxnSpPr>
-            <p:nvPr/>
-          </p:nvCxnSpPr>
-          <p:spPr>
-            <a:xfrm>
-              <a:off x="1691351" y="2731314"/>
-              <a:ext cx="3832164" cy="1"/>
-            </a:xfrm>
-            <a:prstGeom prst="straightConnector1">
-              <a:avLst/>
-            </a:prstGeom>
-            <a:ln w="19050">
-              <a:solidFill>
-                <a:srgbClr val="0070C0"/>
-              </a:solidFill>
-              <a:tailEnd type="arrow"/>
-            </a:ln>
-          </p:spPr>
-          <p:style>
-            <a:lnRef idx="1">
-              <a:schemeClr val="accent1"/>
-            </a:lnRef>
-            <a:fillRef idx="0">
-              <a:schemeClr val="accent1"/>
-            </a:fillRef>
-            <a:effectRef idx="0">
-              <a:schemeClr val="accent1"/>
-            </a:effectRef>
-            <a:fontRef idx="minor">
-              <a:schemeClr val="tx1"/>
-            </a:fontRef>
-          </p:style>
-        </p:cxnSp>
-        <p:cxnSp>
-          <p:nvCxnSpPr>
-            <p:cNvPr id="67" name="Straight Arrow Connector 66">
-              <a:extLst>
-                <a:ext uri="{FF2B5EF4-FFF2-40B4-BE49-F238E27FC236}">
-                  <a16:creationId xmlns:a16="http://schemas.microsoft.com/office/drawing/2014/main" id="{D881596E-177C-4FDC-8E60-CAB90B3D5FAB}"/>
-                </a:ext>
-              </a:extLst>
-            </p:cNvPr>
-            <p:cNvCxnSpPr>
-              <a:cxnSpLocks/>
-            </p:cNvCxnSpPr>
-            <p:nvPr/>
-          </p:nvCxnSpPr>
-          <p:spPr>
-            <a:xfrm>
-              <a:off x="1708245" y="1363918"/>
-              <a:ext cx="2256705" cy="1"/>
-            </a:xfrm>
-            <a:prstGeom prst="straightConnector1">
-              <a:avLst/>
-            </a:prstGeom>
-            <a:ln w="19050">
-              <a:solidFill>
-                <a:srgbClr val="0070C0"/>
-              </a:solidFill>
-              <a:tailEnd type="arrow"/>
-            </a:ln>
-          </p:spPr>
-          <p:style>
-            <a:lnRef idx="1">
-              <a:schemeClr val="accent1"/>
-            </a:lnRef>
-            <a:fillRef idx="0">
-              <a:schemeClr val="accent1"/>
-            </a:fillRef>
-            <a:effectRef idx="0">
-              <a:schemeClr val="accent1"/>
-            </a:effectRef>
-            <a:fontRef idx="minor">
-              <a:schemeClr val="tx1"/>
-            </a:fontRef>
-          </p:style>
-        </p:cxnSp>
-        <p:cxnSp>
-          <p:nvCxnSpPr>
-            <p:cNvPr id="69" name="Straight Arrow Connector 68">
-              <a:extLst>
-                <a:ext uri="{FF2B5EF4-FFF2-40B4-BE49-F238E27FC236}">
-                  <a16:creationId xmlns:a16="http://schemas.microsoft.com/office/drawing/2014/main" id="{7C9F21BC-13A9-471F-825A-2621FD36355F}"/>
-                </a:ext>
-              </a:extLst>
-            </p:cNvPr>
-            <p:cNvCxnSpPr>
-              <a:cxnSpLocks/>
-            </p:cNvCxnSpPr>
-            <p:nvPr/>
-          </p:nvCxnSpPr>
-          <p:spPr>
-            <a:xfrm>
-              <a:off x="1691998" y="4036462"/>
-              <a:ext cx="3831517" cy="0"/>
-            </a:xfrm>
-            <a:prstGeom prst="straightConnector1">
-              <a:avLst/>
-            </a:prstGeom>
-            <a:ln w="19050">
-              <a:solidFill>
-                <a:srgbClr val="0070C0"/>
-              </a:solidFill>
-              <a:prstDash val="sysDash"/>
-              <a:headEnd type="arrow" w="med" len="med"/>
-              <a:tailEnd type="none" w="med" len="med"/>
-            </a:ln>
-          </p:spPr>
-          <p:style>
-            <a:lnRef idx="1">
-              <a:schemeClr val="accent1"/>
-            </a:lnRef>
-            <a:fillRef idx="0">
-              <a:schemeClr val="accent1"/>
-            </a:fillRef>
-            <a:effectRef idx="0">
-              <a:schemeClr val="accent1"/>
-            </a:effectRef>
-            <a:fontRef idx="minor">
-              <a:schemeClr val="tx1"/>
-            </a:fontRef>
-          </p:style>
-        </p:cxnSp>
-        <p:cxnSp>
-          <p:nvCxnSpPr>
-            <p:cNvPr id="89" name="Straight Connector 88">
-              <a:extLst>
-                <a:ext uri="{FF2B5EF4-FFF2-40B4-BE49-F238E27FC236}">
-                  <a16:creationId xmlns:a16="http://schemas.microsoft.com/office/drawing/2014/main" id="{E4E1C8CA-49DF-45D8-80A5-D5C8282EE927}"/>
-                </a:ext>
-              </a:extLst>
-            </p:cNvPr>
-            <p:cNvCxnSpPr>
-              <a:cxnSpLocks/>
-            </p:cNvCxnSpPr>
-            <p:nvPr/>
-          </p:nvCxnSpPr>
-          <p:spPr>
-            <a:xfrm>
-              <a:off x="8588043" y="2871355"/>
-              <a:ext cx="17996" cy="1467648"/>
-            </a:xfrm>
-            <a:prstGeom prst="line">
-              <a:avLst/>
-            </a:prstGeom>
-            <a:ln w="19050">
-              <a:solidFill>
-                <a:srgbClr val="7030A0"/>
-              </a:solidFill>
-              <a:prstDash val="sysDash"/>
-            </a:ln>
-            <a:effectLst/>
-          </p:spPr>
-          <p:style>
-            <a:lnRef idx="1">
-              <a:schemeClr val="accent1"/>
-            </a:lnRef>
-            <a:fillRef idx="2">
-              <a:schemeClr val="accent1"/>
-            </a:fillRef>
-            <a:effectRef idx="1">
-              <a:schemeClr val="accent1"/>
-            </a:effectRef>
-            <a:fontRef idx="minor">
-              <a:schemeClr val="dk1"/>
-            </a:fontRef>
-          </p:style>
-        </p:cxnSp>
-        <p:sp>
-          <p:nvSpPr>
-            <p:cNvPr id="41" name="TextBox 40"/>
-            <p:cNvSpPr txBox="1"/>
-            <p:nvPr/>
-          </p:nvSpPr>
-          <p:spPr>
-            <a:xfrm>
-              <a:off x="7474923" y="2975344"/>
-              <a:ext cx="744455" cy="184666"/>
-            </a:xfrm>
-            <a:prstGeom prst="rect">
-              <a:avLst/>
-            </a:prstGeom>
-            <a:noFill/>
-            <a:ln>
-              <a:noFill/>
-            </a:ln>
-          </p:spPr>
-          <p:txBody>
-            <a:bodyPr wrap="square" lIns="0" tIns="0" rIns="0" bIns="0" rtlCol="0">
-              <a:spAutoFit/>
-            </a:bodyPr>
-            <a:lstStyle>
-              <a:defPPr>
-                <a:defRPr lang="en-US"/>
-              </a:defPPr>
-              <a:lvl1pPr algn="r">
-                <a:defRPr sz="1400">
-                  <a:solidFill>
-                    <a:srgbClr val="0070C0"/>
-                  </a:solidFill>
-                </a:defRPr>
-              </a:lvl1pPr>
-            </a:lstStyle>
-            <a:p>
-              <a:r>
-                <a:rPr lang="en-US" sz="1200" dirty="0" err="1">
-                  <a:solidFill>
-                    <a:srgbClr val="7030A0"/>
-                  </a:solidFill>
-                </a:rPr>
-                <a:t>addEvent</a:t>
-              </a:r>
-              <a:r>
-                <a:rPr lang="en-US" sz="1200" dirty="0">
-                  <a:solidFill>
-                    <a:schemeClr val="accent4">
-                      <a:lumMod val="75000"/>
-                    </a:schemeClr>
-                  </a:solidFill>
-                </a:rPr>
-                <a:t>()</a:t>
-              </a:r>
-            </a:p>
-          </p:txBody>
-        </p:sp>
-        <p:cxnSp>
-          <p:nvCxnSpPr>
-            <p:cNvPr id="52" name="Straight Arrow Connector 51"/>
-            <p:cNvCxnSpPr>
-              <a:cxnSpLocks/>
-            </p:cNvCxnSpPr>
-            <p:nvPr/>
-          </p:nvCxnSpPr>
-          <p:spPr>
-            <a:xfrm>
-              <a:off x="7043991" y="3182839"/>
-              <a:ext cx="1470216" cy="0"/>
-            </a:xfrm>
-            <a:prstGeom prst="straightConnector1">
-              <a:avLst/>
-            </a:prstGeom>
-            <a:ln w="19050">
-              <a:solidFill>
-                <a:srgbClr val="7030A0"/>
-              </a:solidFill>
-              <a:tailEnd type="arrow"/>
-            </a:ln>
-          </p:spPr>
-          <p:style>
-            <a:lnRef idx="1">
-              <a:schemeClr val="accent1"/>
-            </a:lnRef>
-            <a:fillRef idx="0">
-              <a:schemeClr val="accent1"/>
-            </a:fillRef>
-            <a:effectRef idx="0">
-              <a:schemeClr val="accent1"/>
-            </a:effectRef>
-            <a:fontRef idx="minor">
-              <a:schemeClr val="tx1"/>
-            </a:fontRef>
-          </p:style>
-        </p:cxnSp>
-        <p:cxnSp>
-          <p:nvCxnSpPr>
-            <p:cNvPr id="60" name="Straight Arrow Connector 59">
-              <a:extLst>
-                <a:ext uri="{FF2B5EF4-FFF2-40B4-BE49-F238E27FC236}">
-                  <a16:creationId xmlns:a16="http://schemas.microsoft.com/office/drawing/2014/main" id="{7C9F21BC-13A9-471F-825A-2621FD36355F}"/>
-                </a:ext>
-              </a:extLst>
-            </p:cNvPr>
-            <p:cNvCxnSpPr>
-              <a:cxnSpLocks/>
-            </p:cNvCxnSpPr>
-            <p:nvPr/>
-          </p:nvCxnSpPr>
-          <p:spPr>
-            <a:xfrm flipV="1">
-              <a:off x="7043991" y="3564914"/>
-              <a:ext cx="1470216" cy="6325"/>
-            </a:xfrm>
-            <a:prstGeom prst="straightConnector1">
-              <a:avLst/>
-            </a:prstGeom>
-            <a:ln w="19050">
-              <a:solidFill>
-                <a:srgbClr val="7030A0"/>
-              </a:solidFill>
-              <a:prstDash val="sysDash"/>
-              <a:headEnd type="arrow" w="med" len="med"/>
-              <a:tailEnd type="none" w="med" len="med"/>
-            </a:ln>
-          </p:spPr>
-          <p:style>
-            <a:lnRef idx="1">
-              <a:schemeClr val="accent1"/>
-            </a:lnRef>
-            <a:fillRef idx="0">
-              <a:schemeClr val="accent1"/>
-            </a:fillRef>
-            <a:effectRef idx="0">
-              <a:schemeClr val="accent1"/>
-            </a:effectRef>
-            <a:fontRef idx="minor">
-              <a:schemeClr val="tx1"/>
-            </a:fontRef>
-          </p:style>
-        </p:cxnSp>
-        <p:cxnSp>
-          <p:nvCxnSpPr>
-            <p:cNvPr id="63" name="Straight Arrow Connector 62">
-              <a:extLst>
-                <a:ext uri="{FF2B5EF4-FFF2-40B4-BE49-F238E27FC236}">
-                  <a16:creationId xmlns:a16="http://schemas.microsoft.com/office/drawing/2014/main" id="{7C9F21BC-13A9-471F-825A-2621FD36355F}"/>
-                </a:ext>
-              </a:extLst>
-            </p:cNvPr>
-            <p:cNvCxnSpPr>
-              <a:cxnSpLocks/>
-              <a:endCxn id="49" idx="2"/>
-            </p:cNvCxnSpPr>
-            <p:nvPr/>
-          </p:nvCxnSpPr>
-          <p:spPr>
-            <a:xfrm>
-              <a:off x="5675919" y="3733799"/>
-              <a:ext cx="1296056" cy="0"/>
-            </a:xfrm>
-            <a:prstGeom prst="straightConnector1">
-              <a:avLst/>
-            </a:prstGeom>
-            <a:ln w="19050">
-              <a:solidFill>
-                <a:srgbClr val="7030A0"/>
-              </a:solidFill>
-              <a:prstDash val="sysDash"/>
-              <a:headEnd type="arrow" w="med" len="med"/>
-              <a:tailEnd type="none" w="med" len="med"/>
-            </a:ln>
-          </p:spPr>
-          <p:style>
-            <a:lnRef idx="1">
-              <a:schemeClr val="accent1"/>
-            </a:lnRef>
-            <a:fillRef idx="0">
-              <a:schemeClr val="accent1"/>
-            </a:fillRef>
-            <a:effectRef idx="0">
-              <a:schemeClr val="accent1"/>
-            </a:effectRef>
-            <a:fontRef idx="minor">
-              <a:schemeClr val="tx1"/>
-            </a:fontRef>
-          </p:style>
-        </p:cxnSp>
-      </p:grpSp>
+            <a:prstDash val="sysDash"/>
+            <a:headEnd type="arrow" w="med" len="med"/>
+            <a:tailEnd type="none" w="med" len="med"/>
+          </a:ln>
+        </p:spPr>
+        <p:style>
+          <a:lnRef idx="1">
+            <a:schemeClr val="accent1"/>
+          </a:lnRef>
+          <a:fillRef idx="0">
+            <a:schemeClr val="accent1"/>
+          </a:fillRef>
+          <a:effectRef idx="0">
+            <a:schemeClr val="accent1"/>
+          </a:effectRef>
+          <a:fontRef idx="minor">
+            <a:schemeClr val="tx1"/>
+          </a:fontRef>
+        </p:style>
+      </p:cxnSp>
     </p:spTree>
     <p:extLst>
       <p:ext uri="{BB962C8B-B14F-4D97-AF65-F5344CB8AC3E}">

</xml_diff>

<commit_message>
Solved AddDeleteEventSequenceDiagram not properly displayed problem
</commit_message>
<xml_diff>
--- a/docs/diagrams/AddDeleteEventSequenceDiagram.pptx
+++ b/docs/diagrams/AddDeleteEventSequenceDiagram.pptx
@@ -10,7 +10,7 @@
   <p:sldIdLst>
     <p:sldId id="267" r:id="rId2"/>
   </p:sldIdLst>
-  <p:sldSz cx="9144000" cy="6858000" type="screen4x3"/>
+  <p:sldSz cx="12192000" cy="6858000"/>
   <p:notesSz cx="6858000" cy="9144000"/>
   <p:defaultTextStyle>
     <a:defPPr>
@@ -110,12 +110,12 @@
   <p:extLst>
     <p:ext uri="{EFAFB233-063F-42B5-8137-9DF3F51BA10A}">
       <p15:sldGuideLst xmlns:p15="http://schemas.microsoft.com/office/powerpoint/2012/main">
-        <p15:guide id="1" orient="horz" pos="1488">
+        <p15:guide id="1" orient="horz" pos="1488" userDrawn="1">
           <p15:clr>
             <a:srgbClr val="A4A3A4"/>
           </p15:clr>
         </p15:guide>
-        <p15:guide id="2" pos="2880">
+        <p15:guide id="2" pos="3840" userDrawn="1">
           <p15:clr>
             <a:srgbClr val="A4A3A4"/>
           </p15:clr>
@@ -208,7 +208,7 @@
           <a:p>
             <a:fld id="{F5CC4B3F-88C1-4FFA-B1B6-F41C21DC6924}" type="datetimeFigureOut">
               <a:rPr lang="en-US" smtClean="0"/>
-              <a:t>10/17/2018</a:t>
+              <a:t>10/18/2018</a:t>
             </a:fld>
             <a:endParaRPr lang="en-US"/>
           </a:p>
@@ -226,8 +226,8 @@
         </p:nvSpPr>
         <p:spPr>
           <a:xfrm>
-            <a:off x="1143000" y="685800"/>
-            <a:ext cx="4572000" cy="3429000"/>
+            <a:off x="381000" y="685800"/>
+            <a:ext cx="6096000" cy="3429000"/>
           </a:xfrm>
           <a:prstGeom prst="rect">
             <a:avLst/>
@@ -504,8 +504,8 @@
         </p:nvSpPr>
         <p:spPr>
           <a:xfrm>
-            <a:off x="685800" y="2130425"/>
-            <a:ext cx="7772400" cy="1470025"/>
+            <a:off x="914400" y="2130426"/>
+            <a:ext cx="10363200" cy="1470025"/>
           </a:xfrm>
         </p:spPr>
         <p:txBody>
@@ -531,8 +531,8 @@
         </p:nvSpPr>
         <p:spPr>
           <a:xfrm>
-            <a:off x="1371600" y="3886200"/>
-            <a:ext cx="6400800" cy="1752600"/>
+            <a:off x="1828800" y="3886200"/>
+            <a:ext cx="8534400" cy="1752600"/>
           </a:xfrm>
         </p:spPr>
         <p:txBody>
@@ -654,7 +654,7 @@
           <a:p>
             <a:fld id="{78C97017-6FC3-485B-9764-EAC9E56C1D49}" type="datetimeFigureOut">
               <a:rPr lang="en-US" smtClean="0"/>
-              <a:t>10/17/2018</a:t>
+              <a:t>10/18/2018</a:t>
             </a:fld>
             <a:endParaRPr lang="en-US"/>
           </a:p>
@@ -822,7 +822,7 @@
           <a:p>
             <a:fld id="{78C97017-6FC3-485B-9764-EAC9E56C1D49}" type="datetimeFigureOut">
               <a:rPr lang="en-US" smtClean="0"/>
-              <a:t>10/17/2018</a:t>
+              <a:t>10/18/2018</a:t>
             </a:fld>
             <a:endParaRPr lang="en-US"/>
           </a:p>
@@ -912,8 +912,8 @@
         </p:nvSpPr>
         <p:spPr>
           <a:xfrm>
-            <a:off x="6629400" y="274638"/>
-            <a:ext cx="2057400" cy="5851525"/>
+            <a:off x="8839200" y="274639"/>
+            <a:ext cx="2743200" cy="5851525"/>
           </a:xfrm>
         </p:spPr>
         <p:txBody>
@@ -939,8 +939,8 @@
         </p:nvSpPr>
         <p:spPr>
           <a:xfrm>
-            <a:off x="457200" y="274638"/>
-            <a:ext cx="6019800" cy="5851525"/>
+            <a:off x="609600" y="274639"/>
+            <a:ext cx="8026400" cy="5851525"/>
           </a:xfrm>
         </p:spPr>
         <p:txBody>
@@ -1000,7 +1000,7 @@
           <a:p>
             <a:fld id="{78C97017-6FC3-485B-9764-EAC9E56C1D49}" type="datetimeFigureOut">
               <a:rPr lang="en-US" smtClean="0"/>
-              <a:t>10/17/2018</a:t>
+              <a:t>10/18/2018</a:t>
             </a:fld>
             <a:endParaRPr lang="en-US"/>
           </a:p>
@@ -1168,7 +1168,7 @@
           <a:p>
             <a:fld id="{78C97017-6FC3-485B-9764-EAC9E56C1D49}" type="datetimeFigureOut">
               <a:rPr lang="en-US" smtClean="0"/>
-              <a:t>10/17/2018</a:t>
+              <a:t>10/18/2018</a:t>
             </a:fld>
             <a:endParaRPr lang="en-US"/>
           </a:p>
@@ -1258,8 +1258,8 @@
         </p:nvSpPr>
         <p:spPr>
           <a:xfrm>
-            <a:off x="722313" y="4406900"/>
-            <a:ext cx="7772400" cy="1362075"/>
+            <a:off x="963084" y="4406901"/>
+            <a:ext cx="10363200" cy="1362075"/>
           </a:xfrm>
         </p:spPr>
         <p:txBody>
@@ -1289,8 +1289,8 @@
         </p:nvSpPr>
         <p:spPr>
           <a:xfrm>
-            <a:off x="722313" y="2906713"/>
-            <a:ext cx="7772400" cy="1500187"/>
+            <a:off x="963084" y="2906713"/>
+            <a:ext cx="10363200" cy="1500187"/>
           </a:xfrm>
         </p:spPr>
         <p:txBody>
@@ -1413,7 +1413,7 @@
           <a:p>
             <a:fld id="{78C97017-6FC3-485B-9764-EAC9E56C1D49}" type="datetimeFigureOut">
               <a:rPr lang="en-US" smtClean="0"/>
-              <a:t>10/17/2018</a:t>
+              <a:t>10/18/2018</a:t>
             </a:fld>
             <a:endParaRPr lang="en-US"/>
           </a:p>
@@ -1525,8 +1525,8 @@
         </p:nvSpPr>
         <p:spPr>
           <a:xfrm>
-            <a:off x="457200" y="1600200"/>
-            <a:ext cx="4038600" cy="4525963"/>
+            <a:off x="609600" y="1600201"/>
+            <a:ext cx="5384800" cy="4525963"/>
           </a:xfrm>
         </p:spPr>
         <p:txBody>
@@ -1609,8 +1609,8 @@
         </p:nvSpPr>
         <p:spPr>
           <a:xfrm>
-            <a:off x="4648200" y="1600200"/>
-            <a:ext cx="4038600" cy="4525963"/>
+            <a:off x="6197600" y="1600201"/>
+            <a:ext cx="5384800" cy="4525963"/>
           </a:xfrm>
         </p:spPr>
         <p:txBody>
@@ -1698,7 +1698,7 @@
           <a:p>
             <a:fld id="{78C97017-6FC3-485B-9764-EAC9E56C1D49}" type="datetimeFigureOut">
               <a:rPr lang="en-US" smtClean="0"/>
-              <a:t>10/17/2018</a:t>
+              <a:t>10/18/2018</a:t>
             </a:fld>
             <a:endParaRPr lang="en-US"/>
           </a:p>
@@ -1814,8 +1814,8 @@
         </p:nvSpPr>
         <p:spPr>
           <a:xfrm>
-            <a:off x="457200" y="1535113"/>
-            <a:ext cx="4040188" cy="639762"/>
+            <a:off x="609600" y="1535113"/>
+            <a:ext cx="5386917" cy="639762"/>
           </a:xfrm>
         </p:spPr>
         <p:txBody>
@@ -1879,8 +1879,8 @@
         </p:nvSpPr>
         <p:spPr>
           <a:xfrm>
-            <a:off x="457200" y="2174875"/>
-            <a:ext cx="4040188" cy="3951288"/>
+            <a:off x="609600" y="2174875"/>
+            <a:ext cx="5386917" cy="3951288"/>
           </a:xfrm>
         </p:spPr>
         <p:txBody>
@@ -1963,8 +1963,8 @@
         </p:nvSpPr>
         <p:spPr>
           <a:xfrm>
-            <a:off x="4645025" y="1535113"/>
-            <a:ext cx="4041775" cy="639762"/>
+            <a:off x="6193368" y="1535113"/>
+            <a:ext cx="5389033" cy="639762"/>
           </a:xfrm>
         </p:spPr>
         <p:txBody>
@@ -2028,8 +2028,8 @@
         </p:nvSpPr>
         <p:spPr>
           <a:xfrm>
-            <a:off x="4645025" y="2174875"/>
-            <a:ext cx="4041775" cy="3951288"/>
+            <a:off x="6193368" y="2174875"/>
+            <a:ext cx="5389033" cy="3951288"/>
           </a:xfrm>
         </p:spPr>
         <p:txBody>
@@ -2117,7 +2117,7 @@
           <a:p>
             <a:fld id="{78C97017-6FC3-485B-9764-EAC9E56C1D49}" type="datetimeFigureOut">
               <a:rPr lang="en-US" smtClean="0"/>
-              <a:t>10/17/2018</a:t>
+              <a:t>10/18/2018</a:t>
             </a:fld>
             <a:endParaRPr lang="en-US"/>
           </a:p>
@@ -2234,7 +2234,7 @@
           <a:p>
             <a:fld id="{78C97017-6FC3-485B-9764-EAC9E56C1D49}" type="datetimeFigureOut">
               <a:rPr lang="en-US" smtClean="0"/>
-              <a:t>10/17/2018</a:t>
+              <a:t>10/18/2018</a:t>
             </a:fld>
             <a:endParaRPr lang="en-US"/>
           </a:p>
@@ -2329,7 +2329,7 @@
           <a:p>
             <a:fld id="{78C97017-6FC3-485B-9764-EAC9E56C1D49}" type="datetimeFigureOut">
               <a:rPr lang="en-US" smtClean="0"/>
-              <a:t>10/17/2018</a:t>
+              <a:t>10/18/2018</a:t>
             </a:fld>
             <a:endParaRPr lang="en-US"/>
           </a:p>
@@ -2419,8 +2419,8 @@
         </p:nvSpPr>
         <p:spPr>
           <a:xfrm>
-            <a:off x="457200" y="273050"/>
-            <a:ext cx="3008313" cy="1162050"/>
+            <a:off x="609601" y="273050"/>
+            <a:ext cx="4011084" cy="1162050"/>
           </a:xfrm>
         </p:spPr>
         <p:txBody>
@@ -2450,8 +2450,8 @@
         </p:nvSpPr>
         <p:spPr>
           <a:xfrm>
-            <a:off x="3575050" y="273050"/>
-            <a:ext cx="5111750" cy="5853113"/>
+            <a:off x="4766733" y="273051"/>
+            <a:ext cx="6815667" cy="5853113"/>
           </a:xfrm>
         </p:spPr>
         <p:txBody>
@@ -2534,8 +2534,8 @@
         </p:nvSpPr>
         <p:spPr>
           <a:xfrm>
-            <a:off x="457200" y="1435100"/>
-            <a:ext cx="3008313" cy="4691063"/>
+            <a:off x="609601" y="1435101"/>
+            <a:ext cx="4011084" cy="4691063"/>
           </a:xfrm>
         </p:spPr>
         <p:txBody>
@@ -2604,7 +2604,7 @@
           <a:p>
             <a:fld id="{78C97017-6FC3-485B-9764-EAC9E56C1D49}" type="datetimeFigureOut">
               <a:rPr lang="en-US" smtClean="0"/>
-              <a:t>10/17/2018</a:t>
+              <a:t>10/18/2018</a:t>
             </a:fld>
             <a:endParaRPr lang="en-US"/>
           </a:p>
@@ -2694,8 +2694,8 @@
         </p:nvSpPr>
         <p:spPr>
           <a:xfrm>
-            <a:off x="1792288" y="4800600"/>
-            <a:ext cx="5486400" cy="566738"/>
+            <a:off x="2389717" y="4800600"/>
+            <a:ext cx="7315200" cy="566738"/>
           </a:xfrm>
         </p:spPr>
         <p:txBody>
@@ -2725,8 +2725,8 @@
         </p:nvSpPr>
         <p:spPr>
           <a:xfrm>
-            <a:off x="1792288" y="612775"/>
-            <a:ext cx="5486400" cy="4114800"/>
+            <a:off x="2389717" y="612775"/>
+            <a:ext cx="7315200" cy="4114800"/>
           </a:xfrm>
         </p:spPr>
         <p:txBody>
@@ -2786,8 +2786,8 @@
         </p:nvSpPr>
         <p:spPr>
           <a:xfrm>
-            <a:off x="1792288" y="5367338"/>
-            <a:ext cx="5486400" cy="804862"/>
+            <a:off x="2389717" y="5367338"/>
+            <a:ext cx="7315200" cy="804862"/>
           </a:xfrm>
         </p:spPr>
         <p:txBody>
@@ -2856,7 +2856,7 @@
           <a:p>
             <a:fld id="{78C97017-6FC3-485B-9764-EAC9E56C1D49}" type="datetimeFigureOut">
               <a:rPr lang="en-US" smtClean="0"/>
-              <a:t>10/17/2018</a:t>
+              <a:t>10/18/2018</a:t>
             </a:fld>
             <a:endParaRPr lang="en-US"/>
           </a:p>
@@ -2951,8 +2951,8 @@
         </p:nvSpPr>
         <p:spPr>
           <a:xfrm>
-            <a:off x="457200" y="274638"/>
-            <a:ext cx="8229600" cy="1143000"/>
+            <a:off x="609600" y="274638"/>
+            <a:ext cx="10972800" cy="1143000"/>
           </a:xfrm>
           <a:prstGeom prst="rect">
             <a:avLst/>
@@ -2983,8 +2983,8 @@
         </p:nvSpPr>
         <p:spPr>
           <a:xfrm>
-            <a:off x="457200" y="1600200"/>
-            <a:ext cx="8229600" cy="4525963"/>
+            <a:off x="609600" y="1600201"/>
+            <a:ext cx="10972800" cy="4525963"/>
           </a:xfrm>
           <a:prstGeom prst="rect">
             <a:avLst/>
@@ -3044,8 +3044,8 @@
         </p:nvSpPr>
         <p:spPr>
           <a:xfrm>
-            <a:off x="457200" y="6356350"/>
-            <a:ext cx="2133600" cy="365125"/>
+            <a:off x="609600" y="6356351"/>
+            <a:ext cx="2844800" cy="365125"/>
           </a:xfrm>
           <a:prstGeom prst="rect">
             <a:avLst/>
@@ -3067,7 +3067,7 @@
           <a:p>
             <a:fld id="{78C97017-6FC3-485B-9764-EAC9E56C1D49}" type="datetimeFigureOut">
               <a:rPr lang="en-US" smtClean="0"/>
-              <a:t>10/17/2018</a:t>
+              <a:t>10/18/2018</a:t>
             </a:fld>
             <a:endParaRPr lang="en-US"/>
           </a:p>
@@ -3085,8 +3085,8 @@
         </p:nvSpPr>
         <p:spPr>
           <a:xfrm>
-            <a:off x="3124200" y="6356350"/>
-            <a:ext cx="2895600" cy="365125"/>
+            <a:off x="4165600" y="6356351"/>
+            <a:ext cx="3860800" cy="365125"/>
           </a:xfrm>
           <a:prstGeom prst="rect">
             <a:avLst/>
@@ -3122,8 +3122,8 @@
         </p:nvSpPr>
         <p:spPr>
           <a:xfrm>
-            <a:off x="6553200" y="6356350"/>
-            <a:ext cx="2133600" cy="365125"/>
+            <a:off x="8737600" y="6356351"/>
+            <a:ext cx="2844800" cy="365125"/>
           </a:xfrm>
           <a:prstGeom prst="rect">
             <a:avLst/>
@@ -3450,7 +3450,7 @@
         </p:nvSpPr>
         <p:spPr>
           <a:xfrm>
-            <a:off x="6459374" y="75352"/>
+            <a:off x="7363162" y="1213177"/>
             <a:ext cx="3903825" cy="4400926"/>
           </a:xfrm>
           <a:prstGeom prst="roundRect">
@@ -3511,7 +3511,7 @@
         </p:nvSpPr>
         <p:spPr>
           <a:xfrm>
-            <a:off x="467813" y="119475"/>
+            <a:off x="1371600" y="1257300"/>
             <a:ext cx="5863964" cy="4343400"/>
           </a:xfrm>
           <a:prstGeom prst="roundRect">
@@ -3572,7 +3572,7 @@
         </p:nvSpPr>
         <p:spPr>
           <a:xfrm>
-            <a:off x="883145" y="543946"/>
+            <a:off x="1786933" y="1681771"/>
             <a:ext cx="1455629" cy="346760"/>
           </a:xfrm>
           <a:prstGeom prst="rect">
@@ -3641,7 +3641,7 @@
         </p:nvCxnSpPr>
         <p:spPr>
           <a:xfrm>
-            <a:off x="1610959" y="907617"/>
+            <a:off x="2514746" y="2045443"/>
             <a:ext cx="0" cy="3481399"/>
           </a:xfrm>
           <a:prstGeom prst="line">
@@ -3678,7 +3678,7 @@
         </p:nvSpPr>
         <p:spPr>
           <a:xfrm>
-            <a:off x="1538951" y="1258311"/>
+            <a:off x="2442738" y="2396137"/>
             <a:ext cx="152400" cy="2932689"/>
           </a:xfrm>
           <a:prstGeom prst="rect">
@@ -3725,7 +3725,7 @@
         </p:nvSpPr>
         <p:spPr>
           <a:xfrm>
-            <a:off x="3437188" y="423022"/>
+            <a:off x="4340975" y="1560847"/>
             <a:ext cx="1219200" cy="467684"/>
           </a:xfrm>
           <a:prstGeom prst="rect">
@@ -3797,7 +3797,7 @@
         </p:nvCxnSpPr>
         <p:spPr>
           <a:xfrm>
-            <a:off x="4050587" y="907617"/>
+            <a:off x="4954374" y="2045442"/>
             <a:ext cx="0" cy="1482984"/>
           </a:xfrm>
           <a:prstGeom prst="line">
@@ -3834,7 +3834,7 @@
         </p:nvSpPr>
         <p:spPr>
           <a:xfrm>
-            <a:off x="3978580" y="1365810"/>
+            <a:off x="4882367" y="2503635"/>
             <a:ext cx="154408" cy="767790"/>
           </a:xfrm>
           <a:prstGeom prst="rect">
@@ -3869,11 +3869,7 @@
           <a:lstStyle/>
           <a:p>
             <a:pPr algn="ctr"/>
-            <a:endParaRPr lang="en-SG" sz="1400">
-              <a:solidFill>
-                <a:schemeClr val="dk1"/>
-              </a:solidFill>
-            </a:endParaRPr>
+            <a:endParaRPr lang="en-SG" sz="1400"/>
           </a:p>
         </p:txBody>
       </p:sp>
@@ -3888,8 +3884,8 @@
           <p:nvPr/>
         </p:nvCxnSpPr>
         <p:spPr>
-          <a:xfrm>
-            <a:off x="5602082" y="1613633"/>
+          <a:xfrm flipH="1">
+            <a:off x="6505869" y="2751458"/>
             <a:ext cx="0" cy="2644578"/>
           </a:xfrm>
           <a:prstGeom prst="line">
@@ -3926,7 +3922,7 @@
         </p:nvSpPr>
         <p:spPr>
           <a:xfrm>
-            <a:off x="5525882" y="1613633"/>
+            <a:off x="6429669" y="2751459"/>
             <a:ext cx="152400" cy="276003"/>
           </a:xfrm>
           <a:prstGeom prst="rect">
@@ -3968,12 +3964,14 @@
       <p:cxnSp>
         <p:nvCxnSpPr>
           <p:cNvPr id="23" name="Straight Arrow Connector 22"/>
-          <p:cNvCxnSpPr/>
+          <p:cNvCxnSpPr>
+            <a:cxnSpLocks/>
+          </p:cNvCxnSpPr>
           <p:nvPr/>
         </p:nvCxnSpPr>
         <p:spPr>
           <a:xfrm>
-            <a:off x="419100" y="1261999"/>
+            <a:off x="1322888" y="2399824"/>
             <a:ext cx="1119851" cy="0"/>
           </a:xfrm>
           <a:prstGeom prst="straightConnector1">
@@ -4009,7 +4007,7 @@
         </p:nvSpPr>
         <p:spPr>
           <a:xfrm>
-            <a:off x="-457192" y="990600"/>
+            <a:off x="446595" y="2128426"/>
             <a:ext cx="1920138" cy="214449"/>
           </a:xfrm>
           <a:prstGeom prst="rect">
@@ -4054,12 +4052,14 @@
       <p:cxnSp>
         <p:nvCxnSpPr>
           <p:cNvPr id="28" name="Straight Arrow Connector 27"/>
-          <p:cNvCxnSpPr/>
+          <p:cNvCxnSpPr>
+            <a:cxnSpLocks/>
+          </p:cNvCxnSpPr>
           <p:nvPr/>
         </p:nvCxnSpPr>
         <p:spPr>
           <a:xfrm flipV="1">
-            <a:off x="4135972" y="1512340"/>
+            <a:off x="5039759" y="2650166"/>
             <a:ext cx="922392" cy="1"/>
           </a:xfrm>
           <a:prstGeom prst="straightConnector1">
@@ -4095,7 +4095,7 @@
         </p:nvSpPr>
         <p:spPr>
           <a:xfrm>
-            <a:off x="3243421" y="2484071"/>
+            <a:off x="4147209" y="3621896"/>
             <a:ext cx="855809" cy="215444"/>
           </a:xfrm>
           <a:prstGeom prst="rect">
@@ -4130,12 +4130,14 @@
       <p:cxnSp>
         <p:nvCxnSpPr>
           <p:cNvPr id="34" name="Straight Arrow Connector 33"/>
-          <p:cNvCxnSpPr/>
+          <p:cNvCxnSpPr>
+            <a:cxnSpLocks/>
+          </p:cNvCxnSpPr>
           <p:nvPr/>
         </p:nvCxnSpPr>
         <p:spPr>
           <a:xfrm>
-            <a:off x="4109108" y="1878232"/>
+            <a:off x="5012895" y="3016057"/>
             <a:ext cx="1492974" cy="0"/>
           </a:xfrm>
           <a:prstGeom prst="straightConnector1">
@@ -4175,7 +4177,7 @@
         </p:nvCxnSpPr>
         <p:spPr>
           <a:xfrm>
-            <a:off x="1691351" y="2133600"/>
+            <a:off x="2595139" y="3271425"/>
             <a:ext cx="2348067" cy="0"/>
           </a:xfrm>
           <a:prstGeom prst="straightConnector1">
@@ -4208,12 +4210,14 @@
       <p:cxnSp>
         <p:nvCxnSpPr>
           <p:cNvPr id="37" name="Straight Arrow Connector 36"/>
-          <p:cNvCxnSpPr/>
+          <p:cNvCxnSpPr>
+            <a:cxnSpLocks/>
+          </p:cNvCxnSpPr>
           <p:nvPr/>
         </p:nvCxnSpPr>
         <p:spPr>
           <a:xfrm>
-            <a:off x="380999" y="4191000"/>
+            <a:off x="1284787" y="5328825"/>
             <a:ext cx="1196051" cy="0"/>
           </a:xfrm>
           <a:prstGeom prst="straightConnector1">
@@ -4251,7 +4255,7 @@
         </p:nvSpPr>
         <p:spPr>
           <a:xfrm>
-            <a:off x="5526488" y="2731313"/>
+            <a:off x="6430275" y="3869139"/>
             <a:ext cx="161322" cy="1307285"/>
           </a:xfrm>
           <a:prstGeom prst="rect">
@@ -4298,7 +4302,7 @@
         </p:nvSpPr>
         <p:spPr>
           <a:xfrm>
-            <a:off x="6194514" y="2748246"/>
+            <a:off x="7098302" y="3886071"/>
             <a:ext cx="755111" cy="184666"/>
           </a:xfrm>
           <a:prstGeom prst="rect">
@@ -4353,7 +4357,7 @@
         </p:nvSpPr>
         <p:spPr>
           <a:xfrm>
-            <a:off x="1622129" y="1106152"/>
+            <a:off x="2525916" y="2243977"/>
             <a:ext cx="2271840" cy="215444"/>
           </a:xfrm>
           <a:prstGeom prst="rect">
@@ -4405,7 +4409,7 @@
         </p:nvSpPr>
         <p:spPr>
           <a:xfrm>
-            <a:off x="3272755" y="3791076"/>
+            <a:off x="4176542" y="4928901"/>
             <a:ext cx="621216" cy="215444"/>
           </a:xfrm>
           <a:prstGeom prst="rect">
@@ -4445,7 +4449,7 @@
         </p:nvSpPr>
         <p:spPr>
           <a:xfrm>
-            <a:off x="645270" y="3945901"/>
+            <a:off x="1549057" y="5083726"/>
             <a:ext cx="762000" cy="215444"/>
           </a:xfrm>
           <a:prstGeom prst="rect">
@@ -4485,7 +4489,7 @@
         </p:nvSpPr>
         <p:spPr>
           <a:xfrm>
-            <a:off x="7497155" y="2568606"/>
+            <a:off x="8400943" y="3706432"/>
             <a:ext cx="2181777" cy="335427"/>
           </a:xfrm>
           <a:prstGeom prst="rect">
@@ -4552,7 +4556,7 @@
         </p:nvSpPr>
         <p:spPr>
           <a:xfrm>
-            <a:off x="8514207" y="3182840"/>
+            <a:off x="9417995" y="4320665"/>
             <a:ext cx="129933" cy="398562"/>
           </a:xfrm>
           <a:prstGeom prst="rect">
@@ -4599,7 +4603,7 @@
         </p:nvSpPr>
         <p:spPr>
           <a:xfrm>
-            <a:off x="2724792" y="1905793"/>
+            <a:off x="3628580" y="3043618"/>
             <a:ext cx="220343" cy="215444"/>
           </a:xfrm>
           <a:prstGeom prst="rect">
@@ -4639,7 +4643,7 @@
         </p:nvSpPr>
         <p:spPr>
           <a:xfrm>
-            <a:off x="6549765" y="2362200"/>
+            <a:off x="7453552" y="3500025"/>
             <a:ext cx="841636" cy="300180"/>
           </a:xfrm>
           <a:prstGeom prst="rect">
@@ -4700,7 +4704,7 @@
         </p:nvCxnSpPr>
         <p:spPr>
           <a:xfrm flipH="1">
-            <a:off x="6986491" y="2653306"/>
+            <a:off x="7890279" y="3791131"/>
             <a:ext cx="3959" cy="1735710"/>
           </a:xfrm>
           <a:prstGeom prst="line">
@@ -4737,7 +4741,7 @@
         </p:nvSpPr>
         <p:spPr>
           <a:xfrm>
-            <a:off x="6887527" y="2958106"/>
+            <a:off x="7791314" y="4095932"/>
             <a:ext cx="168896" cy="775693"/>
           </a:xfrm>
           <a:prstGeom prst="rect">
@@ -4786,7 +4790,7 @@
         </p:nvCxnSpPr>
         <p:spPr>
           <a:xfrm>
-            <a:off x="5685755" y="2975344"/>
+            <a:off x="6589543" y="4113169"/>
             <a:ext cx="1210345" cy="0"/>
           </a:xfrm>
           <a:prstGeom prst="straightConnector1">
@@ -4822,7 +4826,7 @@
         </p:nvSpPr>
         <p:spPr>
           <a:xfrm>
-            <a:off x="5472880" y="4258211"/>
+            <a:off x="6376667" y="5396036"/>
             <a:ext cx="258404" cy="261610"/>
           </a:xfrm>
           <a:prstGeom prst="rect">
@@ -4831,7 +4835,7 @@
           <a:noFill/>
         </p:spPr>
         <p:txBody>
-          <a:bodyPr wrap="none" rtlCol="0">
+          <a:bodyPr wrap="square" rtlCol="0">
             <a:spAutoFit/>
           </a:bodyPr>
           <a:lstStyle/>
@@ -4855,7 +4859,7 @@
         </p:nvSpPr>
         <p:spPr>
           <a:xfrm>
-            <a:off x="5035976" y="1260268"/>
+            <a:off x="5939763" y="2398094"/>
             <a:ext cx="1216200" cy="459665"/>
           </a:xfrm>
           <a:prstGeom prst="rect">
@@ -4937,7 +4941,7 @@
         </p:nvCxnSpPr>
         <p:spPr>
           <a:xfrm>
-            <a:off x="1691351" y="2731314"/>
+            <a:off x="2595138" y="3869140"/>
             <a:ext cx="3832164" cy="1"/>
           </a:xfrm>
           <a:prstGeom prst="straightConnector1">
@@ -4981,7 +4985,7 @@
         </p:nvCxnSpPr>
         <p:spPr>
           <a:xfrm>
-            <a:off x="1708245" y="1363918"/>
+            <a:off x="2612033" y="2501744"/>
             <a:ext cx="2256705" cy="1"/>
           </a:xfrm>
           <a:prstGeom prst="straightConnector1">
@@ -5025,7 +5029,7 @@
         </p:nvCxnSpPr>
         <p:spPr>
           <a:xfrm>
-            <a:off x="1691998" y="4036462"/>
+            <a:off x="2595786" y="5174287"/>
             <a:ext cx="3831517" cy="0"/>
           </a:xfrm>
           <a:prstGeom prst="straightConnector1">
@@ -5071,7 +5075,7 @@
         </p:nvCxnSpPr>
         <p:spPr>
           <a:xfrm>
-            <a:off x="8588043" y="2871355"/>
+            <a:off x="9491830" y="4009180"/>
             <a:ext cx="17996" cy="1467648"/>
           </a:xfrm>
           <a:prstGeom prst="line">
@@ -5108,7 +5112,7 @@
         </p:nvSpPr>
         <p:spPr>
           <a:xfrm>
-            <a:off x="7474923" y="2975344"/>
+            <a:off x="8378711" y="4113169"/>
             <a:ext cx="744455" cy="184666"/>
           </a:xfrm>
           <a:prstGeom prst="rect">
@@ -5167,7 +5171,7 @@
         </p:nvCxnSpPr>
         <p:spPr>
           <a:xfrm>
-            <a:off x="7043991" y="3182839"/>
+            <a:off x="7947778" y="4320664"/>
             <a:ext cx="1470216" cy="0"/>
           </a:xfrm>
           <a:prstGeom prst="straightConnector1">
@@ -5211,7 +5215,7 @@
         </p:nvCxnSpPr>
         <p:spPr>
           <a:xfrm flipV="1">
-            <a:off x="7043991" y="3564914"/>
+            <a:off x="7947778" y="4702740"/>
             <a:ext cx="1470216" cy="6325"/>
           </a:xfrm>
           <a:prstGeom prst="straightConnector1">
@@ -5258,7 +5262,7 @@
         </p:nvCxnSpPr>
         <p:spPr>
           <a:xfrm>
-            <a:off x="5675919" y="3733799"/>
+            <a:off x="6579706" y="4871624"/>
             <a:ext cx="1296056" cy="0"/>
           </a:xfrm>
           <a:prstGeom prst="straightConnector1">

</xml_diff>

<commit_message>
Edited Filter feature in DeveloperGuide.adoc
</commit_message>
<xml_diff>
--- a/docs/diagrams/AddDeleteEventSequenceDiagram.pptx
+++ b/docs/diagrams/AddDeleteEventSequenceDiagram.pptx
@@ -208,7 +208,7 @@
           <a:p>
             <a:fld id="{F5CC4B3F-88C1-4FFA-B1B6-F41C21DC6924}" type="datetimeFigureOut">
               <a:rPr lang="en-US" smtClean="0"/>
-              <a:t>10/17/2018</a:t>
+              <a:t>10/18/2018</a:t>
             </a:fld>
             <a:endParaRPr lang="en-US"/>
           </a:p>
@@ -654,7 +654,7 @@
           <a:p>
             <a:fld id="{78C97017-6FC3-485B-9764-EAC9E56C1D49}" type="datetimeFigureOut">
               <a:rPr lang="en-US" smtClean="0"/>
-              <a:t>10/17/2018</a:t>
+              <a:t>10/18/2018</a:t>
             </a:fld>
             <a:endParaRPr lang="en-US"/>
           </a:p>
@@ -822,7 +822,7 @@
           <a:p>
             <a:fld id="{78C97017-6FC3-485B-9764-EAC9E56C1D49}" type="datetimeFigureOut">
               <a:rPr lang="en-US" smtClean="0"/>
-              <a:t>10/17/2018</a:t>
+              <a:t>10/18/2018</a:t>
             </a:fld>
             <a:endParaRPr lang="en-US"/>
           </a:p>
@@ -1000,7 +1000,7 @@
           <a:p>
             <a:fld id="{78C97017-6FC3-485B-9764-EAC9E56C1D49}" type="datetimeFigureOut">
               <a:rPr lang="en-US" smtClean="0"/>
-              <a:t>10/17/2018</a:t>
+              <a:t>10/18/2018</a:t>
             </a:fld>
             <a:endParaRPr lang="en-US"/>
           </a:p>
@@ -1168,7 +1168,7 @@
           <a:p>
             <a:fld id="{78C97017-6FC3-485B-9764-EAC9E56C1D49}" type="datetimeFigureOut">
               <a:rPr lang="en-US" smtClean="0"/>
-              <a:t>10/17/2018</a:t>
+              <a:t>10/18/2018</a:t>
             </a:fld>
             <a:endParaRPr lang="en-US"/>
           </a:p>
@@ -1413,7 +1413,7 @@
           <a:p>
             <a:fld id="{78C97017-6FC3-485B-9764-EAC9E56C1D49}" type="datetimeFigureOut">
               <a:rPr lang="en-US" smtClean="0"/>
-              <a:t>10/17/2018</a:t>
+              <a:t>10/18/2018</a:t>
             </a:fld>
             <a:endParaRPr lang="en-US"/>
           </a:p>
@@ -1698,7 +1698,7 @@
           <a:p>
             <a:fld id="{78C97017-6FC3-485B-9764-EAC9E56C1D49}" type="datetimeFigureOut">
               <a:rPr lang="en-US" smtClean="0"/>
-              <a:t>10/17/2018</a:t>
+              <a:t>10/18/2018</a:t>
             </a:fld>
             <a:endParaRPr lang="en-US"/>
           </a:p>
@@ -2117,7 +2117,7 @@
           <a:p>
             <a:fld id="{78C97017-6FC3-485B-9764-EAC9E56C1D49}" type="datetimeFigureOut">
               <a:rPr lang="en-US" smtClean="0"/>
-              <a:t>10/17/2018</a:t>
+              <a:t>10/18/2018</a:t>
             </a:fld>
             <a:endParaRPr lang="en-US"/>
           </a:p>
@@ -2234,7 +2234,7 @@
           <a:p>
             <a:fld id="{78C97017-6FC3-485B-9764-EAC9E56C1D49}" type="datetimeFigureOut">
               <a:rPr lang="en-US" smtClean="0"/>
-              <a:t>10/17/2018</a:t>
+              <a:t>10/18/2018</a:t>
             </a:fld>
             <a:endParaRPr lang="en-US"/>
           </a:p>
@@ -2329,7 +2329,7 @@
           <a:p>
             <a:fld id="{78C97017-6FC3-485B-9764-EAC9E56C1D49}" type="datetimeFigureOut">
               <a:rPr lang="en-US" smtClean="0"/>
-              <a:t>10/17/2018</a:t>
+              <a:t>10/18/2018</a:t>
             </a:fld>
             <a:endParaRPr lang="en-US"/>
           </a:p>
@@ -2604,7 +2604,7 @@
           <a:p>
             <a:fld id="{78C97017-6FC3-485B-9764-EAC9E56C1D49}" type="datetimeFigureOut">
               <a:rPr lang="en-US" smtClean="0"/>
-              <a:t>10/17/2018</a:t>
+              <a:t>10/18/2018</a:t>
             </a:fld>
             <a:endParaRPr lang="en-US"/>
           </a:p>
@@ -2856,7 +2856,7 @@
           <a:p>
             <a:fld id="{78C97017-6FC3-485B-9764-EAC9E56C1D49}" type="datetimeFigureOut">
               <a:rPr lang="en-US" smtClean="0"/>
-              <a:t>10/17/2018</a:t>
+              <a:t>10/18/2018</a:t>
             </a:fld>
             <a:endParaRPr lang="en-US"/>
           </a:p>
@@ -3067,7 +3067,7 @@
           <a:p>
             <a:fld id="{78C97017-6FC3-485B-9764-EAC9E56C1D49}" type="datetimeFigureOut">
               <a:rPr lang="en-US" smtClean="0"/>
-              <a:t>10/17/2018</a:t>
+              <a:t>10/18/2018</a:t>
             </a:fld>
             <a:endParaRPr lang="en-US"/>
           </a:p>

</xml_diff>